<commit_message>
All the things for terraform init
</commit_message>
<xml_diff>
--- a/Terraform 101.pptx
+++ b/Terraform 101.pptx
@@ -5,10 +5,10 @@
     <p:sldMasterId id="2147483648" r:id="rId4"/>
   </p:sldMasterIdLst>
   <p:notesMasterIdLst>
-    <p:notesMasterId r:id="rId13"/>
+    <p:notesMasterId r:id="rId19"/>
   </p:notesMasterIdLst>
   <p:handoutMasterIdLst>
-    <p:handoutMasterId r:id="rId14"/>
+    <p:handoutMasterId r:id="rId20"/>
   </p:handoutMasterIdLst>
   <p:sldIdLst>
     <p:sldId id="257" r:id="rId5"/>
@@ -19,6 +19,12 @@
     <p:sldId id="261" r:id="rId10"/>
     <p:sldId id="262" r:id="rId11"/>
     <p:sldId id="263" r:id="rId12"/>
+    <p:sldId id="265" r:id="rId13"/>
+    <p:sldId id="267" r:id="rId14"/>
+    <p:sldId id="269" r:id="rId15"/>
+    <p:sldId id="270" r:id="rId16"/>
+    <p:sldId id="266" r:id="rId17"/>
+    <p:sldId id="268" r:id="rId18"/>
   </p:sldIdLst>
   <p:sldSz cx="12192000" cy="6858000"/>
   <p:notesSz cx="6858000" cy="9144000"/>
@@ -729,6 +735,147 @@
     <p:extLst>
       <p:ext uri="{BB962C8B-B14F-4D97-AF65-F5344CB8AC3E}">
         <p14:creationId xmlns:p14="http://schemas.microsoft.com/office/powerpoint/2010/main" val="1752230371"/>
+      </p:ext>
+    </p:extLst>
+  </p:cSld>
+  <p:clrMapOvr>
+    <a:masterClrMapping/>
+  </p:clrMapOvr>
+</p:notes>
+</file>
+
+<file path=ppt/notesSlides/notesSlide2.xml><?xml version="1.0" encoding="utf-8"?>
+<p:notes xmlns:a="http://schemas.openxmlformats.org/drawingml/2006/main" xmlns:r="http://schemas.openxmlformats.org/officeDocument/2006/relationships" xmlns:p="http://schemas.openxmlformats.org/presentationml/2006/main">
+  <p:cSld>
+    <p:spTree>
+      <p:nvGrpSpPr>
+        <p:cNvPr id="1" name=""/>
+        <p:cNvGrpSpPr/>
+        <p:nvPr/>
+      </p:nvGrpSpPr>
+      <p:grpSpPr>
+        <a:xfrm>
+          <a:off x="0" y="0"/>
+          <a:ext cx="0" cy="0"/>
+          <a:chOff x="0" y="0"/>
+          <a:chExt cx="0" cy="0"/>
+        </a:xfrm>
+      </p:grpSpPr>
+      <p:sp>
+        <p:nvSpPr>
+          <p:cNvPr id="2" name="Tijdelijke aanduiding voor dia-afbeelding 1"/>
+          <p:cNvSpPr>
+            <a:spLocks noGrp="1" noRot="1" noChangeAspect="1"/>
+          </p:cNvSpPr>
+          <p:nvPr>
+            <p:ph type="sldImg"/>
+          </p:nvPr>
+        </p:nvSpPr>
+        <p:spPr/>
+      </p:sp>
+      <p:sp>
+        <p:nvSpPr>
+          <p:cNvPr id="3" name="Tijdelijke aanduiding voor notities 2"/>
+          <p:cNvSpPr>
+            <a:spLocks noGrp="1"/>
+          </p:cNvSpPr>
+          <p:nvPr>
+            <p:ph type="body" idx="1"/>
+          </p:nvPr>
+        </p:nvSpPr>
+        <p:spPr/>
+        <p:txBody>
+          <a:bodyPr/>
+          <a:lstStyle/>
+          <a:p>
+            <a:r>
+              <a:rPr lang="nl-BE" dirty="0"/>
+              <a:t>Get </a:t>
+            </a:r>
+            <a:r>
+              <a:rPr lang="nl-BE" dirty="0" err="1"/>
+              <a:t>the</a:t>
+            </a:r>
+            <a:r>
+              <a:rPr lang="nl-BE" dirty="0"/>
+              <a:t> </a:t>
+            </a:r>
+            <a:r>
+              <a:rPr lang="nl-BE" dirty="0" err="1"/>
+              <a:t>keyVault</a:t>
+            </a:r>
+            <a:r>
+              <a:rPr lang="nl-BE" dirty="0"/>
+              <a:t> </a:t>
+            </a:r>
+            <a:r>
+              <a:rPr lang="nl-BE" dirty="0" err="1"/>
+              <a:t>owner</a:t>
+            </a:r>
+            <a:r>
+              <a:rPr lang="nl-BE" dirty="0"/>
+              <a:t> </a:t>
+            </a:r>
+            <a:r>
+              <a:rPr lang="nl-BE" dirty="0" err="1"/>
+              <a:t>id</a:t>
+            </a:r>
+            <a:r>
+              <a:rPr lang="nl-BE" dirty="0"/>
+              <a:t> from </a:t>
+            </a:r>
+            <a:r>
+              <a:rPr lang="nl-BE" dirty="0" err="1"/>
+              <a:t>azure</a:t>
+            </a:r>
+            <a:r>
+              <a:rPr lang="nl-BE" dirty="0"/>
+              <a:t> portal -&gt; Active directory -&gt; users -&gt; </a:t>
+            </a:r>
+            <a:r>
+              <a:rPr lang="nl-BE" dirty="0" err="1"/>
+              <a:t>yourself</a:t>
+            </a:r>
+            <a:r>
+              <a:rPr lang="nl-BE" dirty="0"/>
+              <a:t> -&gt; object </a:t>
+            </a:r>
+            <a:r>
+              <a:rPr lang="nl-BE" dirty="0" err="1"/>
+              <a:t>id</a:t>
+            </a:r>
+            <a:endParaRPr lang="nl-BE" dirty="0"/>
+          </a:p>
+        </p:txBody>
+      </p:sp>
+      <p:sp>
+        <p:nvSpPr>
+          <p:cNvPr id="4" name="Tijdelijke aanduiding voor dianummer 3"/>
+          <p:cNvSpPr>
+            <a:spLocks noGrp="1"/>
+          </p:cNvSpPr>
+          <p:nvPr>
+            <p:ph type="sldNum" sz="quarter" idx="5"/>
+          </p:nvPr>
+        </p:nvSpPr>
+        <p:spPr/>
+        <p:txBody>
+          <a:bodyPr/>
+          <a:lstStyle/>
+          <a:p>
+            <a:pPr rtl="0"/>
+            <a:fld id="{5534C2EF-8A97-4DAF-B099-E567883644D6}" type="slidenum">
+              <a:rPr lang="nl-NL" noProof="0" smtClean="0"/>
+              <a:t>11</a:t>
+            </a:fld>
+            <a:endParaRPr lang="nl-NL" noProof="0" dirty="0"/>
+          </a:p>
+        </p:txBody>
+      </p:sp>
+    </p:spTree>
+    <p:extLst>
+      <p:ext uri="{BB962C8B-B14F-4D97-AF65-F5344CB8AC3E}">
+        <p14:creationId xmlns:p14="http://schemas.microsoft.com/office/powerpoint/2010/main" val="2354034956"/>
       </p:ext>
     </p:extLst>
   </p:cSld>
@@ -6822,6 +6969,3067 @@
 </p:sld>
 </file>
 
+<file path=ppt/slides/slide10.xml><?xml version="1.0" encoding="utf-8"?>
+<p:sld xmlns:a="http://schemas.openxmlformats.org/drawingml/2006/main" xmlns:r="http://schemas.openxmlformats.org/officeDocument/2006/relationships" xmlns:p="http://schemas.openxmlformats.org/presentationml/2006/main">
+  <p:cSld>
+    <p:spTree>
+      <p:nvGrpSpPr>
+        <p:cNvPr id="1" name=""/>
+        <p:cNvGrpSpPr/>
+        <p:nvPr/>
+      </p:nvGrpSpPr>
+      <p:grpSpPr>
+        <a:xfrm>
+          <a:off x="0" y="0"/>
+          <a:ext cx="0" cy="0"/>
+          <a:chOff x="0" y="0"/>
+          <a:chExt cx="0" cy="0"/>
+        </a:xfrm>
+      </p:grpSpPr>
+      <p:sp>
+        <p:nvSpPr>
+          <p:cNvPr id="2" name="Titel 1">
+            <a:extLst>
+              <a:ext uri="{FF2B5EF4-FFF2-40B4-BE49-F238E27FC236}">
+                <a16:creationId xmlns:a16="http://schemas.microsoft.com/office/drawing/2014/main" id="{4E95B0FF-7F44-4643-8E75-FE04F50ECE92}"/>
+              </a:ext>
+            </a:extLst>
+          </p:cNvPr>
+          <p:cNvSpPr>
+            <a:spLocks noGrp="1"/>
+          </p:cNvSpPr>
+          <p:nvPr>
+            <p:ph type="title"/>
+          </p:nvPr>
+        </p:nvSpPr>
+        <p:spPr/>
+        <p:txBody>
+          <a:bodyPr/>
+          <a:lstStyle/>
+          <a:p>
+            <a:r>
+              <a:rPr lang="nl-BE" dirty="0"/>
+              <a:t>2. Login </a:t>
+            </a:r>
+            <a:r>
+              <a:rPr lang="nl-BE" dirty="0" err="1"/>
+              <a:t>into</a:t>
+            </a:r>
+            <a:r>
+              <a:rPr lang="nl-BE" dirty="0"/>
+              <a:t> </a:t>
+            </a:r>
+            <a:r>
+              <a:rPr lang="nl-BE" dirty="0" err="1"/>
+              <a:t>the</a:t>
+            </a:r>
+            <a:r>
+              <a:rPr lang="nl-BE" dirty="0"/>
+              <a:t> CLI</a:t>
+            </a:r>
+          </a:p>
+        </p:txBody>
+      </p:sp>
+      <p:sp>
+        <p:nvSpPr>
+          <p:cNvPr id="3" name="Tijdelijke aanduiding voor afbeelding 2">
+            <a:extLst>
+              <a:ext uri="{FF2B5EF4-FFF2-40B4-BE49-F238E27FC236}">
+                <a16:creationId xmlns:a16="http://schemas.microsoft.com/office/drawing/2014/main" id="{DCC62E36-5ACD-4385-B90B-412332C08838}"/>
+              </a:ext>
+            </a:extLst>
+          </p:cNvPr>
+          <p:cNvSpPr>
+            <a:spLocks noGrp="1"/>
+          </p:cNvSpPr>
+          <p:nvPr>
+            <p:ph type="pic" idx="1"/>
+          </p:nvPr>
+        </p:nvSpPr>
+        <p:spPr>
+          <a:xfrm>
+            <a:off x="1055440" y="1874520"/>
+            <a:ext cx="5193089" cy="2937510"/>
+          </a:xfrm>
+          <a:solidFill>
+            <a:schemeClr val="accent4">
+              <a:lumMod val="50000"/>
+            </a:schemeClr>
+          </a:solidFill>
+        </p:spPr>
+      </p:sp>
+      <p:sp>
+        <p:nvSpPr>
+          <p:cNvPr id="4" name="Tijdelijke aanduiding voor tekst 3">
+            <a:extLst>
+              <a:ext uri="{FF2B5EF4-FFF2-40B4-BE49-F238E27FC236}">
+                <a16:creationId xmlns:a16="http://schemas.microsoft.com/office/drawing/2014/main" id="{11ACD180-6D93-4985-94B7-080FB372FE66}"/>
+              </a:ext>
+            </a:extLst>
+          </p:cNvPr>
+          <p:cNvSpPr>
+            <a:spLocks noGrp="1"/>
+          </p:cNvSpPr>
+          <p:nvPr>
+            <p:ph type="body" sz="half" idx="2"/>
+          </p:nvPr>
+        </p:nvSpPr>
+        <p:spPr>
+          <a:xfrm>
+            <a:off x="7010400" y="1700808"/>
+            <a:ext cx="4558208" cy="3384376"/>
+          </a:xfrm>
+        </p:spPr>
+        <p:txBody>
+          <a:bodyPr/>
+          <a:lstStyle/>
+          <a:p>
+            <a:r>
+              <a:rPr lang="nl-BE" dirty="0">
+                <a:latin typeface="Consolas" panose="020B0609020204030204" pitchFamily="49" charset="0"/>
+              </a:rPr>
+              <a:t>Login </a:t>
+            </a:r>
+            <a:r>
+              <a:rPr lang="nl-BE" dirty="0" err="1">
+                <a:latin typeface="Consolas" panose="020B0609020204030204" pitchFamily="49" charset="0"/>
+              </a:rPr>
+              <a:t>using</a:t>
+            </a:r>
+            <a:r>
+              <a:rPr lang="nl-BE" dirty="0">
+                <a:latin typeface="Consolas" panose="020B0609020204030204" pitchFamily="49" charset="0"/>
+              </a:rPr>
+              <a:t> </a:t>
+            </a:r>
+            <a:r>
+              <a:rPr lang="nl-BE" dirty="0" err="1">
+                <a:latin typeface="Consolas" panose="020B0609020204030204" pitchFamily="49" charset="0"/>
+              </a:rPr>
+              <a:t>the</a:t>
+            </a:r>
+            <a:r>
+              <a:rPr lang="nl-BE" dirty="0">
+                <a:latin typeface="Consolas" panose="020B0609020204030204" pitchFamily="49" charset="0"/>
+              </a:rPr>
+              <a:t> CLI</a:t>
+            </a:r>
+          </a:p>
+          <a:p>
+            <a:pPr marL="285750" indent="-285750">
+              <a:buFontTx/>
+              <a:buChar char="-"/>
+            </a:pPr>
+            <a:r>
+              <a:rPr lang="nl-BE" dirty="0" err="1">
+                <a:latin typeface="Consolas" panose="020B0609020204030204" pitchFamily="49" charset="0"/>
+              </a:rPr>
+              <a:t>az</a:t>
+            </a:r>
+            <a:r>
+              <a:rPr lang="nl-BE" dirty="0">
+                <a:latin typeface="Consolas" panose="020B0609020204030204" pitchFamily="49" charset="0"/>
+              </a:rPr>
+              <a:t> login </a:t>
+            </a:r>
+          </a:p>
+          <a:p>
+            <a:pPr marL="742950" lvl="1" indent="-285750">
+              <a:buFontTx/>
+              <a:buChar char="-"/>
+            </a:pPr>
+            <a:r>
+              <a:rPr lang="nl-BE" dirty="0" err="1">
+                <a:latin typeface="Consolas" panose="020B0609020204030204" pitchFamily="49" charset="0"/>
+              </a:rPr>
+              <a:t>Opens</a:t>
+            </a:r>
+            <a:r>
+              <a:rPr lang="nl-BE" dirty="0">
+                <a:latin typeface="Consolas" panose="020B0609020204030204" pitchFamily="49" charset="0"/>
+              </a:rPr>
+              <a:t> browser </a:t>
+            </a:r>
+            <a:r>
+              <a:rPr lang="nl-BE" dirty="0" err="1">
+                <a:latin typeface="Consolas" panose="020B0609020204030204" pitchFamily="49" charset="0"/>
+              </a:rPr>
+              <a:t>to</a:t>
+            </a:r>
+            <a:r>
+              <a:rPr lang="nl-BE" dirty="0">
+                <a:latin typeface="Consolas" panose="020B0609020204030204" pitchFamily="49" charset="0"/>
+              </a:rPr>
+              <a:t> login </a:t>
+            </a:r>
+            <a:r>
+              <a:rPr lang="nl-BE" dirty="0" err="1">
+                <a:latin typeface="Consolas" panose="020B0609020204030204" pitchFamily="49" charset="0"/>
+              </a:rPr>
+              <a:t>into</a:t>
+            </a:r>
+            <a:r>
+              <a:rPr lang="nl-BE" dirty="0">
+                <a:latin typeface="Consolas" panose="020B0609020204030204" pitchFamily="49" charset="0"/>
+              </a:rPr>
+              <a:t> </a:t>
+            </a:r>
+            <a:r>
+              <a:rPr lang="nl-BE" dirty="0" err="1">
+                <a:latin typeface="Consolas" panose="020B0609020204030204" pitchFamily="49" charset="0"/>
+              </a:rPr>
+              <a:t>Azure</a:t>
+            </a:r>
+            <a:endParaRPr lang="nl-BE" dirty="0">
+              <a:latin typeface="Consolas" panose="020B0609020204030204" pitchFamily="49" charset="0"/>
+            </a:endParaRPr>
+          </a:p>
+          <a:p>
+            <a:pPr marL="285750" indent="-285750">
+              <a:buFontTx/>
+              <a:buChar char="-"/>
+            </a:pPr>
+            <a:endParaRPr lang="nl-BE" dirty="0">
+              <a:latin typeface="Consolas" panose="020B0609020204030204" pitchFamily="49" charset="0"/>
+            </a:endParaRPr>
+          </a:p>
+          <a:p>
+            <a:pPr marL="285750" indent="-285750">
+              <a:buFontTx/>
+              <a:buChar char="-"/>
+            </a:pPr>
+            <a:endParaRPr lang="nl-BE" dirty="0">
+              <a:latin typeface="Consolas" panose="020B0609020204030204" pitchFamily="49" charset="0"/>
+            </a:endParaRPr>
+          </a:p>
+        </p:txBody>
+      </p:sp>
+      <p:sp>
+        <p:nvSpPr>
+          <p:cNvPr id="5" name="Tijdelijke aanduiding voor tekst 3">
+            <a:extLst>
+              <a:ext uri="{FF2B5EF4-FFF2-40B4-BE49-F238E27FC236}">
+                <a16:creationId xmlns:a16="http://schemas.microsoft.com/office/drawing/2014/main" id="{C81F799A-A64A-4491-A23D-83D21CD6724C}"/>
+              </a:ext>
+            </a:extLst>
+          </p:cNvPr>
+          <p:cNvSpPr txBox="1">
+            <a:spLocks/>
+          </p:cNvSpPr>
+          <p:nvPr/>
+        </p:nvSpPr>
+        <p:spPr>
+          <a:xfrm>
+            <a:off x="1271464" y="2060848"/>
+            <a:ext cx="4824536" cy="2592288"/>
+          </a:xfrm>
+          <a:prstGeom prst="rect">
+            <a:avLst/>
+          </a:prstGeom>
+          <a:solidFill>
+            <a:schemeClr val="accent4">
+              <a:lumMod val="50000"/>
+            </a:schemeClr>
+          </a:solidFill>
+        </p:spPr>
+        <p:txBody>
+          <a:bodyPr vert="horz" lIns="91440" tIns="45720" rIns="91440" bIns="45720" rtlCol="0">
+            <a:normAutofit/>
+          </a:bodyPr>
+          <a:lstStyle>
+            <a:lvl1pPr marL="0" indent="0" algn="l" defTabSz="914400" rtl="0" eaLnBrk="1" latinLnBrk="0" hangingPunct="1">
+              <a:lnSpc>
+                <a:spcPct val="90000"/>
+              </a:lnSpc>
+              <a:spcBef>
+                <a:spcPts val="1200"/>
+              </a:spcBef>
+              <a:buFont typeface="Arial" panose="020B0604020202020204" pitchFamily="34" charset="0"/>
+              <a:buNone/>
+              <a:defRPr sz="1800" kern="1200">
+                <a:solidFill>
+                  <a:schemeClr val="tx1"/>
+                </a:solidFill>
+                <a:latin typeface="+mn-lt"/>
+                <a:ea typeface="+mn-ea"/>
+                <a:cs typeface="+mn-cs"/>
+              </a:defRPr>
+            </a:lvl1pPr>
+            <a:lvl2pPr marL="457200" indent="0" algn="l" defTabSz="914400" rtl="0" eaLnBrk="1" latinLnBrk="0" hangingPunct="1">
+              <a:lnSpc>
+                <a:spcPct val="90000"/>
+              </a:lnSpc>
+              <a:spcBef>
+                <a:spcPts val="1200"/>
+              </a:spcBef>
+              <a:buFont typeface="Arial" panose="020B0604020202020204" pitchFamily="34" charset="0"/>
+              <a:buNone/>
+              <a:defRPr sz="1400" kern="1200">
+                <a:solidFill>
+                  <a:schemeClr val="tx1"/>
+                </a:solidFill>
+                <a:latin typeface="+mn-lt"/>
+                <a:ea typeface="+mn-ea"/>
+                <a:cs typeface="+mn-cs"/>
+              </a:defRPr>
+            </a:lvl2pPr>
+            <a:lvl3pPr marL="914400" indent="0" algn="l" defTabSz="914400" rtl="0" eaLnBrk="1" latinLnBrk="0" hangingPunct="1">
+              <a:lnSpc>
+                <a:spcPct val="90000"/>
+              </a:lnSpc>
+              <a:spcBef>
+                <a:spcPts val="600"/>
+              </a:spcBef>
+              <a:buFont typeface="Arial" panose="020B0604020202020204" pitchFamily="34" charset="0"/>
+              <a:buNone/>
+              <a:defRPr sz="1200" kern="1200">
+                <a:solidFill>
+                  <a:schemeClr val="tx1"/>
+                </a:solidFill>
+                <a:latin typeface="+mn-lt"/>
+                <a:ea typeface="+mn-ea"/>
+                <a:cs typeface="+mn-cs"/>
+              </a:defRPr>
+            </a:lvl3pPr>
+            <a:lvl4pPr marL="1371600" indent="0" algn="l" defTabSz="914400" rtl="0" eaLnBrk="1" latinLnBrk="0" hangingPunct="1">
+              <a:lnSpc>
+                <a:spcPct val="90000"/>
+              </a:lnSpc>
+              <a:spcBef>
+                <a:spcPts val="600"/>
+              </a:spcBef>
+              <a:buFont typeface="Arial" panose="020B0604020202020204" pitchFamily="34" charset="0"/>
+              <a:buNone/>
+              <a:defRPr sz="1000" kern="1200">
+                <a:solidFill>
+                  <a:schemeClr val="tx1"/>
+                </a:solidFill>
+                <a:latin typeface="+mn-lt"/>
+                <a:ea typeface="+mn-ea"/>
+                <a:cs typeface="+mn-cs"/>
+              </a:defRPr>
+            </a:lvl4pPr>
+            <a:lvl5pPr marL="1828800" indent="0" algn="l" defTabSz="914400" rtl="0" eaLnBrk="1" latinLnBrk="0" hangingPunct="1">
+              <a:lnSpc>
+                <a:spcPct val="90000"/>
+              </a:lnSpc>
+              <a:spcBef>
+                <a:spcPts val="600"/>
+              </a:spcBef>
+              <a:buFont typeface="Arial" panose="020B0604020202020204" pitchFamily="34" charset="0"/>
+              <a:buNone/>
+              <a:defRPr sz="1000" kern="1200">
+                <a:solidFill>
+                  <a:schemeClr val="tx1"/>
+                </a:solidFill>
+                <a:latin typeface="+mn-lt"/>
+                <a:ea typeface="+mn-ea"/>
+                <a:cs typeface="+mn-cs"/>
+              </a:defRPr>
+            </a:lvl5pPr>
+            <a:lvl6pPr marL="2286000" indent="0" algn="l" defTabSz="914400" rtl="0" eaLnBrk="1" latinLnBrk="0" hangingPunct="1">
+              <a:lnSpc>
+                <a:spcPct val="90000"/>
+              </a:lnSpc>
+              <a:spcBef>
+                <a:spcPts val="600"/>
+              </a:spcBef>
+              <a:buFont typeface="Arial" panose="020B0604020202020204" pitchFamily="34" charset="0"/>
+              <a:buNone/>
+              <a:defRPr sz="1000" kern="1200">
+                <a:solidFill>
+                  <a:schemeClr val="tx1"/>
+                </a:solidFill>
+                <a:latin typeface="+mn-lt"/>
+                <a:ea typeface="+mn-ea"/>
+                <a:cs typeface="+mn-cs"/>
+              </a:defRPr>
+            </a:lvl6pPr>
+            <a:lvl7pPr marL="2743200" indent="0" algn="l" defTabSz="914400" rtl="0" eaLnBrk="1" latinLnBrk="0" hangingPunct="1">
+              <a:lnSpc>
+                <a:spcPct val="90000"/>
+              </a:lnSpc>
+              <a:spcBef>
+                <a:spcPts val="600"/>
+              </a:spcBef>
+              <a:buFont typeface="Arial" panose="020B0604020202020204" pitchFamily="34" charset="0"/>
+              <a:buNone/>
+              <a:defRPr sz="1000" kern="1200">
+                <a:solidFill>
+                  <a:schemeClr val="tx1"/>
+                </a:solidFill>
+                <a:latin typeface="+mn-lt"/>
+                <a:ea typeface="+mn-ea"/>
+                <a:cs typeface="+mn-cs"/>
+              </a:defRPr>
+            </a:lvl7pPr>
+            <a:lvl8pPr marL="3200400" indent="0" algn="l" defTabSz="914400" rtl="0" eaLnBrk="1" latinLnBrk="0" hangingPunct="1">
+              <a:lnSpc>
+                <a:spcPct val="90000"/>
+              </a:lnSpc>
+              <a:spcBef>
+                <a:spcPts val="600"/>
+              </a:spcBef>
+              <a:buFont typeface="Arial" panose="020B0604020202020204" pitchFamily="34" charset="0"/>
+              <a:buNone/>
+              <a:defRPr sz="1000" kern="1200">
+                <a:solidFill>
+                  <a:schemeClr val="tx1"/>
+                </a:solidFill>
+                <a:latin typeface="+mn-lt"/>
+                <a:ea typeface="+mn-ea"/>
+                <a:cs typeface="+mn-cs"/>
+              </a:defRPr>
+            </a:lvl8pPr>
+            <a:lvl9pPr marL="3657600" indent="0" algn="l" defTabSz="914400" rtl="0" eaLnBrk="1" latinLnBrk="0" hangingPunct="1">
+              <a:lnSpc>
+                <a:spcPct val="90000"/>
+              </a:lnSpc>
+              <a:spcBef>
+                <a:spcPts val="600"/>
+              </a:spcBef>
+              <a:buFont typeface="Arial" panose="020B0604020202020204" pitchFamily="34" charset="0"/>
+              <a:buNone/>
+              <a:defRPr sz="1000" kern="1200">
+                <a:solidFill>
+                  <a:schemeClr val="tx1"/>
+                </a:solidFill>
+                <a:latin typeface="+mn-lt"/>
+                <a:ea typeface="+mn-ea"/>
+                <a:cs typeface="+mn-cs"/>
+              </a:defRPr>
+            </a:lvl9pPr>
+          </a:lstStyle>
+          <a:p>
+            <a:pPr>
+              <a:tabLst>
+                <a:tab pos="360363" algn="l"/>
+              </a:tabLst>
+            </a:pPr>
+            <a:r>
+              <a:rPr lang="nl-BE" dirty="0">
+                <a:solidFill>
+                  <a:schemeClr val="accent4">
+                    <a:lumMod val="40000"/>
+                    <a:lumOff val="60000"/>
+                  </a:schemeClr>
+                </a:solidFill>
+                <a:latin typeface="Consolas" panose="020B0609020204030204" pitchFamily="49" charset="0"/>
+              </a:rPr>
+              <a:t>&gt; </a:t>
+            </a:r>
+            <a:r>
+              <a:rPr lang="nl-BE" dirty="0" err="1">
+                <a:solidFill>
+                  <a:schemeClr val="accent4">
+                    <a:lumMod val="40000"/>
+                    <a:lumOff val="60000"/>
+                  </a:schemeClr>
+                </a:solidFill>
+                <a:latin typeface="Consolas" panose="020B0609020204030204" pitchFamily="49" charset="0"/>
+              </a:rPr>
+              <a:t>az</a:t>
+            </a:r>
+            <a:r>
+              <a:rPr lang="nl-BE" dirty="0">
+                <a:solidFill>
+                  <a:schemeClr val="accent4">
+                    <a:lumMod val="40000"/>
+                    <a:lumOff val="60000"/>
+                  </a:schemeClr>
+                </a:solidFill>
+                <a:latin typeface="Consolas" panose="020B0609020204030204" pitchFamily="49" charset="0"/>
+              </a:rPr>
+              <a:t> login</a:t>
+            </a:r>
+          </a:p>
+        </p:txBody>
+      </p:sp>
+    </p:spTree>
+    <p:extLst>
+      <p:ext uri="{BB962C8B-B14F-4D97-AF65-F5344CB8AC3E}">
+        <p14:creationId xmlns:p14="http://schemas.microsoft.com/office/powerpoint/2010/main" val="1929880379"/>
+      </p:ext>
+    </p:extLst>
+  </p:cSld>
+  <p:clrMapOvr>
+    <a:masterClrMapping/>
+  </p:clrMapOvr>
+  <mc:AlternateContent xmlns:mc="http://schemas.openxmlformats.org/markup-compatibility/2006" xmlns:p14="http://schemas.microsoft.com/office/powerpoint/2010/main">
+    <mc:Choice Requires="p14">
+      <p:transition spd="med" p14:dur="700">
+        <p:fade/>
+      </p:transition>
+    </mc:Choice>
+    <mc:Fallback xmlns="">
+      <p:transition spd="med">
+        <p:fade/>
+      </p:transition>
+    </mc:Fallback>
+  </mc:AlternateContent>
+</p:sld>
+</file>
+
+<file path=ppt/slides/slide11.xml><?xml version="1.0" encoding="utf-8"?>
+<p:sld xmlns:a="http://schemas.openxmlformats.org/drawingml/2006/main" xmlns:r="http://schemas.openxmlformats.org/officeDocument/2006/relationships" xmlns:p="http://schemas.openxmlformats.org/presentationml/2006/main">
+  <p:cSld>
+    <p:spTree>
+      <p:nvGrpSpPr>
+        <p:cNvPr id="1" name=""/>
+        <p:cNvGrpSpPr/>
+        <p:nvPr/>
+      </p:nvGrpSpPr>
+      <p:grpSpPr>
+        <a:xfrm>
+          <a:off x="0" y="0"/>
+          <a:ext cx="0" cy="0"/>
+          <a:chOff x="0" y="0"/>
+          <a:chExt cx="0" cy="0"/>
+        </a:xfrm>
+      </p:grpSpPr>
+      <p:sp>
+        <p:nvSpPr>
+          <p:cNvPr id="2" name="Titel 1">
+            <a:extLst>
+              <a:ext uri="{FF2B5EF4-FFF2-40B4-BE49-F238E27FC236}">
+                <a16:creationId xmlns:a16="http://schemas.microsoft.com/office/drawing/2014/main" id="{4E95B0FF-7F44-4643-8E75-FE04F50ECE92}"/>
+              </a:ext>
+            </a:extLst>
+          </p:cNvPr>
+          <p:cNvSpPr>
+            <a:spLocks noGrp="1"/>
+          </p:cNvSpPr>
+          <p:nvPr>
+            <p:ph type="title"/>
+          </p:nvPr>
+        </p:nvSpPr>
+        <p:spPr/>
+        <p:txBody>
+          <a:bodyPr/>
+          <a:lstStyle/>
+          <a:p>
+            <a:r>
+              <a:rPr lang="nl-BE" dirty="0"/>
+              <a:t>3. </a:t>
+            </a:r>
+            <a:r>
+              <a:rPr lang="nl-BE" dirty="0" err="1"/>
+              <a:t>Create</a:t>
+            </a:r>
+            <a:r>
+              <a:rPr lang="nl-BE" dirty="0"/>
+              <a:t> a backend</a:t>
+            </a:r>
+          </a:p>
+        </p:txBody>
+      </p:sp>
+      <p:sp>
+        <p:nvSpPr>
+          <p:cNvPr id="3" name="Tijdelijke aanduiding voor afbeelding 2">
+            <a:extLst>
+              <a:ext uri="{FF2B5EF4-FFF2-40B4-BE49-F238E27FC236}">
+                <a16:creationId xmlns:a16="http://schemas.microsoft.com/office/drawing/2014/main" id="{DCC62E36-5ACD-4385-B90B-412332C08838}"/>
+              </a:ext>
+            </a:extLst>
+          </p:cNvPr>
+          <p:cNvSpPr>
+            <a:spLocks noGrp="1"/>
+          </p:cNvSpPr>
+          <p:nvPr>
+            <p:ph type="pic" idx="1"/>
+          </p:nvPr>
+        </p:nvSpPr>
+        <p:spPr>
+          <a:xfrm>
+            <a:off x="1055440" y="1874520"/>
+            <a:ext cx="5193089" cy="2937510"/>
+          </a:xfrm>
+          <a:solidFill>
+            <a:schemeClr val="accent4">
+              <a:lumMod val="50000"/>
+            </a:schemeClr>
+          </a:solidFill>
+        </p:spPr>
+      </p:sp>
+      <p:sp>
+        <p:nvSpPr>
+          <p:cNvPr id="4" name="Tijdelijke aanduiding voor tekst 3">
+            <a:extLst>
+              <a:ext uri="{FF2B5EF4-FFF2-40B4-BE49-F238E27FC236}">
+                <a16:creationId xmlns:a16="http://schemas.microsoft.com/office/drawing/2014/main" id="{11ACD180-6D93-4985-94B7-080FB372FE66}"/>
+              </a:ext>
+            </a:extLst>
+          </p:cNvPr>
+          <p:cNvSpPr>
+            <a:spLocks noGrp="1"/>
+          </p:cNvSpPr>
+          <p:nvPr>
+            <p:ph type="body" sz="half" idx="2"/>
+          </p:nvPr>
+        </p:nvSpPr>
+        <p:spPr>
+          <a:xfrm>
+            <a:off x="7010400" y="365126"/>
+            <a:ext cx="4558208" cy="5152106"/>
+          </a:xfrm>
+        </p:spPr>
+        <p:txBody>
+          <a:bodyPr>
+            <a:normAutofit/>
+          </a:bodyPr>
+          <a:lstStyle/>
+          <a:p>
+            <a:r>
+              <a:rPr lang="nl-BE" dirty="0">
+                <a:latin typeface="Consolas" panose="020B0609020204030204" pitchFamily="49" charset="0"/>
+              </a:rPr>
+              <a:t>Backend is </a:t>
+            </a:r>
+            <a:r>
+              <a:rPr lang="nl-BE" dirty="0" err="1">
+                <a:latin typeface="Consolas" panose="020B0609020204030204" pitchFamily="49" charset="0"/>
+              </a:rPr>
+              <a:t>same</a:t>
+            </a:r>
+            <a:r>
+              <a:rPr lang="nl-BE" dirty="0">
+                <a:latin typeface="Consolas" panose="020B0609020204030204" pitchFamily="49" charset="0"/>
+              </a:rPr>
+              <a:t> </a:t>
+            </a:r>
+            <a:r>
+              <a:rPr lang="nl-BE" dirty="0" err="1">
+                <a:latin typeface="Consolas" panose="020B0609020204030204" pitchFamily="49" charset="0"/>
+              </a:rPr>
+              <a:t>for</a:t>
+            </a:r>
+            <a:r>
+              <a:rPr lang="nl-BE" dirty="0">
+                <a:latin typeface="Consolas" panose="020B0609020204030204" pitchFamily="49" charset="0"/>
+              </a:rPr>
+              <a:t> a complete system, </a:t>
+            </a:r>
+            <a:r>
+              <a:rPr lang="nl-BE" dirty="0" err="1">
+                <a:latin typeface="Consolas" panose="020B0609020204030204" pitchFamily="49" charset="0"/>
+              </a:rPr>
+              <a:t>including</a:t>
+            </a:r>
+            <a:r>
+              <a:rPr lang="nl-BE" dirty="0">
+                <a:latin typeface="Consolas" panose="020B0609020204030204" pitchFamily="49" charset="0"/>
+              </a:rPr>
+              <a:t> environments </a:t>
+            </a:r>
+            <a:r>
+              <a:rPr lang="nl-BE" dirty="0" err="1">
+                <a:latin typeface="Consolas" panose="020B0609020204030204" pitchFamily="49" charset="0"/>
+              </a:rPr>
+              <a:t>and</a:t>
+            </a:r>
+            <a:r>
+              <a:rPr lang="nl-BE" dirty="0">
+                <a:latin typeface="Consolas" panose="020B0609020204030204" pitchFamily="49" charset="0"/>
+              </a:rPr>
+              <a:t> multiple </a:t>
+            </a:r>
+            <a:r>
+              <a:rPr lang="nl-BE" dirty="0" err="1">
+                <a:latin typeface="Consolas" panose="020B0609020204030204" pitchFamily="49" charset="0"/>
+              </a:rPr>
+              <a:t>terraform</a:t>
+            </a:r>
+            <a:r>
+              <a:rPr lang="nl-BE" dirty="0">
+                <a:latin typeface="Consolas" panose="020B0609020204030204" pitchFamily="49" charset="0"/>
+              </a:rPr>
+              <a:t> </a:t>
+            </a:r>
+            <a:r>
+              <a:rPr lang="nl-BE" dirty="0" err="1">
+                <a:latin typeface="Consolas" panose="020B0609020204030204" pitchFamily="49" charset="0"/>
+              </a:rPr>
+              <a:t>setups</a:t>
+            </a:r>
+            <a:r>
+              <a:rPr lang="nl-BE" dirty="0">
+                <a:latin typeface="Consolas" panose="020B0609020204030204" pitchFamily="49" charset="0"/>
+              </a:rPr>
+              <a:t>. We </a:t>
+            </a:r>
+            <a:r>
+              <a:rPr lang="nl-BE" dirty="0" err="1">
+                <a:latin typeface="Consolas" panose="020B0609020204030204" pitchFamily="49" charset="0"/>
+              </a:rPr>
+              <a:t>can</a:t>
+            </a:r>
+            <a:r>
+              <a:rPr lang="nl-BE" dirty="0">
+                <a:latin typeface="Consolas" panose="020B0609020204030204" pitchFamily="49" charset="0"/>
+              </a:rPr>
+              <a:t> </a:t>
+            </a:r>
+            <a:r>
+              <a:rPr lang="nl-BE" dirty="0" err="1">
+                <a:latin typeface="Consolas" panose="020B0609020204030204" pitchFamily="49" charset="0"/>
+              </a:rPr>
+              <a:t>thus</a:t>
+            </a:r>
+            <a:r>
+              <a:rPr lang="nl-BE" dirty="0">
+                <a:latin typeface="Consolas" panose="020B0609020204030204" pitchFamily="49" charset="0"/>
+              </a:rPr>
+              <a:t> </a:t>
+            </a:r>
+            <a:r>
+              <a:rPr lang="nl-BE" dirty="0" err="1">
+                <a:latin typeface="Consolas" panose="020B0609020204030204" pitchFamily="49" charset="0"/>
+              </a:rPr>
+              <a:t>create</a:t>
+            </a:r>
+            <a:r>
+              <a:rPr lang="nl-BE" dirty="0">
+                <a:latin typeface="Consolas" panose="020B0609020204030204" pitchFamily="49" charset="0"/>
+              </a:rPr>
+              <a:t> a single “shared” backend.</a:t>
+            </a:r>
+          </a:p>
+          <a:p>
+            <a:endParaRPr lang="nl-BE" dirty="0">
+              <a:latin typeface="Consolas" panose="020B0609020204030204" pitchFamily="49" charset="0"/>
+            </a:endParaRPr>
+          </a:p>
+          <a:p>
+            <a:r>
+              <a:rPr lang="nl-BE" dirty="0">
+                <a:latin typeface="Consolas" panose="020B0609020204030204" pitchFamily="49" charset="0"/>
+              </a:rPr>
+              <a:t>I </a:t>
+            </a:r>
+            <a:r>
+              <a:rPr lang="nl-BE" dirty="0" err="1">
+                <a:latin typeface="Consolas" panose="020B0609020204030204" pitchFamily="49" charset="0"/>
+              </a:rPr>
+              <a:t>created</a:t>
+            </a:r>
+            <a:r>
+              <a:rPr lang="nl-BE" dirty="0">
+                <a:latin typeface="Consolas" panose="020B0609020204030204" pitchFamily="49" charset="0"/>
+              </a:rPr>
+              <a:t> a Resource manager file </a:t>
+            </a:r>
+            <a:r>
+              <a:rPr lang="nl-BE" dirty="0" err="1">
+                <a:latin typeface="Consolas" panose="020B0609020204030204" pitchFamily="49" charset="0"/>
+              </a:rPr>
+              <a:t>to</a:t>
+            </a:r>
+            <a:r>
+              <a:rPr lang="nl-BE" dirty="0">
+                <a:latin typeface="Consolas" panose="020B0609020204030204" pitchFamily="49" charset="0"/>
+              </a:rPr>
+              <a:t> </a:t>
+            </a:r>
+            <a:r>
+              <a:rPr lang="nl-BE" dirty="0" err="1">
+                <a:latin typeface="Consolas" panose="020B0609020204030204" pitchFamily="49" charset="0"/>
+              </a:rPr>
+              <a:t>automate</a:t>
+            </a:r>
+            <a:r>
+              <a:rPr lang="nl-BE" dirty="0">
+                <a:latin typeface="Consolas" panose="020B0609020204030204" pitchFamily="49" charset="0"/>
+              </a:rPr>
+              <a:t> </a:t>
+            </a:r>
+            <a:r>
+              <a:rPr lang="nl-BE" dirty="0" err="1">
+                <a:latin typeface="Consolas" panose="020B0609020204030204" pitchFamily="49" charset="0"/>
+              </a:rPr>
+              <a:t>this</a:t>
+            </a:r>
+            <a:r>
+              <a:rPr lang="nl-BE" dirty="0">
+                <a:latin typeface="Consolas" panose="020B0609020204030204" pitchFamily="49" charset="0"/>
+              </a:rPr>
+              <a:t>, but </a:t>
+            </a:r>
+            <a:r>
+              <a:rPr lang="nl-BE" dirty="0" err="1">
+                <a:latin typeface="Consolas" panose="020B0609020204030204" pitchFamily="49" charset="0"/>
+              </a:rPr>
+              <a:t>it</a:t>
+            </a:r>
+            <a:r>
+              <a:rPr lang="nl-BE" dirty="0">
+                <a:latin typeface="Consolas" panose="020B0609020204030204" pitchFamily="49" charset="0"/>
+              </a:rPr>
+              <a:t> is </a:t>
+            </a:r>
+            <a:r>
+              <a:rPr lang="nl-BE" dirty="0" err="1">
+                <a:latin typeface="Consolas" panose="020B0609020204030204" pitchFamily="49" charset="0"/>
+              </a:rPr>
+              <a:t>nothing</a:t>
+            </a:r>
+            <a:r>
+              <a:rPr lang="nl-BE" dirty="0">
+                <a:latin typeface="Consolas" panose="020B0609020204030204" pitchFamily="49" charset="0"/>
+              </a:rPr>
+              <a:t> more </a:t>
+            </a:r>
+            <a:r>
+              <a:rPr lang="nl-BE" dirty="0" err="1">
+                <a:latin typeface="Consolas" panose="020B0609020204030204" pitchFamily="49" charset="0"/>
+              </a:rPr>
+              <a:t>than</a:t>
+            </a:r>
+            <a:r>
+              <a:rPr lang="nl-BE" dirty="0">
+                <a:latin typeface="Consolas" panose="020B0609020204030204" pitchFamily="49" charset="0"/>
+              </a:rPr>
+              <a:t> </a:t>
+            </a:r>
+            <a:r>
+              <a:rPr lang="nl-BE" dirty="0" err="1">
+                <a:latin typeface="Consolas" panose="020B0609020204030204" pitchFamily="49" charset="0"/>
+              </a:rPr>
+              <a:t>creating</a:t>
+            </a:r>
+            <a:r>
+              <a:rPr lang="nl-BE" dirty="0">
+                <a:latin typeface="Consolas" panose="020B0609020204030204" pitchFamily="49" charset="0"/>
+              </a:rPr>
+              <a:t> a resource </a:t>
+            </a:r>
+            <a:r>
+              <a:rPr lang="nl-BE" dirty="0" err="1">
+                <a:latin typeface="Consolas" panose="020B0609020204030204" pitchFamily="49" charset="0"/>
+              </a:rPr>
+              <a:t>group</a:t>
+            </a:r>
+            <a:r>
+              <a:rPr lang="nl-BE" dirty="0">
+                <a:latin typeface="Consolas" panose="020B0609020204030204" pitchFamily="49" charset="0"/>
+              </a:rPr>
+              <a:t>, storage account </a:t>
+            </a:r>
+            <a:r>
+              <a:rPr lang="nl-BE" dirty="0" err="1">
+                <a:latin typeface="Consolas" panose="020B0609020204030204" pitchFamily="49" charset="0"/>
+              </a:rPr>
+              <a:t>and</a:t>
+            </a:r>
+            <a:r>
+              <a:rPr lang="nl-BE" dirty="0">
+                <a:latin typeface="Consolas" panose="020B0609020204030204" pitchFamily="49" charset="0"/>
+              </a:rPr>
+              <a:t> a </a:t>
+            </a:r>
+            <a:r>
+              <a:rPr lang="nl-BE" dirty="0" err="1">
+                <a:latin typeface="Consolas" panose="020B0609020204030204" pitchFamily="49" charset="0"/>
+              </a:rPr>
+              <a:t>key</a:t>
+            </a:r>
+            <a:r>
+              <a:rPr lang="nl-BE" dirty="0">
+                <a:latin typeface="Consolas" panose="020B0609020204030204" pitchFamily="49" charset="0"/>
+              </a:rPr>
+              <a:t> </a:t>
+            </a:r>
+            <a:r>
+              <a:rPr lang="nl-BE" dirty="0" err="1">
+                <a:latin typeface="Consolas" panose="020B0609020204030204" pitchFamily="49" charset="0"/>
+              </a:rPr>
+              <a:t>vault</a:t>
+            </a:r>
+            <a:r>
+              <a:rPr lang="nl-BE" dirty="0">
+                <a:latin typeface="Consolas" panose="020B0609020204030204" pitchFamily="49" charset="0"/>
+              </a:rPr>
+              <a:t> </a:t>
+            </a:r>
+            <a:r>
+              <a:rPr lang="nl-BE" dirty="0" err="1">
+                <a:latin typeface="Consolas" panose="020B0609020204030204" pitchFamily="49" charset="0"/>
+              </a:rPr>
+              <a:t>containing</a:t>
+            </a:r>
+            <a:r>
+              <a:rPr lang="nl-BE" dirty="0">
+                <a:latin typeface="Consolas" panose="020B0609020204030204" pitchFamily="49" charset="0"/>
+              </a:rPr>
+              <a:t> </a:t>
+            </a:r>
+            <a:r>
+              <a:rPr lang="nl-BE" dirty="0" err="1">
+                <a:latin typeface="Consolas" panose="020B0609020204030204" pitchFamily="49" charset="0"/>
+              </a:rPr>
+              <a:t>connection</a:t>
+            </a:r>
+            <a:r>
+              <a:rPr lang="nl-BE" dirty="0">
+                <a:latin typeface="Consolas" panose="020B0609020204030204" pitchFamily="49" charset="0"/>
+              </a:rPr>
+              <a:t> strings.</a:t>
+            </a:r>
+          </a:p>
+          <a:p>
+            <a:endParaRPr lang="nl-BE" dirty="0">
+              <a:latin typeface="Consolas" panose="020B0609020204030204" pitchFamily="49" charset="0"/>
+            </a:endParaRPr>
+          </a:p>
+          <a:p>
+            <a:r>
+              <a:rPr lang="nl-BE" dirty="0" err="1">
+                <a:latin typeface="Consolas" panose="020B0609020204030204" pitchFamily="49" charset="0"/>
+              </a:rPr>
+              <a:t>When</a:t>
+            </a:r>
+            <a:r>
+              <a:rPr lang="nl-BE" dirty="0">
+                <a:latin typeface="Consolas" panose="020B0609020204030204" pitchFamily="49" charset="0"/>
+              </a:rPr>
+              <a:t> </a:t>
+            </a:r>
+            <a:r>
+              <a:rPr lang="nl-BE" dirty="0" err="1">
+                <a:latin typeface="Consolas" panose="020B0609020204030204" pitchFamily="49" charset="0"/>
+              </a:rPr>
+              <a:t>it</a:t>
+            </a:r>
+            <a:r>
+              <a:rPr lang="nl-BE" dirty="0">
+                <a:latin typeface="Consolas" panose="020B0609020204030204" pitchFamily="49" charset="0"/>
+              </a:rPr>
+              <a:t> </a:t>
+            </a:r>
+            <a:r>
+              <a:rPr lang="nl-BE" dirty="0" err="1">
+                <a:latin typeface="Consolas" panose="020B0609020204030204" pitchFamily="49" charset="0"/>
+              </a:rPr>
+              <a:t>asks</a:t>
+            </a:r>
+            <a:r>
+              <a:rPr lang="nl-BE" dirty="0">
+                <a:latin typeface="Consolas" panose="020B0609020204030204" pitchFamily="49" charset="0"/>
+              </a:rPr>
+              <a:t> </a:t>
+            </a:r>
+            <a:r>
+              <a:rPr lang="nl-BE" dirty="0" err="1">
+                <a:latin typeface="Consolas" panose="020B0609020204030204" pitchFamily="49" charset="0"/>
+              </a:rPr>
+              <a:t>for</a:t>
+            </a:r>
+            <a:r>
+              <a:rPr lang="nl-BE" dirty="0">
+                <a:latin typeface="Consolas" panose="020B0609020204030204" pitchFamily="49" charset="0"/>
+              </a:rPr>
+              <a:t> a “</a:t>
+            </a:r>
+            <a:r>
+              <a:rPr lang="nl-BE" dirty="0" err="1">
+                <a:latin typeface="Consolas" panose="020B0609020204030204" pitchFamily="49" charset="0"/>
+              </a:rPr>
+              <a:t>keyVaultOwnerId</a:t>
+            </a:r>
+            <a:r>
+              <a:rPr lang="nl-BE" dirty="0">
+                <a:latin typeface="Consolas" panose="020B0609020204030204" pitchFamily="49" charset="0"/>
+              </a:rPr>
+              <a:t>”, </a:t>
+            </a:r>
+            <a:r>
+              <a:rPr lang="nl-BE" dirty="0" err="1">
+                <a:latin typeface="Consolas" panose="020B0609020204030204" pitchFamily="49" charset="0"/>
+              </a:rPr>
+              <a:t>lookup</a:t>
+            </a:r>
+            <a:r>
+              <a:rPr lang="nl-BE" dirty="0">
+                <a:latin typeface="Consolas" panose="020B0609020204030204" pitchFamily="49" charset="0"/>
+              </a:rPr>
+              <a:t> </a:t>
+            </a:r>
+            <a:r>
+              <a:rPr lang="nl-BE" dirty="0" err="1">
+                <a:latin typeface="Consolas" panose="020B0609020204030204" pitchFamily="49" charset="0"/>
+              </a:rPr>
+              <a:t>your</a:t>
+            </a:r>
+            <a:r>
+              <a:rPr lang="nl-BE" dirty="0">
+                <a:latin typeface="Consolas" panose="020B0609020204030204" pitchFamily="49" charset="0"/>
+              </a:rPr>
+              <a:t> </a:t>
+            </a:r>
+            <a:r>
+              <a:rPr lang="nl-BE" dirty="0" err="1">
+                <a:latin typeface="Consolas" panose="020B0609020204030204" pitchFamily="49" charset="0"/>
+              </a:rPr>
+              <a:t>own</a:t>
+            </a:r>
+            <a:r>
+              <a:rPr lang="nl-BE" dirty="0">
+                <a:latin typeface="Consolas" panose="020B0609020204030204" pitchFamily="49" charset="0"/>
+              </a:rPr>
+              <a:t> object </a:t>
+            </a:r>
+            <a:r>
+              <a:rPr lang="nl-BE" dirty="0" err="1">
+                <a:latin typeface="Consolas" panose="020B0609020204030204" pitchFamily="49" charset="0"/>
+              </a:rPr>
+              <a:t>id</a:t>
+            </a:r>
+            <a:r>
+              <a:rPr lang="nl-BE" dirty="0">
+                <a:latin typeface="Consolas" panose="020B0609020204030204" pitchFamily="49" charset="0"/>
+              </a:rPr>
+              <a:t> in </a:t>
+            </a:r>
+            <a:r>
+              <a:rPr lang="nl-BE" dirty="0" err="1">
+                <a:latin typeface="Consolas" panose="020B0609020204030204" pitchFamily="49" charset="0"/>
+              </a:rPr>
+              <a:t>the</a:t>
+            </a:r>
+            <a:r>
+              <a:rPr lang="nl-BE" dirty="0">
+                <a:latin typeface="Consolas" panose="020B0609020204030204" pitchFamily="49" charset="0"/>
+              </a:rPr>
+              <a:t> </a:t>
+            </a:r>
+            <a:r>
+              <a:rPr lang="nl-BE" dirty="0" err="1">
+                <a:latin typeface="Consolas" panose="020B0609020204030204" pitchFamily="49" charset="0"/>
+              </a:rPr>
+              <a:t>azure</a:t>
+            </a:r>
+            <a:r>
+              <a:rPr lang="nl-BE" dirty="0">
+                <a:latin typeface="Consolas" panose="020B0609020204030204" pitchFamily="49" charset="0"/>
+              </a:rPr>
+              <a:t> ad </a:t>
+            </a:r>
+            <a:r>
+              <a:rPr lang="nl-BE" dirty="0" err="1">
+                <a:latin typeface="Consolas" panose="020B0609020204030204" pitchFamily="49" charset="0"/>
+              </a:rPr>
+              <a:t>and</a:t>
+            </a:r>
+            <a:r>
+              <a:rPr lang="nl-BE" dirty="0">
+                <a:latin typeface="Consolas" panose="020B0609020204030204" pitchFamily="49" charset="0"/>
+              </a:rPr>
+              <a:t> </a:t>
+            </a:r>
+            <a:r>
+              <a:rPr lang="nl-BE" dirty="0" err="1">
+                <a:latin typeface="Consolas" panose="020B0609020204030204" pitchFamily="49" charset="0"/>
+              </a:rPr>
+              <a:t>supply</a:t>
+            </a:r>
+            <a:r>
+              <a:rPr lang="nl-BE" dirty="0">
+                <a:latin typeface="Consolas" panose="020B0609020204030204" pitchFamily="49" charset="0"/>
+              </a:rPr>
+              <a:t> </a:t>
+            </a:r>
+            <a:r>
+              <a:rPr lang="nl-BE" dirty="0" err="1">
+                <a:latin typeface="Consolas" panose="020B0609020204030204" pitchFamily="49" charset="0"/>
+              </a:rPr>
+              <a:t>this</a:t>
+            </a:r>
+            <a:endParaRPr lang="nl-BE" dirty="0">
+              <a:latin typeface="Consolas" panose="020B0609020204030204" pitchFamily="49" charset="0"/>
+            </a:endParaRPr>
+          </a:p>
+          <a:p>
+            <a:pPr marL="285750" indent="-285750">
+              <a:buFontTx/>
+              <a:buChar char="-"/>
+            </a:pPr>
+            <a:endParaRPr lang="nl-BE" dirty="0">
+              <a:latin typeface="Consolas" panose="020B0609020204030204" pitchFamily="49" charset="0"/>
+            </a:endParaRPr>
+          </a:p>
+        </p:txBody>
+      </p:sp>
+      <p:sp>
+        <p:nvSpPr>
+          <p:cNvPr id="5" name="Tijdelijke aanduiding voor tekst 3">
+            <a:extLst>
+              <a:ext uri="{FF2B5EF4-FFF2-40B4-BE49-F238E27FC236}">
+                <a16:creationId xmlns:a16="http://schemas.microsoft.com/office/drawing/2014/main" id="{C81F799A-A64A-4491-A23D-83D21CD6724C}"/>
+              </a:ext>
+            </a:extLst>
+          </p:cNvPr>
+          <p:cNvSpPr txBox="1">
+            <a:spLocks/>
+          </p:cNvSpPr>
+          <p:nvPr/>
+        </p:nvSpPr>
+        <p:spPr>
+          <a:xfrm>
+            <a:off x="1271464" y="2060848"/>
+            <a:ext cx="4824536" cy="2592288"/>
+          </a:xfrm>
+          <a:prstGeom prst="rect">
+            <a:avLst/>
+          </a:prstGeom>
+          <a:solidFill>
+            <a:schemeClr val="accent4">
+              <a:lumMod val="50000"/>
+            </a:schemeClr>
+          </a:solidFill>
+        </p:spPr>
+        <p:txBody>
+          <a:bodyPr vert="horz" lIns="91440" tIns="45720" rIns="91440" bIns="45720" rtlCol="0">
+            <a:normAutofit/>
+          </a:bodyPr>
+          <a:lstStyle>
+            <a:lvl1pPr marL="0" indent="0" algn="l" defTabSz="914400" rtl="0" eaLnBrk="1" latinLnBrk="0" hangingPunct="1">
+              <a:lnSpc>
+                <a:spcPct val="90000"/>
+              </a:lnSpc>
+              <a:spcBef>
+                <a:spcPts val="1200"/>
+              </a:spcBef>
+              <a:buFont typeface="Arial" panose="020B0604020202020204" pitchFamily="34" charset="0"/>
+              <a:buNone/>
+              <a:defRPr sz="1800" kern="1200">
+                <a:solidFill>
+                  <a:schemeClr val="tx1"/>
+                </a:solidFill>
+                <a:latin typeface="+mn-lt"/>
+                <a:ea typeface="+mn-ea"/>
+                <a:cs typeface="+mn-cs"/>
+              </a:defRPr>
+            </a:lvl1pPr>
+            <a:lvl2pPr marL="457200" indent="0" algn="l" defTabSz="914400" rtl="0" eaLnBrk="1" latinLnBrk="0" hangingPunct="1">
+              <a:lnSpc>
+                <a:spcPct val="90000"/>
+              </a:lnSpc>
+              <a:spcBef>
+                <a:spcPts val="1200"/>
+              </a:spcBef>
+              <a:buFont typeface="Arial" panose="020B0604020202020204" pitchFamily="34" charset="0"/>
+              <a:buNone/>
+              <a:defRPr sz="1400" kern="1200">
+                <a:solidFill>
+                  <a:schemeClr val="tx1"/>
+                </a:solidFill>
+                <a:latin typeface="+mn-lt"/>
+                <a:ea typeface="+mn-ea"/>
+                <a:cs typeface="+mn-cs"/>
+              </a:defRPr>
+            </a:lvl2pPr>
+            <a:lvl3pPr marL="914400" indent="0" algn="l" defTabSz="914400" rtl="0" eaLnBrk="1" latinLnBrk="0" hangingPunct="1">
+              <a:lnSpc>
+                <a:spcPct val="90000"/>
+              </a:lnSpc>
+              <a:spcBef>
+                <a:spcPts val="600"/>
+              </a:spcBef>
+              <a:buFont typeface="Arial" panose="020B0604020202020204" pitchFamily="34" charset="0"/>
+              <a:buNone/>
+              <a:defRPr sz="1200" kern="1200">
+                <a:solidFill>
+                  <a:schemeClr val="tx1"/>
+                </a:solidFill>
+                <a:latin typeface="+mn-lt"/>
+                <a:ea typeface="+mn-ea"/>
+                <a:cs typeface="+mn-cs"/>
+              </a:defRPr>
+            </a:lvl3pPr>
+            <a:lvl4pPr marL="1371600" indent="0" algn="l" defTabSz="914400" rtl="0" eaLnBrk="1" latinLnBrk="0" hangingPunct="1">
+              <a:lnSpc>
+                <a:spcPct val="90000"/>
+              </a:lnSpc>
+              <a:spcBef>
+                <a:spcPts val="600"/>
+              </a:spcBef>
+              <a:buFont typeface="Arial" panose="020B0604020202020204" pitchFamily="34" charset="0"/>
+              <a:buNone/>
+              <a:defRPr sz="1000" kern="1200">
+                <a:solidFill>
+                  <a:schemeClr val="tx1"/>
+                </a:solidFill>
+                <a:latin typeface="+mn-lt"/>
+                <a:ea typeface="+mn-ea"/>
+                <a:cs typeface="+mn-cs"/>
+              </a:defRPr>
+            </a:lvl4pPr>
+            <a:lvl5pPr marL="1828800" indent="0" algn="l" defTabSz="914400" rtl="0" eaLnBrk="1" latinLnBrk="0" hangingPunct="1">
+              <a:lnSpc>
+                <a:spcPct val="90000"/>
+              </a:lnSpc>
+              <a:spcBef>
+                <a:spcPts val="600"/>
+              </a:spcBef>
+              <a:buFont typeface="Arial" panose="020B0604020202020204" pitchFamily="34" charset="0"/>
+              <a:buNone/>
+              <a:defRPr sz="1000" kern="1200">
+                <a:solidFill>
+                  <a:schemeClr val="tx1"/>
+                </a:solidFill>
+                <a:latin typeface="+mn-lt"/>
+                <a:ea typeface="+mn-ea"/>
+                <a:cs typeface="+mn-cs"/>
+              </a:defRPr>
+            </a:lvl5pPr>
+            <a:lvl6pPr marL="2286000" indent="0" algn="l" defTabSz="914400" rtl="0" eaLnBrk="1" latinLnBrk="0" hangingPunct="1">
+              <a:lnSpc>
+                <a:spcPct val="90000"/>
+              </a:lnSpc>
+              <a:spcBef>
+                <a:spcPts val="600"/>
+              </a:spcBef>
+              <a:buFont typeface="Arial" panose="020B0604020202020204" pitchFamily="34" charset="0"/>
+              <a:buNone/>
+              <a:defRPr sz="1000" kern="1200">
+                <a:solidFill>
+                  <a:schemeClr val="tx1"/>
+                </a:solidFill>
+                <a:latin typeface="+mn-lt"/>
+                <a:ea typeface="+mn-ea"/>
+                <a:cs typeface="+mn-cs"/>
+              </a:defRPr>
+            </a:lvl6pPr>
+            <a:lvl7pPr marL="2743200" indent="0" algn="l" defTabSz="914400" rtl="0" eaLnBrk="1" latinLnBrk="0" hangingPunct="1">
+              <a:lnSpc>
+                <a:spcPct val="90000"/>
+              </a:lnSpc>
+              <a:spcBef>
+                <a:spcPts val="600"/>
+              </a:spcBef>
+              <a:buFont typeface="Arial" panose="020B0604020202020204" pitchFamily="34" charset="0"/>
+              <a:buNone/>
+              <a:defRPr sz="1000" kern="1200">
+                <a:solidFill>
+                  <a:schemeClr val="tx1"/>
+                </a:solidFill>
+                <a:latin typeface="+mn-lt"/>
+                <a:ea typeface="+mn-ea"/>
+                <a:cs typeface="+mn-cs"/>
+              </a:defRPr>
+            </a:lvl7pPr>
+            <a:lvl8pPr marL="3200400" indent="0" algn="l" defTabSz="914400" rtl="0" eaLnBrk="1" latinLnBrk="0" hangingPunct="1">
+              <a:lnSpc>
+                <a:spcPct val="90000"/>
+              </a:lnSpc>
+              <a:spcBef>
+                <a:spcPts val="600"/>
+              </a:spcBef>
+              <a:buFont typeface="Arial" panose="020B0604020202020204" pitchFamily="34" charset="0"/>
+              <a:buNone/>
+              <a:defRPr sz="1000" kern="1200">
+                <a:solidFill>
+                  <a:schemeClr val="tx1"/>
+                </a:solidFill>
+                <a:latin typeface="+mn-lt"/>
+                <a:ea typeface="+mn-ea"/>
+                <a:cs typeface="+mn-cs"/>
+              </a:defRPr>
+            </a:lvl8pPr>
+            <a:lvl9pPr marL="3657600" indent="0" algn="l" defTabSz="914400" rtl="0" eaLnBrk="1" latinLnBrk="0" hangingPunct="1">
+              <a:lnSpc>
+                <a:spcPct val="90000"/>
+              </a:lnSpc>
+              <a:spcBef>
+                <a:spcPts val="600"/>
+              </a:spcBef>
+              <a:buFont typeface="Arial" panose="020B0604020202020204" pitchFamily="34" charset="0"/>
+              <a:buNone/>
+              <a:defRPr sz="1000" kern="1200">
+                <a:solidFill>
+                  <a:schemeClr val="tx1"/>
+                </a:solidFill>
+                <a:latin typeface="+mn-lt"/>
+                <a:ea typeface="+mn-ea"/>
+                <a:cs typeface="+mn-cs"/>
+              </a:defRPr>
+            </a:lvl9pPr>
+          </a:lstStyle>
+          <a:p>
+            <a:pPr>
+              <a:tabLst>
+                <a:tab pos="360363" algn="l"/>
+              </a:tabLst>
+            </a:pPr>
+            <a:r>
+              <a:rPr lang="nl-BE" dirty="0">
+                <a:solidFill>
+                  <a:schemeClr val="accent4">
+                    <a:lumMod val="40000"/>
+                    <a:lumOff val="60000"/>
+                  </a:schemeClr>
+                </a:solidFill>
+                <a:latin typeface="Consolas" panose="020B0609020204030204" pitchFamily="49" charset="0"/>
+              </a:rPr>
+              <a:t>&gt; </a:t>
+            </a:r>
+            <a:r>
+              <a:rPr lang="en-US" dirty="0" err="1">
+                <a:solidFill>
+                  <a:schemeClr val="accent4">
+                    <a:lumMod val="40000"/>
+                    <a:lumOff val="60000"/>
+                  </a:schemeClr>
+                </a:solidFill>
+                <a:latin typeface="Consolas" panose="020B0609020204030204" pitchFamily="49" charset="0"/>
+              </a:rPr>
+              <a:t>az</a:t>
+            </a:r>
+            <a:r>
+              <a:rPr lang="en-US" dirty="0">
+                <a:solidFill>
+                  <a:schemeClr val="accent4">
+                    <a:lumMod val="40000"/>
+                    <a:lumOff val="60000"/>
+                  </a:schemeClr>
+                </a:solidFill>
+                <a:latin typeface="Consolas" panose="020B0609020204030204" pitchFamily="49" charset="0"/>
+              </a:rPr>
+              <a:t> group create -l </a:t>
+            </a:r>
+            <a:r>
+              <a:rPr lang="en-US" dirty="0" err="1">
+                <a:solidFill>
+                  <a:schemeClr val="accent4">
+                    <a:lumMod val="40000"/>
+                    <a:lumOff val="60000"/>
+                  </a:schemeClr>
+                </a:solidFill>
+                <a:latin typeface="Consolas" panose="020B0609020204030204" pitchFamily="49" charset="0"/>
+              </a:rPr>
+              <a:t>westeurope</a:t>
+            </a:r>
+            <a:r>
+              <a:rPr lang="en-US" dirty="0">
+                <a:solidFill>
+                  <a:schemeClr val="accent4">
+                    <a:lumMod val="40000"/>
+                    <a:lumOff val="60000"/>
+                  </a:schemeClr>
+                </a:solidFill>
+                <a:latin typeface="Consolas" panose="020B0609020204030204" pitchFamily="49" charset="0"/>
+              </a:rPr>
+              <a:t> -n </a:t>
+            </a:r>
+            <a:r>
+              <a:rPr lang="en-US" dirty="0" err="1">
+                <a:solidFill>
+                  <a:schemeClr val="accent4">
+                    <a:lumMod val="40000"/>
+                    <a:lumOff val="60000"/>
+                  </a:schemeClr>
+                </a:solidFill>
+                <a:latin typeface="Consolas" panose="020B0609020204030204" pitchFamily="49" charset="0"/>
+              </a:rPr>
+              <a:t>demoTerraformBackend</a:t>
+            </a:r>
+            <a:endParaRPr lang="en-US" dirty="0">
+              <a:solidFill>
+                <a:schemeClr val="accent4">
+                  <a:lumMod val="40000"/>
+                  <a:lumOff val="60000"/>
+                </a:schemeClr>
+              </a:solidFill>
+              <a:latin typeface="Consolas" panose="020B0609020204030204" pitchFamily="49" charset="0"/>
+            </a:endParaRPr>
+          </a:p>
+          <a:p>
+            <a:pPr>
+              <a:tabLst>
+                <a:tab pos="360363" algn="l"/>
+              </a:tabLst>
+            </a:pPr>
+            <a:endParaRPr lang="nl-BE" dirty="0">
+              <a:solidFill>
+                <a:schemeClr val="accent4">
+                  <a:lumMod val="40000"/>
+                  <a:lumOff val="60000"/>
+                </a:schemeClr>
+              </a:solidFill>
+              <a:latin typeface="Consolas" panose="020B0609020204030204" pitchFamily="49" charset="0"/>
+            </a:endParaRPr>
+          </a:p>
+          <a:p>
+            <a:pPr>
+              <a:tabLst>
+                <a:tab pos="360363" algn="l"/>
+              </a:tabLst>
+            </a:pPr>
+            <a:r>
+              <a:rPr lang="nl-BE" dirty="0">
+                <a:solidFill>
+                  <a:schemeClr val="accent4">
+                    <a:lumMod val="40000"/>
+                    <a:lumOff val="60000"/>
+                  </a:schemeClr>
+                </a:solidFill>
+                <a:latin typeface="Consolas" panose="020B0609020204030204" pitchFamily="49" charset="0"/>
+              </a:rPr>
+              <a:t>&gt; </a:t>
+            </a:r>
+            <a:r>
+              <a:rPr lang="nl-BE" dirty="0" err="1">
+                <a:solidFill>
+                  <a:schemeClr val="accent4">
+                    <a:lumMod val="40000"/>
+                    <a:lumOff val="60000"/>
+                  </a:schemeClr>
+                </a:solidFill>
+                <a:latin typeface="Consolas" panose="020B0609020204030204" pitchFamily="49" charset="0"/>
+              </a:rPr>
+              <a:t>az</a:t>
+            </a:r>
+            <a:r>
+              <a:rPr lang="nl-BE" dirty="0">
+                <a:solidFill>
+                  <a:schemeClr val="accent4">
+                    <a:lumMod val="40000"/>
+                    <a:lumOff val="60000"/>
+                  </a:schemeClr>
+                </a:solidFill>
+                <a:latin typeface="Consolas" panose="020B0609020204030204" pitchFamily="49" charset="0"/>
+              </a:rPr>
+              <a:t> </a:t>
+            </a:r>
+            <a:r>
+              <a:rPr lang="nl-BE" dirty="0" err="1">
+                <a:solidFill>
+                  <a:schemeClr val="accent4">
+                    <a:lumMod val="40000"/>
+                    <a:lumOff val="60000"/>
+                  </a:schemeClr>
+                </a:solidFill>
+                <a:latin typeface="Consolas" panose="020B0609020204030204" pitchFamily="49" charset="0"/>
+              </a:rPr>
+              <a:t>deployment</a:t>
+            </a:r>
+            <a:r>
+              <a:rPr lang="nl-BE" dirty="0">
+                <a:solidFill>
+                  <a:schemeClr val="accent4">
+                    <a:lumMod val="40000"/>
+                    <a:lumOff val="60000"/>
+                  </a:schemeClr>
+                </a:solidFill>
+                <a:latin typeface="Consolas" panose="020B0609020204030204" pitchFamily="49" charset="0"/>
+              </a:rPr>
+              <a:t> </a:t>
+            </a:r>
+            <a:r>
+              <a:rPr lang="nl-BE" dirty="0" err="1">
+                <a:solidFill>
+                  <a:schemeClr val="accent4">
+                    <a:lumMod val="40000"/>
+                    <a:lumOff val="60000"/>
+                  </a:schemeClr>
+                </a:solidFill>
+                <a:latin typeface="Consolas" panose="020B0609020204030204" pitchFamily="49" charset="0"/>
+              </a:rPr>
+              <a:t>group</a:t>
+            </a:r>
+            <a:r>
+              <a:rPr lang="nl-BE" dirty="0">
+                <a:solidFill>
+                  <a:schemeClr val="accent4">
+                    <a:lumMod val="40000"/>
+                    <a:lumOff val="60000"/>
+                  </a:schemeClr>
+                </a:solidFill>
+                <a:latin typeface="Consolas" panose="020B0609020204030204" pitchFamily="49" charset="0"/>
+              </a:rPr>
+              <a:t> </a:t>
+            </a:r>
+            <a:r>
+              <a:rPr lang="nl-BE" dirty="0" err="1">
+                <a:solidFill>
+                  <a:schemeClr val="accent4">
+                    <a:lumMod val="40000"/>
+                    <a:lumOff val="60000"/>
+                  </a:schemeClr>
+                </a:solidFill>
+                <a:latin typeface="Consolas" panose="020B0609020204030204" pitchFamily="49" charset="0"/>
+              </a:rPr>
+              <a:t>create</a:t>
+            </a:r>
+            <a:r>
+              <a:rPr lang="nl-BE" dirty="0">
+                <a:solidFill>
+                  <a:schemeClr val="accent4">
+                    <a:lumMod val="40000"/>
+                    <a:lumOff val="60000"/>
+                  </a:schemeClr>
+                </a:solidFill>
+                <a:latin typeface="Consolas" panose="020B0609020204030204" pitchFamily="49" charset="0"/>
+              </a:rPr>
+              <a:t> --name Deploy-30-04-2021 --resource-</a:t>
+            </a:r>
+            <a:r>
+              <a:rPr lang="nl-BE" dirty="0" err="1">
+                <a:solidFill>
+                  <a:schemeClr val="accent4">
+                    <a:lumMod val="40000"/>
+                    <a:lumOff val="60000"/>
+                  </a:schemeClr>
+                </a:solidFill>
+                <a:latin typeface="Consolas" panose="020B0609020204030204" pitchFamily="49" charset="0"/>
+              </a:rPr>
+              <a:t>group</a:t>
+            </a:r>
+            <a:r>
+              <a:rPr lang="nl-BE" dirty="0">
+                <a:solidFill>
+                  <a:schemeClr val="accent4">
+                    <a:lumMod val="40000"/>
+                    <a:lumOff val="60000"/>
+                  </a:schemeClr>
+                </a:solidFill>
+                <a:latin typeface="Consolas" panose="020B0609020204030204" pitchFamily="49" charset="0"/>
+              </a:rPr>
+              <a:t> </a:t>
+            </a:r>
+            <a:r>
+              <a:rPr lang="nl-BE" dirty="0" err="1">
+                <a:solidFill>
+                  <a:schemeClr val="accent4">
+                    <a:lumMod val="40000"/>
+                    <a:lumOff val="60000"/>
+                  </a:schemeClr>
+                </a:solidFill>
+                <a:latin typeface="Consolas" panose="020B0609020204030204" pitchFamily="49" charset="0"/>
+              </a:rPr>
+              <a:t>demoTerraformBackend</a:t>
+            </a:r>
+            <a:r>
+              <a:rPr lang="nl-BE" dirty="0">
+                <a:solidFill>
+                  <a:schemeClr val="accent4">
+                    <a:lumMod val="40000"/>
+                    <a:lumOff val="60000"/>
+                  </a:schemeClr>
+                </a:solidFill>
+                <a:latin typeface="Consolas" panose="020B0609020204030204" pitchFamily="49" charset="0"/>
+              </a:rPr>
+              <a:t> --template-file .\</a:t>
+            </a:r>
+            <a:r>
+              <a:rPr lang="nl-BE" dirty="0" err="1">
+                <a:solidFill>
+                  <a:schemeClr val="accent4">
+                    <a:lumMod val="40000"/>
+                    <a:lumOff val="60000"/>
+                  </a:schemeClr>
+                </a:solidFill>
+                <a:latin typeface="Consolas" panose="020B0609020204030204" pitchFamily="49" charset="0"/>
+              </a:rPr>
+              <a:t>TerraformRemoteState.json</a:t>
+            </a:r>
+            <a:endParaRPr lang="nl-BE" dirty="0">
+              <a:solidFill>
+                <a:schemeClr val="accent4">
+                  <a:lumMod val="40000"/>
+                  <a:lumOff val="60000"/>
+                </a:schemeClr>
+              </a:solidFill>
+              <a:latin typeface="Consolas" panose="020B0609020204030204" pitchFamily="49" charset="0"/>
+            </a:endParaRPr>
+          </a:p>
+        </p:txBody>
+      </p:sp>
+    </p:spTree>
+    <p:extLst>
+      <p:ext uri="{BB962C8B-B14F-4D97-AF65-F5344CB8AC3E}">
+        <p14:creationId xmlns:p14="http://schemas.microsoft.com/office/powerpoint/2010/main" val="3049145104"/>
+      </p:ext>
+    </p:extLst>
+  </p:cSld>
+  <p:clrMapOvr>
+    <a:masterClrMapping/>
+  </p:clrMapOvr>
+  <mc:AlternateContent xmlns:mc="http://schemas.openxmlformats.org/markup-compatibility/2006" xmlns:p14="http://schemas.microsoft.com/office/powerpoint/2010/main">
+    <mc:Choice Requires="p14">
+      <p:transition spd="med" p14:dur="700">
+        <p:fade/>
+      </p:transition>
+    </mc:Choice>
+    <mc:Fallback xmlns="">
+      <p:transition spd="med">
+        <p:fade/>
+      </p:transition>
+    </mc:Fallback>
+  </mc:AlternateContent>
+</p:sld>
+</file>
+
+<file path=ppt/slides/slide12.xml><?xml version="1.0" encoding="utf-8"?>
+<p:sld xmlns:a="http://schemas.openxmlformats.org/drawingml/2006/main" xmlns:r="http://schemas.openxmlformats.org/officeDocument/2006/relationships" xmlns:p="http://schemas.openxmlformats.org/presentationml/2006/main">
+  <p:cSld>
+    <p:spTree>
+      <p:nvGrpSpPr>
+        <p:cNvPr id="1" name=""/>
+        <p:cNvGrpSpPr/>
+        <p:nvPr/>
+      </p:nvGrpSpPr>
+      <p:grpSpPr>
+        <a:xfrm>
+          <a:off x="0" y="0"/>
+          <a:ext cx="0" cy="0"/>
+          <a:chOff x="0" y="0"/>
+          <a:chExt cx="0" cy="0"/>
+        </a:xfrm>
+      </p:grpSpPr>
+      <p:pic>
+        <p:nvPicPr>
+          <p:cNvPr id="2" name="Afbeelding 1">
+            <a:extLst>
+              <a:ext uri="{FF2B5EF4-FFF2-40B4-BE49-F238E27FC236}">
+                <a16:creationId xmlns:a16="http://schemas.microsoft.com/office/drawing/2014/main" id="{C4F809FA-56A0-454F-A272-23E6AC2EF67C}"/>
+              </a:ext>
+            </a:extLst>
+          </p:cNvPr>
+          <p:cNvPicPr>
+            <a:picLocks noChangeAspect="1"/>
+          </p:cNvPicPr>
+          <p:nvPr/>
+        </p:nvPicPr>
+        <p:blipFill>
+          <a:blip r:embed="rId2"/>
+          <a:stretch>
+            <a:fillRect/>
+          </a:stretch>
+        </p:blipFill>
+        <p:spPr>
+          <a:xfrm>
+            <a:off x="455712" y="1052736"/>
+            <a:ext cx="11280576" cy="3095665"/>
+          </a:xfrm>
+          <a:prstGeom prst="rect">
+            <a:avLst/>
+          </a:prstGeom>
+        </p:spPr>
+      </p:pic>
+      <p:cxnSp>
+        <p:nvCxnSpPr>
+          <p:cNvPr id="4" name="Rechte verbindingslijn met pijl 3">
+            <a:extLst>
+              <a:ext uri="{FF2B5EF4-FFF2-40B4-BE49-F238E27FC236}">
+                <a16:creationId xmlns:a16="http://schemas.microsoft.com/office/drawing/2014/main" id="{B0E192CF-99D1-48E7-BEDB-098F8A87AC6D}"/>
+              </a:ext>
+            </a:extLst>
+          </p:cNvPr>
+          <p:cNvCxnSpPr/>
+          <p:nvPr/>
+        </p:nvCxnSpPr>
+        <p:spPr>
+          <a:xfrm flipH="1" flipV="1">
+            <a:off x="4439816" y="4148401"/>
+            <a:ext cx="936104" cy="1296823"/>
+          </a:xfrm>
+          <a:prstGeom prst="straightConnector1">
+            <a:avLst/>
+          </a:prstGeom>
+          <a:ln>
+            <a:tailEnd type="triangle"/>
+          </a:ln>
+        </p:spPr>
+        <p:style>
+          <a:lnRef idx="1">
+            <a:schemeClr val="accent1"/>
+          </a:lnRef>
+          <a:fillRef idx="0">
+            <a:schemeClr val="accent1"/>
+          </a:fillRef>
+          <a:effectRef idx="0">
+            <a:schemeClr val="accent1"/>
+          </a:effectRef>
+          <a:fontRef idx="minor">
+            <a:schemeClr val="tx1"/>
+          </a:fontRef>
+        </p:style>
+      </p:cxnSp>
+      <p:sp>
+        <p:nvSpPr>
+          <p:cNvPr id="5" name="Tekstvak 4">
+            <a:extLst>
+              <a:ext uri="{FF2B5EF4-FFF2-40B4-BE49-F238E27FC236}">
+                <a16:creationId xmlns:a16="http://schemas.microsoft.com/office/drawing/2014/main" id="{73D38D84-FC08-49B3-BCD8-CCC569726677}"/>
+              </a:ext>
+            </a:extLst>
+          </p:cNvPr>
+          <p:cNvSpPr txBox="1"/>
+          <p:nvPr/>
+        </p:nvSpPr>
+        <p:spPr>
+          <a:xfrm>
+            <a:off x="5015880" y="5435932"/>
+            <a:ext cx="3024336" cy="369332"/>
+          </a:xfrm>
+          <a:prstGeom prst="rect">
+            <a:avLst/>
+          </a:prstGeom>
+          <a:noFill/>
+        </p:spPr>
+        <p:txBody>
+          <a:bodyPr wrap="square" rtlCol="0">
+            <a:spAutoFit/>
+          </a:bodyPr>
+          <a:lstStyle/>
+          <a:p>
+            <a:r>
+              <a:rPr lang="nl-BE" dirty="0" err="1"/>
+              <a:t>it</a:t>
+            </a:r>
+            <a:r>
+              <a:rPr lang="nl-BE" dirty="0"/>
+              <a:t> </a:t>
+            </a:r>
+            <a:r>
+              <a:rPr lang="nl-BE" dirty="0" err="1"/>
+              <a:t>worked</a:t>
+            </a:r>
+            <a:r>
+              <a:rPr lang="nl-BE" dirty="0"/>
+              <a:t>!</a:t>
+            </a:r>
+          </a:p>
+        </p:txBody>
+      </p:sp>
+    </p:spTree>
+    <p:extLst>
+      <p:ext uri="{BB962C8B-B14F-4D97-AF65-F5344CB8AC3E}">
+        <p14:creationId xmlns:p14="http://schemas.microsoft.com/office/powerpoint/2010/main" val="329083908"/>
+      </p:ext>
+    </p:extLst>
+  </p:cSld>
+  <p:clrMapOvr>
+    <a:masterClrMapping/>
+  </p:clrMapOvr>
+  <mc:AlternateContent xmlns:mc="http://schemas.openxmlformats.org/markup-compatibility/2006" xmlns:p14="http://schemas.microsoft.com/office/powerpoint/2010/main">
+    <mc:Choice Requires="p14">
+      <p:transition spd="med" p14:dur="700">
+        <p:fade/>
+      </p:transition>
+    </mc:Choice>
+    <mc:Fallback xmlns="">
+      <p:transition spd="med">
+        <p:fade/>
+      </p:transition>
+    </mc:Fallback>
+  </mc:AlternateContent>
+</p:sld>
+</file>
+
+<file path=ppt/slides/slide13.xml><?xml version="1.0" encoding="utf-8"?>
+<p:sld xmlns:a="http://schemas.openxmlformats.org/drawingml/2006/main" xmlns:r="http://schemas.openxmlformats.org/officeDocument/2006/relationships" xmlns:p="http://schemas.openxmlformats.org/presentationml/2006/main">
+  <p:cSld>
+    <p:spTree>
+      <p:nvGrpSpPr>
+        <p:cNvPr id="1" name=""/>
+        <p:cNvGrpSpPr/>
+        <p:nvPr/>
+      </p:nvGrpSpPr>
+      <p:grpSpPr>
+        <a:xfrm>
+          <a:off x="0" y="0"/>
+          <a:ext cx="0" cy="0"/>
+          <a:chOff x="0" y="0"/>
+          <a:chExt cx="0" cy="0"/>
+        </a:xfrm>
+      </p:grpSpPr>
+      <p:sp>
+        <p:nvSpPr>
+          <p:cNvPr id="2" name="Titel 1">
+            <a:extLst>
+              <a:ext uri="{FF2B5EF4-FFF2-40B4-BE49-F238E27FC236}">
+                <a16:creationId xmlns:a16="http://schemas.microsoft.com/office/drawing/2014/main" id="{4E95B0FF-7F44-4643-8E75-FE04F50ECE92}"/>
+              </a:ext>
+            </a:extLst>
+          </p:cNvPr>
+          <p:cNvSpPr>
+            <a:spLocks noGrp="1"/>
+          </p:cNvSpPr>
+          <p:nvPr>
+            <p:ph type="title"/>
+          </p:nvPr>
+        </p:nvSpPr>
+        <p:spPr/>
+        <p:txBody>
+          <a:bodyPr/>
+          <a:lstStyle/>
+          <a:p>
+            <a:r>
+              <a:rPr lang="nl-BE" dirty="0"/>
+              <a:t>4. backend.tf</a:t>
+            </a:r>
+          </a:p>
+        </p:txBody>
+      </p:sp>
+      <p:sp>
+        <p:nvSpPr>
+          <p:cNvPr id="3" name="Tijdelijke aanduiding voor afbeelding 2">
+            <a:extLst>
+              <a:ext uri="{FF2B5EF4-FFF2-40B4-BE49-F238E27FC236}">
+                <a16:creationId xmlns:a16="http://schemas.microsoft.com/office/drawing/2014/main" id="{DCC62E36-5ACD-4385-B90B-412332C08838}"/>
+              </a:ext>
+            </a:extLst>
+          </p:cNvPr>
+          <p:cNvSpPr>
+            <a:spLocks noGrp="1"/>
+          </p:cNvSpPr>
+          <p:nvPr>
+            <p:ph type="pic" idx="1"/>
+          </p:nvPr>
+        </p:nvSpPr>
+        <p:spPr>
+          <a:xfrm>
+            <a:off x="1055440" y="1874520"/>
+            <a:ext cx="5193089" cy="2937510"/>
+          </a:xfrm>
+          <a:solidFill>
+            <a:schemeClr val="accent4">
+              <a:lumMod val="50000"/>
+            </a:schemeClr>
+          </a:solidFill>
+        </p:spPr>
+      </p:sp>
+      <p:sp>
+        <p:nvSpPr>
+          <p:cNvPr id="4" name="Tijdelijke aanduiding voor tekst 3">
+            <a:extLst>
+              <a:ext uri="{FF2B5EF4-FFF2-40B4-BE49-F238E27FC236}">
+                <a16:creationId xmlns:a16="http://schemas.microsoft.com/office/drawing/2014/main" id="{11ACD180-6D93-4985-94B7-080FB372FE66}"/>
+              </a:ext>
+            </a:extLst>
+          </p:cNvPr>
+          <p:cNvSpPr>
+            <a:spLocks noGrp="1"/>
+          </p:cNvSpPr>
+          <p:nvPr>
+            <p:ph type="body" sz="half" idx="2"/>
+          </p:nvPr>
+        </p:nvSpPr>
+        <p:spPr>
+          <a:xfrm>
+            <a:off x="6960096" y="1196752"/>
+            <a:ext cx="4558208" cy="4464496"/>
+          </a:xfrm>
+        </p:spPr>
+        <p:txBody>
+          <a:bodyPr>
+            <a:normAutofit lnSpcReduction="10000"/>
+          </a:bodyPr>
+          <a:lstStyle/>
+          <a:p>
+            <a:r>
+              <a:rPr lang="nl-BE" dirty="0" err="1">
+                <a:latin typeface="Consolas" panose="020B0609020204030204" pitchFamily="49" charset="0"/>
+              </a:rPr>
+              <a:t>Create</a:t>
+            </a:r>
+            <a:r>
+              <a:rPr lang="nl-BE" dirty="0">
+                <a:latin typeface="Consolas" panose="020B0609020204030204" pitchFamily="49" charset="0"/>
+              </a:rPr>
+              <a:t> a first </a:t>
+            </a:r>
+            <a:r>
+              <a:rPr lang="nl-BE" dirty="0" err="1">
+                <a:latin typeface="Consolas" panose="020B0609020204030204" pitchFamily="49" charset="0"/>
+              </a:rPr>
+              <a:t>terraform</a:t>
+            </a:r>
+            <a:r>
+              <a:rPr lang="nl-BE" dirty="0">
+                <a:latin typeface="Consolas" panose="020B0609020204030204" pitchFamily="49" charset="0"/>
+              </a:rPr>
+              <a:t> file:</a:t>
+            </a:r>
+          </a:p>
+          <a:p>
+            <a:r>
+              <a:rPr lang="nl-BE" dirty="0">
+                <a:latin typeface="Consolas" panose="020B0609020204030204" pitchFamily="49" charset="0"/>
+              </a:rPr>
+              <a:t>backend.tf</a:t>
+            </a:r>
+          </a:p>
+          <a:p>
+            <a:endParaRPr lang="nl-BE" dirty="0">
+              <a:latin typeface="Consolas" panose="020B0609020204030204" pitchFamily="49" charset="0"/>
+            </a:endParaRPr>
+          </a:p>
+          <a:p>
+            <a:r>
+              <a:rPr lang="nl-BE" dirty="0" err="1">
+                <a:latin typeface="Consolas" panose="020B0609020204030204" pitchFamily="49" charset="0"/>
+              </a:rPr>
+              <a:t>This</a:t>
+            </a:r>
+            <a:r>
+              <a:rPr lang="nl-BE" dirty="0">
+                <a:latin typeface="Consolas" panose="020B0609020204030204" pitchFamily="49" charset="0"/>
+              </a:rPr>
+              <a:t> file </a:t>
+            </a:r>
+            <a:r>
+              <a:rPr lang="nl-BE" dirty="0" err="1">
+                <a:latin typeface="Consolas" panose="020B0609020204030204" pitchFamily="49" charset="0"/>
+              </a:rPr>
+              <a:t>tells</a:t>
+            </a:r>
+            <a:r>
+              <a:rPr lang="nl-BE" dirty="0">
+                <a:latin typeface="Consolas" panose="020B0609020204030204" pitchFamily="49" charset="0"/>
+              </a:rPr>
+              <a:t> </a:t>
+            </a:r>
+            <a:r>
+              <a:rPr lang="nl-BE" dirty="0" err="1">
+                <a:latin typeface="Consolas" panose="020B0609020204030204" pitchFamily="49" charset="0"/>
+              </a:rPr>
+              <a:t>terraform</a:t>
+            </a:r>
+            <a:r>
+              <a:rPr lang="nl-BE" dirty="0">
+                <a:latin typeface="Consolas" panose="020B0609020204030204" pitchFamily="49" charset="0"/>
+              </a:rPr>
+              <a:t> </a:t>
+            </a:r>
+            <a:r>
+              <a:rPr lang="nl-BE" dirty="0" err="1">
+                <a:latin typeface="Consolas" panose="020B0609020204030204" pitchFamily="49" charset="0"/>
+              </a:rPr>
+              <a:t>that</a:t>
+            </a:r>
+            <a:r>
+              <a:rPr lang="nl-BE" dirty="0">
+                <a:latin typeface="Consolas" panose="020B0609020204030204" pitchFamily="49" charset="0"/>
+              </a:rPr>
+              <a:t> we </a:t>
+            </a:r>
+            <a:r>
+              <a:rPr lang="nl-BE" dirty="0" err="1">
+                <a:latin typeface="Consolas" panose="020B0609020204030204" pitchFamily="49" charset="0"/>
+              </a:rPr>
+              <a:t>will</a:t>
+            </a:r>
+            <a:r>
+              <a:rPr lang="nl-BE" dirty="0">
+                <a:latin typeface="Consolas" panose="020B0609020204030204" pitchFamily="49" charset="0"/>
+              </a:rPr>
+              <a:t> </a:t>
+            </a:r>
+            <a:r>
+              <a:rPr lang="nl-BE" dirty="0" err="1">
+                <a:latin typeface="Consolas" panose="020B0609020204030204" pitchFamily="49" charset="0"/>
+              </a:rPr>
+              <a:t>be</a:t>
+            </a:r>
+            <a:r>
+              <a:rPr lang="nl-BE" dirty="0">
+                <a:latin typeface="Consolas" panose="020B0609020204030204" pitchFamily="49" charset="0"/>
+              </a:rPr>
+              <a:t> storing </a:t>
+            </a:r>
+            <a:r>
+              <a:rPr lang="nl-BE" dirty="0" err="1">
+                <a:latin typeface="Consolas" panose="020B0609020204030204" pitchFamily="49" charset="0"/>
+              </a:rPr>
+              <a:t>our</a:t>
+            </a:r>
+            <a:r>
+              <a:rPr lang="nl-BE" dirty="0">
+                <a:latin typeface="Consolas" panose="020B0609020204030204" pitchFamily="49" charset="0"/>
+              </a:rPr>
+              <a:t> backend in </a:t>
+            </a:r>
+            <a:r>
+              <a:rPr lang="nl-BE" dirty="0" err="1">
+                <a:latin typeface="Consolas" panose="020B0609020204030204" pitchFamily="49" charset="0"/>
+              </a:rPr>
+              <a:t>the</a:t>
+            </a:r>
+            <a:r>
+              <a:rPr lang="nl-BE" dirty="0">
+                <a:latin typeface="Consolas" panose="020B0609020204030204" pitchFamily="49" charset="0"/>
+              </a:rPr>
+              <a:t> </a:t>
+            </a:r>
+            <a:r>
+              <a:rPr lang="nl-BE" dirty="0" err="1">
+                <a:latin typeface="Consolas" panose="020B0609020204030204" pitchFamily="49" charset="0"/>
+              </a:rPr>
+              <a:t>Azure</a:t>
+            </a:r>
+            <a:r>
+              <a:rPr lang="nl-BE" dirty="0">
+                <a:latin typeface="Consolas" panose="020B0609020204030204" pitchFamily="49" charset="0"/>
+              </a:rPr>
+              <a:t> Storage account </a:t>
+            </a:r>
+            <a:r>
+              <a:rPr lang="nl-BE" dirty="0" err="1">
+                <a:latin typeface="Consolas" panose="020B0609020204030204" pitchFamily="49" charset="0"/>
+              </a:rPr>
+              <a:t>we’ve</a:t>
+            </a:r>
+            <a:r>
+              <a:rPr lang="nl-BE" dirty="0">
+                <a:latin typeface="Consolas" panose="020B0609020204030204" pitchFamily="49" charset="0"/>
+              </a:rPr>
+              <a:t> </a:t>
+            </a:r>
+            <a:r>
+              <a:rPr lang="nl-BE" dirty="0" err="1">
+                <a:latin typeface="Consolas" panose="020B0609020204030204" pitchFamily="49" charset="0"/>
+              </a:rPr>
+              <a:t>created</a:t>
+            </a:r>
+            <a:r>
+              <a:rPr lang="nl-BE" dirty="0">
+                <a:latin typeface="Consolas" panose="020B0609020204030204" pitchFamily="49" charset="0"/>
+              </a:rPr>
+              <a:t>. The </a:t>
+            </a:r>
+            <a:r>
+              <a:rPr lang="nl-BE" dirty="0" err="1">
+                <a:latin typeface="Consolas" panose="020B0609020204030204" pitchFamily="49" charset="0"/>
+              </a:rPr>
+              <a:t>key</a:t>
+            </a:r>
+            <a:r>
+              <a:rPr lang="nl-BE" dirty="0">
+                <a:latin typeface="Consolas" panose="020B0609020204030204" pitchFamily="49" charset="0"/>
+              </a:rPr>
+              <a:t> is a “</a:t>
+            </a:r>
+            <a:r>
+              <a:rPr lang="nl-BE" dirty="0" err="1">
+                <a:latin typeface="Consolas" panose="020B0609020204030204" pitchFamily="49" charset="0"/>
+              </a:rPr>
+              <a:t>group</a:t>
+            </a:r>
+            <a:r>
+              <a:rPr lang="nl-BE" dirty="0">
+                <a:latin typeface="Consolas" panose="020B0609020204030204" pitchFamily="49" charset="0"/>
+              </a:rPr>
+              <a:t> name” </a:t>
+            </a:r>
+            <a:r>
+              <a:rPr lang="nl-BE" dirty="0" err="1">
+                <a:latin typeface="Consolas" panose="020B0609020204030204" pitchFamily="49" charset="0"/>
+              </a:rPr>
+              <a:t>for</a:t>
+            </a:r>
+            <a:r>
+              <a:rPr lang="nl-BE" dirty="0">
+                <a:latin typeface="Consolas" panose="020B0609020204030204" pitchFamily="49" charset="0"/>
+              </a:rPr>
+              <a:t> </a:t>
+            </a:r>
+            <a:r>
+              <a:rPr lang="nl-BE" dirty="0" err="1">
+                <a:latin typeface="Consolas" panose="020B0609020204030204" pitchFamily="49" charset="0"/>
+              </a:rPr>
+              <a:t>all</a:t>
+            </a:r>
+            <a:r>
+              <a:rPr lang="nl-BE" dirty="0">
+                <a:latin typeface="Consolas" panose="020B0609020204030204" pitchFamily="49" charset="0"/>
+              </a:rPr>
+              <a:t> </a:t>
+            </a:r>
+            <a:r>
+              <a:rPr lang="nl-BE" dirty="0" err="1">
+                <a:latin typeface="Consolas" panose="020B0609020204030204" pitchFamily="49" charset="0"/>
+              </a:rPr>
+              <a:t>the</a:t>
+            </a:r>
+            <a:r>
+              <a:rPr lang="nl-BE" dirty="0">
+                <a:latin typeface="Consolas" panose="020B0609020204030204" pitchFamily="49" charset="0"/>
+              </a:rPr>
+              <a:t> </a:t>
+            </a:r>
+            <a:r>
+              <a:rPr lang="nl-BE" dirty="0" err="1">
+                <a:latin typeface="Consolas" panose="020B0609020204030204" pitchFamily="49" charset="0"/>
+              </a:rPr>
+              <a:t>deployments</a:t>
+            </a:r>
+            <a:r>
+              <a:rPr lang="nl-BE" dirty="0">
+                <a:latin typeface="Consolas" panose="020B0609020204030204" pitchFamily="49" charset="0"/>
+              </a:rPr>
+              <a:t> from </a:t>
+            </a:r>
+            <a:r>
+              <a:rPr lang="nl-BE" dirty="0" err="1">
+                <a:latin typeface="Consolas" panose="020B0609020204030204" pitchFamily="49" charset="0"/>
+              </a:rPr>
+              <a:t>this</a:t>
+            </a:r>
+            <a:r>
+              <a:rPr lang="nl-BE" dirty="0">
+                <a:latin typeface="Consolas" panose="020B0609020204030204" pitchFamily="49" charset="0"/>
+              </a:rPr>
+              <a:t> </a:t>
+            </a:r>
+            <a:r>
+              <a:rPr lang="nl-BE" dirty="0" err="1">
+                <a:latin typeface="Consolas" panose="020B0609020204030204" pitchFamily="49" charset="0"/>
+              </a:rPr>
+              <a:t>terraform</a:t>
+            </a:r>
+            <a:r>
+              <a:rPr lang="nl-BE" dirty="0">
+                <a:latin typeface="Consolas" panose="020B0609020204030204" pitchFamily="49" charset="0"/>
+              </a:rPr>
+              <a:t> folder/</a:t>
+            </a:r>
+            <a:r>
+              <a:rPr lang="nl-BE" dirty="0" err="1">
+                <a:latin typeface="Consolas" panose="020B0609020204030204" pitchFamily="49" charset="0"/>
+              </a:rPr>
+              <a:t>repository</a:t>
+            </a:r>
+            <a:endParaRPr lang="nl-BE" dirty="0">
+              <a:latin typeface="Consolas" panose="020B0609020204030204" pitchFamily="49" charset="0"/>
+            </a:endParaRPr>
+          </a:p>
+          <a:p>
+            <a:endParaRPr lang="nl-BE" dirty="0">
+              <a:latin typeface="Consolas" panose="020B0609020204030204" pitchFamily="49" charset="0"/>
+            </a:endParaRPr>
+          </a:p>
+          <a:p>
+            <a:r>
+              <a:rPr lang="nl-BE" dirty="0">
+                <a:latin typeface="Consolas" panose="020B0609020204030204" pitchFamily="49" charset="0"/>
+              </a:rPr>
+              <a:t>PS: In official </a:t>
+            </a:r>
+            <a:r>
+              <a:rPr lang="nl-BE" dirty="0" err="1">
+                <a:latin typeface="Consolas" panose="020B0609020204030204" pitchFamily="49" charset="0"/>
+              </a:rPr>
+              <a:t>documentation</a:t>
+            </a:r>
+            <a:r>
+              <a:rPr lang="nl-BE" dirty="0">
+                <a:latin typeface="Consolas" panose="020B0609020204030204" pitchFamily="49" charset="0"/>
+              </a:rPr>
+              <a:t> </a:t>
+            </a:r>
+            <a:r>
+              <a:rPr lang="nl-BE" dirty="0" err="1">
+                <a:latin typeface="Consolas" panose="020B0609020204030204" pitchFamily="49" charset="0"/>
+              </a:rPr>
+              <a:t>you</a:t>
+            </a:r>
+            <a:r>
+              <a:rPr lang="nl-BE" dirty="0">
+                <a:latin typeface="Consolas" panose="020B0609020204030204" pitchFamily="49" charset="0"/>
+              </a:rPr>
+              <a:t> </a:t>
+            </a:r>
+            <a:r>
+              <a:rPr lang="nl-BE" dirty="0" err="1">
+                <a:latin typeface="Consolas" panose="020B0609020204030204" pitchFamily="49" charset="0"/>
+              </a:rPr>
+              <a:t>will</a:t>
+            </a:r>
+            <a:r>
+              <a:rPr lang="nl-BE" dirty="0">
+                <a:latin typeface="Consolas" panose="020B0609020204030204" pitchFamily="49" charset="0"/>
+              </a:rPr>
+              <a:t> </a:t>
+            </a:r>
+            <a:r>
+              <a:rPr lang="nl-BE" dirty="0" err="1">
+                <a:latin typeface="Consolas" panose="020B0609020204030204" pitchFamily="49" charset="0"/>
+              </a:rPr>
+              <a:t>see</a:t>
+            </a:r>
+            <a:r>
+              <a:rPr lang="nl-BE" dirty="0">
+                <a:latin typeface="Consolas" panose="020B0609020204030204" pitchFamily="49" charset="0"/>
+              </a:rPr>
+              <a:t> </a:t>
+            </a:r>
+            <a:r>
+              <a:rPr lang="nl-BE" dirty="0" err="1">
+                <a:latin typeface="Consolas" panose="020B0609020204030204" pitchFamily="49" charset="0"/>
+              </a:rPr>
+              <a:t>this</a:t>
+            </a:r>
+            <a:r>
+              <a:rPr lang="nl-BE" dirty="0">
+                <a:latin typeface="Consolas" panose="020B0609020204030204" pitchFamily="49" charset="0"/>
+              </a:rPr>
+              <a:t> in </a:t>
+            </a:r>
+            <a:r>
+              <a:rPr lang="nl-BE" dirty="0" err="1">
+                <a:latin typeface="Consolas" panose="020B0609020204030204" pitchFamily="49" charset="0"/>
+              </a:rPr>
+              <a:t>the</a:t>
+            </a:r>
+            <a:r>
+              <a:rPr lang="nl-BE" dirty="0">
+                <a:latin typeface="Consolas" panose="020B0609020204030204" pitchFamily="49" charset="0"/>
+              </a:rPr>
+              <a:t> main.tf, but i like </a:t>
+            </a:r>
+            <a:r>
+              <a:rPr lang="nl-BE" dirty="0" err="1">
+                <a:latin typeface="Consolas" panose="020B0609020204030204" pitchFamily="49" charset="0"/>
+              </a:rPr>
+              <a:t>to</a:t>
+            </a:r>
+            <a:r>
+              <a:rPr lang="nl-BE" dirty="0">
+                <a:latin typeface="Consolas" panose="020B0609020204030204" pitchFamily="49" charset="0"/>
+              </a:rPr>
+              <a:t> </a:t>
+            </a:r>
+            <a:r>
+              <a:rPr lang="nl-BE" dirty="0" err="1">
+                <a:latin typeface="Consolas" panose="020B0609020204030204" pitchFamily="49" charset="0"/>
+              </a:rPr>
+              <a:t>structure</a:t>
+            </a:r>
+            <a:r>
+              <a:rPr lang="nl-BE" dirty="0">
+                <a:latin typeface="Consolas" panose="020B0609020204030204" pitchFamily="49" charset="0"/>
+              </a:rPr>
+              <a:t> </a:t>
+            </a:r>
+            <a:r>
+              <a:rPr lang="nl-BE" dirty="0" err="1">
+                <a:latin typeface="Consolas" panose="020B0609020204030204" pitchFamily="49" charset="0"/>
+              </a:rPr>
+              <a:t>the</a:t>
+            </a:r>
+            <a:r>
+              <a:rPr lang="nl-BE" dirty="0">
+                <a:latin typeface="Consolas" panose="020B0609020204030204" pitchFamily="49" charset="0"/>
+              </a:rPr>
+              <a:t> files </a:t>
+            </a:r>
+            <a:r>
+              <a:rPr lang="nl-BE" dirty="0" err="1">
+                <a:latin typeface="Consolas" panose="020B0609020204030204" pitchFamily="49" charset="0"/>
+              </a:rPr>
+              <a:t>and</a:t>
+            </a:r>
+            <a:r>
+              <a:rPr lang="nl-BE" dirty="0">
+                <a:latin typeface="Consolas" panose="020B0609020204030204" pitchFamily="49" charset="0"/>
+              </a:rPr>
+              <a:t> </a:t>
+            </a:r>
+            <a:r>
+              <a:rPr lang="nl-BE" dirty="0" err="1">
+                <a:latin typeface="Consolas" panose="020B0609020204030204" pitchFamily="49" charset="0"/>
+              </a:rPr>
+              <a:t>their</a:t>
+            </a:r>
+            <a:r>
+              <a:rPr lang="nl-BE" dirty="0">
+                <a:latin typeface="Consolas" panose="020B0609020204030204" pitchFamily="49" charset="0"/>
+              </a:rPr>
+              <a:t> </a:t>
+            </a:r>
+            <a:r>
+              <a:rPr lang="nl-BE" dirty="0" err="1">
+                <a:latin typeface="Consolas" panose="020B0609020204030204" pitchFamily="49" charset="0"/>
+              </a:rPr>
+              <a:t>names</a:t>
+            </a:r>
+            <a:r>
+              <a:rPr lang="nl-BE" dirty="0">
+                <a:latin typeface="Consolas" panose="020B0609020204030204" pitchFamily="49" charset="0"/>
+              </a:rPr>
+              <a:t> by </a:t>
+            </a:r>
+            <a:r>
+              <a:rPr lang="nl-BE" dirty="0" err="1">
+                <a:latin typeface="Consolas" panose="020B0609020204030204" pitchFamily="49" charset="0"/>
+              </a:rPr>
+              <a:t>the</a:t>
+            </a:r>
+            <a:r>
+              <a:rPr lang="nl-BE" dirty="0">
+                <a:latin typeface="Consolas" panose="020B0609020204030204" pitchFamily="49" charset="0"/>
+              </a:rPr>
+              <a:t> </a:t>
+            </a:r>
+            <a:r>
+              <a:rPr lang="nl-BE" dirty="0" err="1">
+                <a:latin typeface="Consolas" panose="020B0609020204030204" pitchFamily="49" charset="0"/>
+              </a:rPr>
+              <a:t>tasks</a:t>
+            </a:r>
+            <a:r>
+              <a:rPr lang="nl-BE" dirty="0">
+                <a:latin typeface="Consolas" panose="020B0609020204030204" pitchFamily="49" charset="0"/>
+              </a:rPr>
+              <a:t> </a:t>
+            </a:r>
+            <a:r>
+              <a:rPr lang="nl-BE" dirty="0" err="1">
+                <a:latin typeface="Consolas" panose="020B0609020204030204" pitchFamily="49" charset="0"/>
+              </a:rPr>
+              <a:t>they</a:t>
+            </a:r>
+            <a:r>
+              <a:rPr lang="nl-BE" dirty="0">
+                <a:latin typeface="Consolas" panose="020B0609020204030204" pitchFamily="49" charset="0"/>
+              </a:rPr>
+              <a:t> </a:t>
+            </a:r>
+            <a:r>
+              <a:rPr lang="nl-BE" dirty="0" err="1">
+                <a:latin typeface="Consolas" panose="020B0609020204030204" pitchFamily="49" charset="0"/>
+              </a:rPr>
+              <a:t>perform</a:t>
+            </a:r>
+            <a:r>
+              <a:rPr lang="nl-BE" dirty="0">
+                <a:latin typeface="Consolas" panose="020B0609020204030204" pitchFamily="49" charset="0"/>
+              </a:rPr>
+              <a:t>.</a:t>
+            </a:r>
+          </a:p>
+        </p:txBody>
+      </p:sp>
+      <p:pic>
+        <p:nvPicPr>
+          <p:cNvPr id="8" name="Afbeelding 7">
+            <a:extLst>
+              <a:ext uri="{FF2B5EF4-FFF2-40B4-BE49-F238E27FC236}">
+                <a16:creationId xmlns:a16="http://schemas.microsoft.com/office/drawing/2014/main" id="{F4AE7237-4124-4263-9795-50FEDFACDA2E}"/>
+              </a:ext>
+            </a:extLst>
+          </p:cNvPr>
+          <p:cNvPicPr>
+            <a:picLocks noChangeAspect="1"/>
+          </p:cNvPicPr>
+          <p:nvPr/>
+        </p:nvPicPr>
+        <p:blipFill>
+          <a:blip r:embed="rId2"/>
+          <a:stretch>
+            <a:fillRect/>
+          </a:stretch>
+        </p:blipFill>
+        <p:spPr>
+          <a:xfrm>
+            <a:off x="479375" y="1425332"/>
+            <a:ext cx="6415351" cy="3587844"/>
+          </a:xfrm>
+          <a:prstGeom prst="rect">
+            <a:avLst/>
+          </a:prstGeom>
+        </p:spPr>
+      </p:pic>
+    </p:spTree>
+    <p:extLst>
+      <p:ext uri="{BB962C8B-B14F-4D97-AF65-F5344CB8AC3E}">
+        <p14:creationId xmlns:p14="http://schemas.microsoft.com/office/powerpoint/2010/main" val="4183309228"/>
+      </p:ext>
+    </p:extLst>
+  </p:cSld>
+  <p:clrMapOvr>
+    <a:masterClrMapping/>
+  </p:clrMapOvr>
+  <mc:AlternateContent xmlns:mc="http://schemas.openxmlformats.org/markup-compatibility/2006" xmlns:p14="http://schemas.microsoft.com/office/powerpoint/2010/main">
+    <mc:Choice Requires="p14">
+      <p:transition spd="med" p14:dur="700">
+        <p:fade/>
+      </p:transition>
+    </mc:Choice>
+    <mc:Fallback xmlns="">
+      <p:transition spd="med">
+        <p:fade/>
+      </p:transition>
+    </mc:Fallback>
+  </mc:AlternateContent>
+</p:sld>
+</file>
+
+<file path=ppt/slides/slide14.xml><?xml version="1.0" encoding="utf-8"?>
+<p:sld xmlns:a="http://schemas.openxmlformats.org/drawingml/2006/main" xmlns:r="http://schemas.openxmlformats.org/officeDocument/2006/relationships" xmlns:p="http://schemas.openxmlformats.org/presentationml/2006/main">
+  <p:cSld>
+    <p:spTree>
+      <p:nvGrpSpPr>
+        <p:cNvPr id="1" name=""/>
+        <p:cNvGrpSpPr/>
+        <p:nvPr/>
+      </p:nvGrpSpPr>
+      <p:grpSpPr>
+        <a:xfrm>
+          <a:off x="0" y="0"/>
+          <a:ext cx="0" cy="0"/>
+          <a:chOff x="0" y="0"/>
+          <a:chExt cx="0" cy="0"/>
+        </a:xfrm>
+      </p:grpSpPr>
+      <p:sp>
+        <p:nvSpPr>
+          <p:cNvPr id="2" name="Titel 1">
+            <a:extLst>
+              <a:ext uri="{FF2B5EF4-FFF2-40B4-BE49-F238E27FC236}">
+                <a16:creationId xmlns:a16="http://schemas.microsoft.com/office/drawing/2014/main" id="{4E95B0FF-7F44-4643-8E75-FE04F50ECE92}"/>
+              </a:ext>
+            </a:extLst>
+          </p:cNvPr>
+          <p:cNvSpPr>
+            <a:spLocks noGrp="1"/>
+          </p:cNvSpPr>
+          <p:nvPr>
+            <p:ph type="title"/>
+          </p:nvPr>
+        </p:nvSpPr>
+        <p:spPr/>
+        <p:txBody>
+          <a:bodyPr/>
+          <a:lstStyle/>
+          <a:p>
+            <a:r>
+              <a:rPr lang="nl-BE" dirty="0"/>
+              <a:t>4. </a:t>
+            </a:r>
+            <a:r>
+              <a:rPr lang="nl-BE" dirty="0" err="1"/>
+              <a:t>Energize</a:t>
+            </a:r>
+            <a:r>
+              <a:rPr lang="nl-BE" dirty="0"/>
+              <a:t>!</a:t>
+            </a:r>
+          </a:p>
+        </p:txBody>
+      </p:sp>
+      <p:sp>
+        <p:nvSpPr>
+          <p:cNvPr id="3" name="Tijdelijke aanduiding voor afbeelding 2">
+            <a:extLst>
+              <a:ext uri="{FF2B5EF4-FFF2-40B4-BE49-F238E27FC236}">
+                <a16:creationId xmlns:a16="http://schemas.microsoft.com/office/drawing/2014/main" id="{DCC62E36-5ACD-4385-B90B-412332C08838}"/>
+              </a:ext>
+            </a:extLst>
+          </p:cNvPr>
+          <p:cNvSpPr>
+            <a:spLocks noGrp="1"/>
+          </p:cNvSpPr>
+          <p:nvPr>
+            <p:ph type="pic" idx="1"/>
+          </p:nvPr>
+        </p:nvSpPr>
+        <p:spPr>
+          <a:xfrm>
+            <a:off x="1055440" y="1874520"/>
+            <a:ext cx="5193089" cy="2937510"/>
+          </a:xfrm>
+          <a:solidFill>
+            <a:schemeClr val="accent4">
+              <a:lumMod val="50000"/>
+            </a:schemeClr>
+          </a:solidFill>
+        </p:spPr>
+      </p:sp>
+      <p:sp>
+        <p:nvSpPr>
+          <p:cNvPr id="4" name="Tijdelijke aanduiding voor tekst 3">
+            <a:extLst>
+              <a:ext uri="{FF2B5EF4-FFF2-40B4-BE49-F238E27FC236}">
+                <a16:creationId xmlns:a16="http://schemas.microsoft.com/office/drawing/2014/main" id="{11ACD180-6D93-4985-94B7-080FB372FE66}"/>
+              </a:ext>
+            </a:extLst>
+          </p:cNvPr>
+          <p:cNvSpPr>
+            <a:spLocks noGrp="1"/>
+          </p:cNvSpPr>
+          <p:nvPr>
+            <p:ph type="body" sz="half" idx="2"/>
+          </p:nvPr>
+        </p:nvSpPr>
+        <p:spPr>
+          <a:xfrm>
+            <a:off x="7010400" y="1700808"/>
+            <a:ext cx="4558208" cy="3384376"/>
+          </a:xfrm>
+        </p:spPr>
+        <p:txBody>
+          <a:bodyPr/>
+          <a:lstStyle/>
+          <a:p>
+            <a:r>
+              <a:rPr lang="nl-BE" dirty="0" err="1">
+                <a:latin typeface="Consolas" panose="020B0609020204030204" pitchFamily="49" charset="0"/>
+              </a:rPr>
+              <a:t>Terraform</a:t>
+            </a:r>
+            <a:r>
+              <a:rPr lang="nl-BE" dirty="0">
+                <a:latin typeface="Consolas" panose="020B0609020204030204" pitchFamily="49" charset="0"/>
+              </a:rPr>
+              <a:t> </a:t>
+            </a:r>
+            <a:r>
+              <a:rPr lang="nl-BE" dirty="0" err="1">
+                <a:latin typeface="Consolas" panose="020B0609020204030204" pitchFamily="49" charset="0"/>
+              </a:rPr>
+              <a:t>init</a:t>
+            </a:r>
+            <a:r>
+              <a:rPr lang="nl-BE" dirty="0">
+                <a:latin typeface="Consolas" panose="020B0609020204030204" pitchFamily="49" charset="0"/>
+              </a:rPr>
+              <a:t> </a:t>
+            </a:r>
+            <a:r>
+              <a:rPr lang="nl-BE" dirty="0" err="1">
+                <a:latin typeface="Consolas" panose="020B0609020204030204" pitchFamily="49" charset="0"/>
+              </a:rPr>
+              <a:t>will</a:t>
+            </a:r>
+            <a:r>
+              <a:rPr lang="nl-BE" dirty="0">
+                <a:latin typeface="Consolas" panose="020B0609020204030204" pitchFamily="49" charset="0"/>
+              </a:rPr>
+              <a:t> </a:t>
+            </a:r>
+            <a:r>
+              <a:rPr lang="nl-BE" dirty="0" err="1">
+                <a:latin typeface="Consolas" panose="020B0609020204030204" pitchFamily="49" charset="0"/>
+              </a:rPr>
+              <a:t>initialize</a:t>
+            </a:r>
+            <a:r>
+              <a:rPr lang="nl-BE" dirty="0">
+                <a:latin typeface="Consolas" panose="020B0609020204030204" pitchFamily="49" charset="0"/>
+              </a:rPr>
+              <a:t> </a:t>
+            </a:r>
+            <a:r>
+              <a:rPr lang="nl-BE" dirty="0" err="1">
+                <a:latin typeface="Consolas" panose="020B0609020204030204" pitchFamily="49" charset="0"/>
+              </a:rPr>
+              <a:t>the</a:t>
+            </a:r>
+            <a:r>
+              <a:rPr lang="nl-BE" dirty="0">
+                <a:latin typeface="Consolas" panose="020B0609020204030204" pitchFamily="49" charset="0"/>
+              </a:rPr>
+              <a:t> backend, </a:t>
+            </a:r>
+            <a:r>
+              <a:rPr lang="nl-BE" dirty="0" err="1">
+                <a:latin typeface="Consolas" panose="020B0609020204030204" pitchFamily="49" charset="0"/>
+              </a:rPr>
+              <a:t>and</a:t>
+            </a:r>
+            <a:r>
+              <a:rPr lang="nl-BE" dirty="0">
+                <a:latin typeface="Consolas" panose="020B0609020204030204" pitchFamily="49" charset="0"/>
+              </a:rPr>
+              <a:t> put </a:t>
+            </a:r>
+            <a:r>
+              <a:rPr lang="nl-BE" dirty="0" err="1">
+                <a:latin typeface="Consolas" panose="020B0609020204030204" pitchFamily="49" charset="0"/>
+              </a:rPr>
+              <a:t>some</a:t>
+            </a:r>
+            <a:r>
+              <a:rPr lang="nl-BE" dirty="0">
+                <a:latin typeface="Consolas" panose="020B0609020204030204" pitchFamily="49" charset="0"/>
+              </a:rPr>
+              <a:t> </a:t>
+            </a:r>
+            <a:r>
+              <a:rPr lang="nl-BE" dirty="0" err="1">
+                <a:latin typeface="Consolas" panose="020B0609020204030204" pitchFamily="49" charset="0"/>
+              </a:rPr>
+              <a:t>temporary</a:t>
+            </a:r>
+            <a:r>
+              <a:rPr lang="nl-BE" dirty="0">
+                <a:latin typeface="Consolas" panose="020B0609020204030204" pitchFamily="49" charset="0"/>
+              </a:rPr>
+              <a:t> files on </a:t>
+            </a:r>
+            <a:r>
+              <a:rPr lang="nl-BE" dirty="0" err="1">
+                <a:latin typeface="Consolas" panose="020B0609020204030204" pitchFamily="49" charset="0"/>
+              </a:rPr>
+              <a:t>your</a:t>
+            </a:r>
+            <a:r>
+              <a:rPr lang="nl-BE" dirty="0">
+                <a:latin typeface="Consolas" panose="020B0609020204030204" pitchFamily="49" charset="0"/>
+              </a:rPr>
+              <a:t> computer </a:t>
+            </a:r>
+            <a:r>
+              <a:rPr lang="nl-BE" dirty="0" err="1">
+                <a:latin typeface="Consolas" panose="020B0609020204030204" pitchFamily="49" charset="0"/>
+              </a:rPr>
+              <a:t>to</a:t>
+            </a:r>
+            <a:r>
+              <a:rPr lang="nl-BE" dirty="0">
+                <a:latin typeface="Consolas" panose="020B0609020204030204" pitchFamily="49" charset="0"/>
+              </a:rPr>
+              <a:t> </a:t>
+            </a:r>
+            <a:r>
+              <a:rPr lang="nl-BE" dirty="0" err="1">
+                <a:latin typeface="Consolas" panose="020B0609020204030204" pitchFamily="49" charset="0"/>
+              </a:rPr>
+              <a:t>remember</a:t>
+            </a:r>
+            <a:r>
+              <a:rPr lang="nl-BE" dirty="0">
+                <a:latin typeface="Consolas" panose="020B0609020204030204" pitchFamily="49" charset="0"/>
+              </a:rPr>
+              <a:t> </a:t>
+            </a:r>
+            <a:r>
+              <a:rPr lang="nl-BE" dirty="0" err="1">
+                <a:latin typeface="Consolas" panose="020B0609020204030204" pitchFamily="49" charset="0"/>
+              </a:rPr>
+              <a:t>the</a:t>
+            </a:r>
+            <a:r>
+              <a:rPr lang="nl-BE" dirty="0">
+                <a:latin typeface="Consolas" panose="020B0609020204030204" pitchFamily="49" charset="0"/>
+              </a:rPr>
+              <a:t> </a:t>
+            </a:r>
+            <a:r>
+              <a:rPr lang="nl-BE" dirty="0" err="1">
+                <a:latin typeface="Consolas" panose="020B0609020204030204" pitchFamily="49" charset="0"/>
+              </a:rPr>
+              <a:t>connection</a:t>
+            </a:r>
+            <a:r>
+              <a:rPr lang="nl-BE" dirty="0">
+                <a:latin typeface="Consolas" panose="020B0609020204030204" pitchFamily="49" charset="0"/>
+              </a:rPr>
+              <a:t> </a:t>
+            </a:r>
+            <a:r>
+              <a:rPr lang="nl-BE" dirty="0" err="1">
+                <a:latin typeface="Consolas" panose="020B0609020204030204" pitchFamily="49" charset="0"/>
+              </a:rPr>
+              <a:t>and</a:t>
+            </a:r>
+            <a:r>
+              <a:rPr lang="nl-BE" dirty="0">
+                <a:latin typeface="Consolas" panose="020B0609020204030204" pitchFamily="49" charset="0"/>
+              </a:rPr>
+              <a:t> </a:t>
+            </a:r>
+            <a:r>
+              <a:rPr lang="nl-BE" dirty="0" err="1">
+                <a:latin typeface="Consolas" panose="020B0609020204030204" pitchFamily="49" charset="0"/>
+              </a:rPr>
+              <a:t>some</a:t>
+            </a:r>
+            <a:r>
+              <a:rPr lang="nl-BE" dirty="0">
+                <a:latin typeface="Consolas" panose="020B0609020204030204" pitchFamily="49" charset="0"/>
+              </a:rPr>
+              <a:t> state stuff.</a:t>
+            </a:r>
+          </a:p>
+          <a:p>
+            <a:endParaRPr lang="nl-BE" dirty="0">
+              <a:latin typeface="Consolas" panose="020B0609020204030204" pitchFamily="49" charset="0"/>
+            </a:endParaRPr>
+          </a:p>
+          <a:p>
+            <a:r>
+              <a:rPr lang="nl-BE" dirty="0">
+                <a:latin typeface="Consolas" panose="020B0609020204030204" pitchFamily="49" charset="0"/>
+              </a:rPr>
+              <a:t>We are </a:t>
+            </a:r>
+            <a:r>
+              <a:rPr lang="nl-BE" dirty="0" err="1">
+                <a:latin typeface="Consolas" panose="020B0609020204030204" pitchFamily="49" charset="0"/>
+              </a:rPr>
+              <a:t>now</a:t>
+            </a:r>
+            <a:r>
+              <a:rPr lang="nl-BE" dirty="0">
+                <a:latin typeface="Consolas" panose="020B0609020204030204" pitchFamily="49" charset="0"/>
+              </a:rPr>
+              <a:t> ready </a:t>
+            </a:r>
+            <a:r>
+              <a:rPr lang="nl-BE" dirty="0" err="1">
+                <a:latin typeface="Consolas" panose="020B0609020204030204" pitchFamily="49" charset="0"/>
+              </a:rPr>
+              <a:t>to</a:t>
+            </a:r>
+            <a:r>
+              <a:rPr lang="nl-BE" dirty="0">
+                <a:latin typeface="Consolas" panose="020B0609020204030204" pitchFamily="49" charset="0"/>
+              </a:rPr>
+              <a:t> </a:t>
+            </a:r>
+            <a:r>
+              <a:rPr lang="nl-BE" dirty="0" err="1">
+                <a:latin typeface="Consolas" panose="020B0609020204030204" pitchFamily="49" charset="0"/>
+              </a:rPr>
+              <a:t>terraform</a:t>
+            </a:r>
+            <a:r>
+              <a:rPr lang="nl-BE" dirty="0">
+                <a:latin typeface="Consolas" panose="020B0609020204030204" pitchFamily="49" charset="0"/>
+              </a:rPr>
+              <a:t>!</a:t>
+            </a:r>
+          </a:p>
+          <a:p>
+            <a:endParaRPr lang="nl-BE" dirty="0">
+              <a:latin typeface="Consolas" panose="020B0609020204030204" pitchFamily="49" charset="0"/>
+            </a:endParaRPr>
+          </a:p>
+          <a:p>
+            <a:r>
+              <a:rPr lang="nl-BE" dirty="0" err="1">
+                <a:latin typeface="Consolas" panose="020B0609020204030204" pitchFamily="49" charset="0"/>
+              </a:rPr>
+              <a:t>yay</a:t>
+            </a:r>
+            <a:r>
+              <a:rPr lang="nl-BE" dirty="0">
+                <a:latin typeface="Consolas" panose="020B0609020204030204" pitchFamily="49" charset="0"/>
+              </a:rPr>
+              <a:t>!</a:t>
+            </a:r>
+          </a:p>
+          <a:p>
+            <a:pPr marL="285750" indent="-285750">
+              <a:buFontTx/>
+              <a:buChar char="-"/>
+            </a:pPr>
+            <a:endParaRPr lang="nl-BE" dirty="0">
+              <a:latin typeface="Consolas" panose="020B0609020204030204" pitchFamily="49" charset="0"/>
+            </a:endParaRPr>
+          </a:p>
+          <a:p>
+            <a:pPr marL="285750" indent="-285750">
+              <a:buFontTx/>
+              <a:buChar char="-"/>
+            </a:pPr>
+            <a:endParaRPr lang="nl-BE" dirty="0">
+              <a:latin typeface="Consolas" panose="020B0609020204030204" pitchFamily="49" charset="0"/>
+            </a:endParaRPr>
+          </a:p>
+        </p:txBody>
+      </p:sp>
+      <p:sp>
+        <p:nvSpPr>
+          <p:cNvPr id="5" name="Tijdelijke aanduiding voor tekst 3">
+            <a:extLst>
+              <a:ext uri="{FF2B5EF4-FFF2-40B4-BE49-F238E27FC236}">
+                <a16:creationId xmlns:a16="http://schemas.microsoft.com/office/drawing/2014/main" id="{C81F799A-A64A-4491-A23D-83D21CD6724C}"/>
+              </a:ext>
+            </a:extLst>
+          </p:cNvPr>
+          <p:cNvSpPr txBox="1">
+            <a:spLocks/>
+          </p:cNvSpPr>
+          <p:nvPr/>
+        </p:nvSpPr>
+        <p:spPr>
+          <a:xfrm>
+            <a:off x="1271464" y="2060848"/>
+            <a:ext cx="4824536" cy="2592288"/>
+          </a:xfrm>
+          <a:prstGeom prst="rect">
+            <a:avLst/>
+          </a:prstGeom>
+          <a:solidFill>
+            <a:schemeClr val="accent4">
+              <a:lumMod val="50000"/>
+            </a:schemeClr>
+          </a:solidFill>
+        </p:spPr>
+        <p:txBody>
+          <a:bodyPr vert="horz" lIns="91440" tIns="45720" rIns="91440" bIns="45720" rtlCol="0">
+            <a:normAutofit/>
+          </a:bodyPr>
+          <a:lstStyle>
+            <a:lvl1pPr marL="0" indent="0" algn="l" defTabSz="914400" rtl="0" eaLnBrk="1" latinLnBrk="0" hangingPunct="1">
+              <a:lnSpc>
+                <a:spcPct val="90000"/>
+              </a:lnSpc>
+              <a:spcBef>
+                <a:spcPts val="1200"/>
+              </a:spcBef>
+              <a:buFont typeface="Arial" panose="020B0604020202020204" pitchFamily="34" charset="0"/>
+              <a:buNone/>
+              <a:defRPr sz="1800" kern="1200">
+                <a:solidFill>
+                  <a:schemeClr val="tx1"/>
+                </a:solidFill>
+                <a:latin typeface="+mn-lt"/>
+                <a:ea typeface="+mn-ea"/>
+                <a:cs typeface="+mn-cs"/>
+              </a:defRPr>
+            </a:lvl1pPr>
+            <a:lvl2pPr marL="457200" indent="0" algn="l" defTabSz="914400" rtl="0" eaLnBrk="1" latinLnBrk="0" hangingPunct="1">
+              <a:lnSpc>
+                <a:spcPct val="90000"/>
+              </a:lnSpc>
+              <a:spcBef>
+                <a:spcPts val="1200"/>
+              </a:spcBef>
+              <a:buFont typeface="Arial" panose="020B0604020202020204" pitchFamily="34" charset="0"/>
+              <a:buNone/>
+              <a:defRPr sz="1400" kern="1200">
+                <a:solidFill>
+                  <a:schemeClr val="tx1"/>
+                </a:solidFill>
+                <a:latin typeface="+mn-lt"/>
+                <a:ea typeface="+mn-ea"/>
+                <a:cs typeface="+mn-cs"/>
+              </a:defRPr>
+            </a:lvl2pPr>
+            <a:lvl3pPr marL="914400" indent="0" algn="l" defTabSz="914400" rtl="0" eaLnBrk="1" latinLnBrk="0" hangingPunct="1">
+              <a:lnSpc>
+                <a:spcPct val="90000"/>
+              </a:lnSpc>
+              <a:spcBef>
+                <a:spcPts val="600"/>
+              </a:spcBef>
+              <a:buFont typeface="Arial" panose="020B0604020202020204" pitchFamily="34" charset="0"/>
+              <a:buNone/>
+              <a:defRPr sz="1200" kern="1200">
+                <a:solidFill>
+                  <a:schemeClr val="tx1"/>
+                </a:solidFill>
+                <a:latin typeface="+mn-lt"/>
+                <a:ea typeface="+mn-ea"/>
+                <a:cs typeface="+mn-cs"/>
+              </a:defRPr>
+            </a:lvl3pPr>
+            <a:lvl4pPr marL="1371600" indent="0" algn="l" defTabSz="914400" rtl="0" eaLnBrk="1" latinLnBrk="0" hangingPunct="1">
+              <a:lnSpc>
+                <a:spcPct val="90000"/>
+              </a:lnSpc>
+              <a:spcBef>
+                <a:spcPts val="600"/>
+              </a:spcBef>
+              <a:buFont typeface="Arial" panose="020B0604020202020204" pitchFamily="34" charset="0"/>
+              <a:buNone/>
+              <a:defRPr sz="1000" kern="1200">
+                <a:solidFill>
+                  <a:schemeClr val="tx1"/>
+                </a:solidFill>
+                <a:latin typeface="+mn-lt"/>
+                <a:ea typeface="+mn-ea"/>
+                <a:cs typeface="+mn-cs"/>
+              </a:defRPr>
+            </a:lvl4pPr>
+            <a:lvl5pPr marL="1828800" indent="0" algn="l" defTabSz="914400" rtl="0" eaLnBrk="1" latinLnBrk="0" hangingPunct="1">
+              <a:lnSpc>
+                <a:spcPct val="90000"/>
+              </a:lnSpc>
+              <a:spcBef>
+                <a:spcPts val="600"/>
+              </a:spcBef>
+              <a:buFont typeface="Arial" panose="020B0604020202020204" pitchFamily="34" charset="0"/>
+              <a:buNone/>
+              <a:defRPr sz="1000" kern="1200">
+                <a:solidFill>
+                  <a:schemeClr val="tx1"/>
+                </a:solidFill>
+                <a:latin typeface="+mn-lt"/>
+                <a:ea typeface="+mn-ea"/>
+                <a:cs typeface="+mn-cs"/>
+              </a:defRPr>
+            </a:lvl5pPr>
+            <a:lvl6pPr marL="2286000" indent="0" algn="l" defTabSz="914400" rtl="0" eaLnBrk="1" latinLnBrk="0" hangingPunct="1">
+              <a:lnSpc>
+                <a:spcPct val="90000"/>
+              </a:lnSpc>
+              <a:spcBef>
+                <a:spcPts val="600"/>
+              </a:spcBef>
+              <a:buFont typeface="Arial" panose="020B0604020202020204" pitchFamily="34" charset="0"/>
+              <a:buNone/>
+              <a:defRPr sz="1000" kern="1200">
+                <a:solidFill>
+                  <a:schemeClr val="tx1"/>
+                </a:solidFill>
+                <a:latin typeface="+mn-lt"/>
+                <a:ea typeface="+mn-ea"/>
+                <a:cs typeface="+mn-cs"/>
+              </a:defRPr>
+            </a:lvl6pPr>
+            <a:lvl7pPr marL="2743200" indent="0" algn="l" defTabSz="914400" rtl="0" eaLnBrk="1" latinLnBrk="0" hangingPunct="1">
+              <a:lnSpc>
+                <a:spcPct val="90000"/>
+              </a:lnSpc>
+              <a:spcBef>
+                <a:spcPts val="600"/>
+              </a:spcBef>
+              <a:buFont typeface="Arial" panose="020B0604020202020204" pitchFamily="34" charset="0"/>
+              <a:buNone/>
+              <a:defRPr sz="1000" kern="1200">
+                <a:solidFill>
+                  <a:schemeClr val="tx1"/>
+                </a:solidFill>
+                <a:latin typeface="+mn-lt"/>
+                <a:ea typeface="+mn-ea"/>
+                <a:cs typeface="+mn-cs"/>
+              </a:defRPr>
+            </a:lvl7pPr>
+            <a:lvl8pPr marL="3200400" indent="0" algn="l" defTabSz="914400" rtl="0" eaLnBrk="1" latinLnBrk="0" hangingPunct="1">
+              <a:lnSpc>
+                <a:spcPct val="90000"/>
+              </a:lnSpc>
+              <a:spcBef>
+                <a:spcPts val="600"/>
+              </a:spcBef>
+              <a:buFont typeface="Arial" panose="020B0604020202020204" pitchFamily="34" charset="0"/>
+              <a:buNone/>
+              <a:defRPr sz="1000" kern="1200">
+                <a:solidFill>
+                  <a:schemeClr val="tx1"/>
+                </a:solidFill>
+                <a:latin typeface="+mn-lt"/>
+                <a:ea typeface="+mn-ea"/>
+                <a:cs typeface="+mn-cs"/>
+              </a:defRPr>
+            </a:lvl8pPr>
+            <a:lvl9pPr marL="3657600" indent="0" algn="l" defTabSz="914400" rtl="0" eaLnBrk="1" latinLnBrk="0" hangingPunct="1">
+              <a:lnSpc>
+                <a:spcPct val="90000"/>
+              </a:lnSpc>
+              <a:spcBef>
+                <a:spcPts val="600"/>
+              </a:spcBef>
+              <a:buFont typeface="Arial" panose="020B0604020202020204" pitchFamily="34" charset="0"/>
+              <a:buNone/>
+              <a:defRPr sz="1000" kern="1200">
+                <a:solidFill>
+                  <a:schemeClr val="tx1"/>
+                </a:solidFill>
+                <a:latin typeface="+mn-lt"/>
+                <a:ea typeface="+mn-ea"/>
+                <a:cs typeface="+mn-cs"/>
+              </a:defRPr>
+            </a:lvl9pPr>
+          </a:lstStyle>
+          <a:p>
+            <a:pPr>
+              <a:tabLst>
+                <a:tab pos="360363" algn="l"/>
+              </a:tabLst>
+            </a:pPr>
+            <a:r>
+              <a:rPr lang="nl-BE" dirty="0">
+                <a:solidFill>
+                  <a:schemeClr val="accent4">
+                    <a:lumMod val="40000"/>
+                    <a:lumOff val="60000"/>
+                  </a:schemeClr>
+                </a:solidFill>
+                <a:latin typeface="Consolas" panose="020B0609020204030204" pitchFamily="49" charset="0"/>
+              </a:rPr>
+              <a:t>&gt; </a:t>
+            </a:r>
+            <a:r>
+              <a:rPr lang="nl-BE" dirty="0" err="1">
+                <a:solidFill>
+                  <a:schemeClr val="accent4">
+                    <a:lumMod val="40000"/>
+                    <a:lumOff val="60000"/>
+                  </a:schemeClr>
+                </a:solidFill>
+                <a:latin typeface="Consolas" panose="020B0609020204030204" pitchFamily="49" charset="0"/>
+              </a:rPr>
+              <a:t>terraform</a:t>
+            </a:r>
+            <a:r>
+              <a:rPr lang="nl-BE" dirty="0">
+                <a:solidFill>
+                  <a:schemeClr val="accent4">
+                    <a:lumMod val="40000"/>
+                    <a:lumOff val="60000"/>
+                  </a:schemeClr>
+                </a:solidFill>
+                <a:latin typeface="Consolas" panose="020B0609020204030204" pitchFamily="49" charset="0"/>
+              </a:rPr>
+              <a:t> </a:t>
+            </a:r>
+            <a:r>
+              <a:rPr lang="nl-BE" dirty="0" err="1">
+                <a:solidFill>
+                  <a:schemeClr val="accent4">
+                    <a:lumMod val="40000"/>
+                    <a:lumOff val="60000"/>
+                  </a:schemeClr>
+                </a:solidFill>
+                <a:latin typeface="Consolas" panose="020B0609020204030204" pitchFamily="49" charset="0"/>
+              </a:rPr>
+              <a:t>init</a:t>
+            </a:r>
+            <a:endParaRPr lang="nl-BE" dirty="0">
+              <a:solidFill>
+                <a:schemeClr val="accent4">
+                  <a:lumMod val="40000"/>
+                  <a:lumOff val="60000"/>
+                </a:schemeClr>
+              </a:solidFill>
+              <a:latin typeface="Consolas" panose="020B0609020204030204" pitchFamily="49" charset="0"/>
+            </a:endParaRPr>
+          </a:p>
+        </p:txBody>
+      </p:sp>
+    </p:spTree>
+    <p:extLst>
+      <p:ext uri="{BB962C8B-B14F-4D97-AF65-F5344CB8AC3E}">
+        <p14:creationId xmlns:p14="http://schemas.microsoft.com/office/powerpoint/2010/main" val="3655665136"/>
+      </p:ext>
+    </p:extLst>
+  </p:cSld>
+  <p:clrMapOvr>
+    <a:masterClrMapping/>
+  </p:clrMapOvr>
+  <mc:AlternateContent xmlns:mc="http://schemas.openxmlformats.org/markup-compatibility/2006" xmlns:p14="http://schemas.microsoft.com/office/powerpoint/2010/main">
+    <mc:Choice Requires="p14">
+      <p:transition spd="med" p14:dur="700">
+        <p:fade/>
+      </p:transition>
+    </mc:Choice>
+    <mc:Fallback xmlns="">
+      <p:transition spd="med">
+        <p:fade/>
+      </p:transition>
+    </mc:Fallback>
+  </mc:AlternateContent>
+</p:sld>
+</file>
+
 <file path=ppt/slides/slide2.xml><?xml version="1.0" encoding="utf-8"?>
 <p:sld xmlns:a="http://schemas.openxmlformats.org/drawingml/2006/main" xmlns:r="http://schemas.openxmlformats.org/officeDocument/2006/relationships" xmlns:p="http://schemas.openxmlformats.org/presentationml/2006/main">
   <p:cSld>
@@ -8238,7 +11446,9 @@
         </p:nvSpPr>
         <p:spPr/>
         <p:txBody>
-          <a:bodyPr/>
+          <a:bodyPr>
+            <a:normAutofit fontScale="92500" lnSpcReduction="20000"/>
+          </a:bodyPr>
           <a:lstStyle/>
           <a:p>
             <a:r>
@@ -8409,6 +11619,40 @@
               <a:t>little</a:t>
             </a:r>
             <a:endParaRPr lang="nl-BE" dirty="0"/>
+          </a:p>
+          <a:p>
+            <a:r>
+              <a:rPr lang="nl-BE" dirty="0" err="1"/>
+              <a:t>Uses</a:t>
+            </a:r>
+            <a:r>
+              <a:rPr lang="nl-BE" dirty="0"/>
+              <a:t> storage account </a:t>
+            </a:r>
+            <a:r>
+              <a:rPr lang="nl-BE" dirty="0" err="1"/>
+              <a:t>to</a:t>
+            </a:r>
+            <a:r>
+              <a:rPr lang="nl-BE" dirty="0"/>
+              <a:t> store a backend </a:t>
+            </a:r>
+            <a:r>
+              <a:rPr lang="nl-BE" dirty="0" err="1"/>
+              <a:t>containing</a:t>
+            </a:r>
+            <a:r>
+              <a:rPr lang="nl-BE" dirty="0"/>
+              <a:t> </a:t>
+            </a:r>
+            <a:r>
+              <a:rPr lang="nl-BE" dirty="0" err="1"/>
+              <a:t>the</a:t>
+            </a:r>
+            <a:r>
+              <a:rPr lang="nl-BE" dirty="0"/>
+              <a:t> state</a:t>
+            </a:r>
           </a:p>
           <a:p>
             <a:r>
@@ -9132,6 +12376,859 @@
     <p:extLst>
       <p:ext uri="{BB962C8B-B14F-4D97-AF65-F5344CB8AC3E}">
         <p14:creationId xmlns:p14="http://schemas.microsoft.com/office/powerpoint/2010/main" val="805658672"/>
+      </p:ext>
+    </p:extLst>
+  </p:cSld>
+  <p:clrMapOvr>
+    <a:masterClrMapping/>
+  </p:clrMapOvr>
+  <mc:AlternateContent xmlns:mc="http://schemas.openxmlformats.org/markup-compatibility/2006" xmlns:p14="http://schemas.microsoft.com/office/powerpoint/2010/main">
+    <mc:Choice Requires="p14">
+      <p:transition spd="med" p14:dur="700">
+        <p:fade/>
+      </p:transition>
+    </mc:Choice>
+    <mc:Fallback xmlns="">
+      <p:transition spd="med">
+        <p:fade/>
+      </p:transition>
+    </mc:Fallback>
+  </mc:AlternateContent>
+</p:sld>
+</file>
+
+<file path=ppt/slides/slide9.xml><?xml version="1.0" encoding="utf-8"?>
+<p:sld xmlns:a="http://schemas.openxmlformats.org/drawingml/2006/main" xmlns:r="http://schemas.openxmlformats.org/officeDocument/2006/relationships" xmlns:p="http://schemas.openxmlformats.org/presentationml/2006/main">
+  <p:cSld>
+    <p:spTree>
+      <p:nvGrpSpPr>
+        <p:cNvPr id="1" name=""/>
+        <p:cNvGrpSpPr/>
+        <p:nvPr/>
+      </p:nvGrpSpPr>
+      <p:grpSpPr>
+        <a:xfrm>
+          <a:off x="0" y="0"/>
+          <a:ext cx="0" cy="0"/>
+          <a:chOff x="0" y="0"/>
+          <a:chExt cx="0" cy="0"/>
+        </a:xfrm>
+      </p:grpSpPr>
+      <p:sp>
+        <p:nvSpPr>
+          <p:cNvPr id="2" name="Titel 1">
+            <a:extLst>
+              <a:ext uri="{FF2B5EF4-FFF2-40B4-BE49-F238E27FC236}">
+                <a16:creationId xmlns:a16="http://schemas.microsoft.com/office/drawing/2014/main" id="{4E95B0FF-7F44-4643-8E75-FE04F50ECE92}"/>
+              </a:ext>
+            </a:extLst>
+          </p:cNvPr>
+          <p:cNvSpPr>
+            <a:spLocks noGrp="1"/>
+          </p:cNvSpPr>
+          <p:nvPr>
+            <p:ph type="title"/>
+          </p:nvPr>
+        </p:nvSpPr>
+        <p:spPr/>
+        <p:txBody>
+          <a:bodyPr/>
+          <a:lstStyle/>
+          <a:p>
+            <a:r>
+              <a:rPr lang="nl-BE" dirty="0"/>
+              <a:t>1. </a:t>
+            </a:r>
+            <a:r>
+              <a:rPr lang="nl-BE" dirty="0" err="1"/>
+              <a:t>Installing</a:t>
+            </a:r>
+            <a:r>
+              <a:rPr lang="nl-BE" dirty="0"/>
+              <a:t> </a:t>
+            </a:r>
+            <a:r>
+              <a:rPr lang="nl-BE" dirty="0" err="1"/>
+              <a:t>all</a:t>
+            </a:r>
+            <a:r>
+              <a:rPr lang="nl-BE" dirty="0"/>
+              <a:t> </a:t>
+            </a:r>
+            <a:r>
+              <a:rPr lang="nl-BE" dirty="0" err="1"/>
+              <a:t>the</a:t>
+            </a:r>
+            <a:r>
+              <a:rPr lang="nl-BE" dirty="0"/>
+              <a:t> </a:t>
+            </a:r>
+            <a:r>
+              <a:rPr lang="nl-BE" dirty="0" err="1"/>
+              <a:t>things</a:t>
+            </a:r>
+            <a:endParaRPr lang="nl-BE" dirty="0"/>
+          </a:p>
+        </p:txBody>
+      </p:sp>
+      <p:sp>
+        <p:nvSpPr>
+          <p:cNvPr id="3" name="Tijdelijke aanduiding voor afbeelding 2">
+            <a:extLst>
+              <a:ext uri="{FF2B5EF4-FFF2-40B4-BE49-F238E27FC236}">
+                <a16:creationId xmlns:a16="http://schemas.microsoft.com/office/drawing/2014/main" id="{DCC62E36-5ACD-4385-B90B-412332C08838}"/>
+              </a:ext>
+            </a:extLst>
+          </p:cNvPr>
+          <p:cNvSpPr>
+            <a:spLocks noGrp="1"/>
+          </p:cNvSpPr>
+          <p:nvPr>
+            <p:ph type="pic" idx="1"/>
+          </p:nvPr>
+        </p:nvSpPr>
+        <p:spPr>
+          <a:xfrm>
+            <a:off x="1055440" y="1874520"/>
+            <a:ext cx="5193089" cy="2937510"/>
+          </a:xfrm>
+          <a:solidFill>
+            <a:schemeClr val="accent4">
+              <a:lumMod val="50000"/>
+            </a:schemeClr>
+          </a:solidFill>
+        </p:spPr>
+      </p:sp>
+      <p:sp>
+        <p:nvSpPr>
+          <p:cNvPr id="4" name="Tijdelijke aanduiding voor tekst 3">
+            <a:extLst>
+              <a:ext uri="{FF2B5EF4-FFF2-40B4-BE49-F238E27FC236}">
+                <a16:creationId xmlns:a16="http://schemas.microsoft.com/office/drawing/2014/main" id="{11ACD180-6D93-4985-94B7-080FB372FE66}"/>
+              </a:ext>
+            </a:extLst>
+          </p:cNvPr>
+          <p:cNvSpPr>
+            <a:spLocks noGrp="1"/>
+          </p:cNvSpPr>
+          <p:nvPr>
+            <p:ph type="body" sz="half" idx="2"/>
+          </p:nvPr>
+        </p:nvSpPr>
+        <p:spPr>
+          <a:xfrm>
+            <a:off x="7010400" y="1700808"/>
+            <a:ext cx="4558208" cy="3384376"/>
+          </a:xfrm>
+        </p:spPr>
+        <p:txBody>
+          <a:bodyPr/>
+          <a:lstStyle/>
+          <a:p>
+            <a:r>
+              <a:rPr lang="nl-BE" dirty="0" err="1">
+                <a:latin typeface="Consolas" panose="020B0609020204030204" pitchFamily="49" charset="0"/>
+              </a:rPr>
+              <a:t>You</a:t>
+            </a:r>
+            <a:r>
+              <a:rPr lang="nl-BE" dirty="0">
+                <a:latin typeface="Consolas" panose="020B0609020204030204" pitchFamily="49" charset="0"/>
+              </a:rPr>
+              <a:t> </a:t>
+            </a:r>
+            <a:r>
+              <a:rPr lang="nl-BE" dirty="0" err="1">
+                <a:latin typeface="Consolas" panose="020B0609020204030204" pitchFamily="49" charset="0"/>
+              </a:rPr>
+              <a:t>need</a:t>
+            </a:r>
+            <a:r>
+              <a:rPr lang="nl-BE" dirty="0">
+                <a:latin typeface="Consolas" panose="020B0609020204030204" pitchFamily="49" charset="0"/>
+              </a:rPr>
+              <a:t> 2 </a:t>
+            </a:r>
+            <a:r>
+              <a:rPr lang="nl-BE" dirty="0" err="1">
+                <a:latin typeface="Consolas" panose="020B0609020204030204" pitchFamily="49" charset="0"/>
+              </a:rPr>
+              <a:t>things</a:t>
+            </a:r>
+            <a:r>
+              <a:rPr lang="nl-BE" dirty="0">
+                <a:latin typeface="Consolas" panose="020B0609020204030204" pitchFamily="49" charset="0"/>
+              </a:rPr>
+              <a:t> on </a:t>
+            </a:r>
+            <a:r>
+              <a:rPr lang="nl-BE" dirty="0" err="1">
+                <a:latin typeface="Consolas" panose="020B0609020204030204" pitchFamily="49" charset="0"/>
+              </a:rPr>
+              <a:t>your</a:t>
+            </a:r>
+            <a:r>
+              <a:rPr lang="nl-BE" dirty="0">
+                <a:latin typeface="Consolas" panose="020B0609020204030204" pitchFamily="49" charset="0"/>
+              </a:rPr>
+              <a:t> machine:</a:t>
+            </a:r>
+          </a:p>
+          <a:p>
+            <a:endParaRPr lang="nl-BE" dirty="0">
+              <a:latin typeface="Consolas" panose="020B0609020204030204" pitchFamily="49" charset="0"/>
+            </a:endParaRPr>
+          </a:p>
+          <a:p>
+            <a:pPr marL="285750" indent="-285750">
+              <a:buFontTx/>
+              <a:buChar char="-"/>
+            </a:pPr>
+            <a:r>
+              <a:rPr lang="nl-BE" dirty="0" err="1">
+                <a:latin typeface="Consolas" panose="020B0609020204030204" pitchFamily="49" charset="0"/>
+              </a:rPr>
+              <a:t>Terraform</a:t>
+            </a:r>
+            <a:r>
+              <a:rPr lang="nl-BE" dirty="0">
+                <a:latin typeface="Consolas" panose="020B0609020204030204" pitchFamily="49" charset="0"/>
+              </a:rPr>
+              <a:t> v 0.15.1</a:t>
+            </a:r>
+          </a:p>
+          <a:p>
+            <a:pPr marL="742950" lvl="1" indent="-285750">
+              <a:buFontTx/>
+              <a:buChar char="-"/>
+            </a:pPr>
+            <a:r>
+              <a:rPr lang="nl-BE" dirty="0">
+                <a:latin typeface="Consolas" panose="020B0609020204030204" pitchFamily="49" charset="0"/>
+              </a:rPr>
+              <a:t>From </a:t>
+            </a:r>
+            <a:r>
+              <a:rPr lang="nl-BE" dirty="0" err="1">
+                <a:latin typeface="Consolas" panose="020B0609020204030204" pitchFamily="49" charset="0"/>
+              </a:rPr>
+              <a:t>their</a:t>
+            </a:r>
+            <a:r>
+              <a:rPr lang="nl-BE" dirty="0">
+                <a:latin typeface="Consolas" panose="020B0609020204030204" pitchFamily="49" charset="0"/>
+              </a:rPr>
+              <a:t> website, or via </a:t>
+            </a:r>
+            <a:r>
+              <a:rPr lang="nl-BE" dirty="0" err="1">
+                <a:latin typeface="Consolas" panose="020B0609020204030204" pitchFamily="49" charset="0"/>
+              </a:rPr>
+              <a:t>chocolatey</a:t>
+            </a:r>
+            <a:r>
+              <a:rPr lang="nl-BE" dirty="0">
+                <a:latin typeface="Consolas" panose="020B0609020204030204" pitchFamily="49" charset="0"/>
+              </a:rPr>
+              <a:t> </a:t>
+            </a:r>
+            <a:r>
+              <a:rPr lang="nl-BE" dirty="0" err="1">
+                <a:latin typeface="Consolas" panose="020B0609020204030204" pitchFamily="49" charset="0"/>
+              </a:rPr>
+              <a:t>for</a:t>
+            </a:r>
+            <a:r>
+              <a:rPr lang="nl-BE" dirty="0">
+                <a:latin typeface="Consolas" panose="020B0609020204030204" pitchFamily="49" charset="0"/>
+              </a:rPr>
+              <a:t> </a:t>
+            </a:r>
+            <a:r>
+              <a:rPr lang="nl-BE" dirty="0" err="1">
+                <a:latin typeface="Consolas" panose="020B0609020204030204" pitchFamily="49" charset="0"/>
+              </a:rPr>
+              <a:t>windows</a:t>
+            </a:r>
+            <a:r>
+              <a:rPr lang="nl-BE" dirty="0">
+                <a:latin typeface="Consolas" panose="020B0609020204030204" pitchFamily="49" charset="0"/>
+              </a:rPr>
+              <a:t> (choco </a:t>
+            </a:r>
+            <a:r>
+              <a:rPr lang="nl-BE" dirty="0" err="1">
+                <a:latin typeface="Consolas" panose="020B0609020204030204" pitchFamily="49" charset="0"/>
+              </a:rPr>
+              <a:t>install</a:t>
+            </a:r>
+            <a:r>
+              <a:rPr lang="nl-BE" dirty="0">
+                <a:latin typeface="Consolas" panose="020B0609020204030204" pitchFamily="49" charset="0"/>
+              </a:rPr>
+              <a:t> </a:t>
+            </a:r>
+            <a:r>
+              <a:rPr lang="nl-BE" dirty="0" err="1">
+                <a:latin typeface="Consolas" panose="020B0609020204030204" pitchFamily="49" charset="0"/>
+              </a:rPr>
+              <a:t>terraform</a:t>
+            </a:r>
+            <a:r>
+              <a:rPr lang="nl-BE" dirty="0">
+                <a:latin typeface="Consolas" panose="020B0609020204030204" pitchFamily="49" charset="0"/>
+              </a:rPr>
+              <a:t> --</a:t>
+            </a:r>
+            <a:r>
+              <a:rPr lang="nl-BE" dirty="0" err="1">
+                <a:latin typeface="Consolas" panose="020B0609020204030204" pitchFamily="49" charset="0"/>
+              </a:rPr>
+              <a:t>version</a:t>
+            </a:r>
+            <a:r>
+              <a:rPr lang="nl-BE" dirty="0">
+                <a:latin typeface="Consolas" panose="020B0609020204030204" pitchFamily="49" charset="0"/>
+              </a:rPr>
+              <a:t>=0.15.1)</a:t>
+            </a:r>
+          </a:p>
+          <a:p>
+            <a:pPr marL="285750" indent="-285750">
+              <a:buFontTx/>
+              <a:buChar char="-"/>
+            </a:pPr>
+            <a:r>
+              <a:rPr lang="nl-BE" dirty="0" err="1">
+                <a:latin typeface="Consolas" panose="020B0609020204030204" pitchFamily="49" charset="0"/>
+              </a:rPr>
+              <a:t>Azure</a:t>
+            </a:r>
+            <a:r>
+              <a:rPr lang="nl-BE" dirty="0">
+                <a:latin typeface="Consolas" panose="020B0609020204030204" pitchFamily="49" charset="0"/>
+              </a:rPr>
+              <a:t> CLI</a:t>
+            </a:r>
+          </a:p>
+          <a:p>
+            <a:pPr marL="742950" lvl="1" indent="-285750">
+              <a:buFontTx/>
+              <a:buChar char="-"/>
+            </a:pPr>
+            <a:r>
+              <a:rPr lang="nl-BE" dirty="0">
+                <a:latin typeface="Consolas" panose="020B0609020204030204" pitchFamily="49" charset="0"/>
+              </a:rPr>
+              <a:t>https://docs.microsoft.com/en-us/cli/azure/install-azure-cli</a:t>
+            </a:r>
+          </a:p>
+          <a:p>
+            <a:pPr marL="285750" indent="-285750">
+              <a:buFontTx/>
+              <a:buChar char="-"/>
+            </a:pPr>
+            <a:endParaRPr lang="nl-BE" dirty="0">
+              <a:latin typeface="Consolas" panose="020B0609020204030204" pitchFamily="49" charset="0"/>
+            </a:endParaRPr>
+          </a:p>
+        </p:txBody>
+      </p:sp>
+      <p:sp>
+        <p:nvSpPr>
+          <p:cNvPr id="5" name="Tijdelijke aanduiding voor tekst 3">
+            <a:extLst>
+              <a:ext uri="{FF2B5EF4-FFF2-40B4-BE49-F238E27FC236}">
+                <a16:creationId xmlns:a16="http://schemas.microsoft.com/office/drawing/2014/main" id="{C81F799A-A64A-4491-A23D-83D21CD6724C}"/>
+              </a:ext>
+            </a:extLst>
+          </p:cNvPr>
+          <p:cNvSpPr txBox="1">
+            <a:spLocks/>
+          </p:cNvSpPr>
+          <p:nvPr/>
+        </p:nvSpPr>
+        <p:spPr>
+          <a:xfrm>
+            <a:off x="1271464" y="2060848"/>
+            <a:ext cx="4824536" cy="2592288"/>
+          </a:xfrm>
+          <a:prstGeom prst="rect">
+            <a:avLst/>
+          </a:prstGeom>
+          <a:solidFill>
+            <a:schemeClr val="accent4">
+              <a:lumMod val="50000"/>
+            </a:schemeClr>
+          </a:solidFill>
+        </p:spPr>
+        <p:txBody>
+          <a:bodyPr vert="horz" lIns="91440" tIns="45720" rIns="91440" bIns="45720" rtlCol="0">
+            <a:normAutofit/>
+          </a:bodyPr>
+          <a:lstStyle>
+            <a:lvl1pPr marL="0" indent="0" algn="l" defTabSz="914400" rtl="0" eaLnBrk="1" latinLnBrk="0" hangingPunct="1">
+              <a:lnSpc>
+                <a:spcPct val="90000"/>
+              </a:lnSpc>
+              <a:spcBef>
+                <a:spcPts val="1200"/>
+              </a:spcBef>
+              <a:buFont typeface="Arial" panose="020B0604020202020204" pitchFamily="34" charset="0"/>
+              <a:buNone/>
+              <a:defRPr sz="1800" kern="1200">
+                <a:solidFill>
+                  <a:schemeClr val="tx1"/>
+                </a:solidFill>
+                <a:latin typeface="+mn-lt"/>
+                <a:ea typeface="+mn-ea"/>
+                <a:cs typeface="+mn-cs"/>
+              </a:defRPr>
+            </a:lvl1pPr>
+            <a:lvl2pPr marL="457200" indent="0" algn="l" defTabSz="914400" rtl="0" eaLnBrk="1" latinLnBrk="0" hangingPunct="1">
+              <a:lnSpc>
+                <a:spcPct val="90000"/>
+              </a:lnSpc>
+              <a:spcBef>
+                <a:spcPts val="1200"/>
+              </a:spcBef>
+              <a:buFont typeface="Arial" panose="020B0604020202020204" pitchFamily="34" charset="0"/>
+              <a:buNone/>
+              <a:defRPr sz="1400" kern="1200">
+                <a:solidFill>
+                  <a:schemeClr val="tx1"/>
+                </a:solidFill>
+                <a:latin typeface="+mn-lt"/>
+                <a:ea typeface="+mn-ea"/>
+                <a:cs typeface="+mn-cs"/>
+              </a:defRPr>
+            </a:lvl2pPr>
+            <a:lvl3pPr marL="914400" indent="0" algn="l" defTabSz="914400" rtl="0" eaLnBrk="1" latinLnBrk="0" hangingPunct="1">
+              <a:lnSpc>
+                <a:spcPct val="90000"/>
+              </a:lnSpc>
+              <a:spcBef>
+                <a:spcPts val="600"/>
+              </a:spcBef>
+              <a:buFont typeface="Arial" panose="020B0604020202020204" pitchFamily="34" charset="0"/>
+              <a:buNone/>
+              <a:defRPr sz="1200" kern="1200">
+                <a:solidFill>
+                  <a:schemeClr val="tx1"/>
+                </a:solidFill>
+                <a:latin typeface="+mn-lt"/>
+                <a:ea typeface="+mn-ea"/>
+                <a:cs typeface="+mn-cs"/>
+              </a:defRPr>
+            </a:lvl3pPr>
+            <a:lvl4pPr marL="1371600" indent="0" algn="l" defTabSz="914400" rtl="0" eaLnBrk="1" latinLnBrk="0" hangingPunct="1">
+              <a:lnSpc>
+                <a:spcPct val="90000"/>
+              </a:lnSpc>
+              <a:spcBef>
+                <a:spcPts val="600"/>
+              </a:spcBef>
+              <a:buFont typeface="Arial" panose="020B0604020202020204" pitchFamily="34" charset="0"/>
+              <a:buNone/>
+              <a:defRPr sz="1000" kern="1200">
+                <a:solidFill>
+                  <a:schemeClr val="tx1"/>
+                </a:solidFill>
+                <a:latin typeface="+mn-lt"/>
+                <a:ea typeface="+mn-ea"/>
+                <a:cs typeface="+mn-cs"/>
+              </a:defRPr>
+            </a:lvl4pPr>
+            <a:lvl5pPr marL="1828800" indent="0" algn="l" defTabSz="914400" rtl="0" eaLnBrk="1" latinLnBrk="0" hangingPunct="1">
+              <a:lnSpc>
+                <a:spcPct val="90000"/>
+              </a:lnSpc>
+              <a:spcBef>
+                <a:spcPts val="600"/>
+              </a:spcBef>
+              <a:buFont typeface="Arial" panose="020B0604020202020204" pitchFamily="34" charset="0"/>
+              <a:buNone/>
+              <a:defRPr sz="1000" kern="1200">
+                <a:solidFill>
+                  <a:schemeClr val="tx1"/>
+                </a:solidFill>
+                <a:latin typeface="+mn-lt"/>
+                <a:ea typeface="+mn-ea"/>
+                <a:cs typeface="+mn-cs"/>
+              </a:defRPr>
+            </a:lvl5pPr>
+            <a:lvl6pPr marL="2286000" indent="0" algn="l" defTabSz="914400" rtl="0" eaLnBrk="1" latinLnBrk="0" hangingPunct="1">
+              <a:lnSpc>
+                <a:spcPct val="90000"/>
+              </a:lnSpc>
+              <a:spcBef>
+                <a:spcPts val="600"/>
+              </a:spcBef>
+              <a:buFont typeface="Arial" panose="020B0604020202020204" pitchFamily="34" charset="0"/>
+              <a:buNone/>
+              <a:defRPr sz="1000" kern="1200">
+                <a:solidFill>
+                  <a:schemeClr val="tx1"/>
+                </a:solidFill>
+                <a:latin typeface="+mn-lt"/>
+                <a:ea typeface="+mn-ea"/>
+                <a:cs typeface="+mn-cs"/>
+              </a:defRPr>
+            </a:lvl6pPr>
+            <a:lvl7pPr marL="2743200" indent="0" algn="l" defTabSz="914400" rtl="0" eaLnBrk="1" latinLnBrk="0" hangingPunct="1">
+              <a:lnSpc>
+                <a:spcPct val="90000"/>
+              </a:lnSpc>
+              <a:spcBef>
+                <a:spcPts val="600"/>
+              </a:spcBef>
+              <a:buFont typeface="Arial" panose="020B0604020202020204" pitchFamily="34" charset="0"/>
+              <a:buNone/>
+              <a:defRPr sz="1000" kern="1200">
+                <a:solidFill>
+                  <a:schemeClr val="tx1"/>
+                </a:solidFill>
+                <a:latin typeface="+mn-lt"/>
+                <a:ea typeface="+mn-ea"/>
+                <a:cs typeface="+mn-cs"/>
+              </a:defRPr>
+            </a:lvl7pPr>
+            <a:lvl8pPr marL="3200400" indent="0" algn="l" defTabSz="914400" rtl="0" eaLnBrk="1" latinLnBrk="0" hangingPunct="1">
+              <a:lnSpc>
+                <a:spcPct val="90000"/>
+              </a:lnSpc>
+              <a:spcBef>
+                <a:spcPts val="600"/>
+              </a:spcBef>
+              <a:buFont typeface="Arial" panose="020B0604020202020204" pitchFamily="34" charset="0"/>
+              <a:buNone/>
+              <a:defRPr sz="1000" kern="1200">
+                <a:solidFill>
+                  <a:schemeClr val="tx1"/>
+                </a:solidFill>
+                <a:latin typeface="+mn-lt"/>
+                <a:ea typeface="+mn-ea"/>
+                <a:cs typeface="+mn-cs"/>
+              </a:defRPr>
+            </a:lvl8pPr>
+            <a:lvl9pPr marL="3657600" indent="0" algn="l" defTabSz="914400" rtl="0" eaLnBrk="1" latinLnBrk="0" hangingPunct="1">
+              <a:lnSpc>
+                <a:spcPct val="90000"/>
+              </a:lnSpc>
+              <a:spcBef>
+                <a:spcPts val="600"/>
+              </a:spcBef>
+              <a:buFont typeface="Arial" panose="020B0604020202020204" pitchFamily="34" charset="0"/>
+              <a:buNone/>
+              <a:defRPr sz="1000" kern="1200">
+                <a:solidFill>
+                  <a:schemeClr val="tx1"/>
+                </a:solidFill>
+                <a:latin typeface="+mn-lt"/>
+                <a:ea typeface="+mn-ea"/>
+                <a:cs typeface="+mn-cs"/>
+              </a:defRPr>
+            </a:lvl9pPr>
+          </a:lstStyle>
+          <a:p>
+            <a:pPr>
+              <a:tabLst>
+                <a:tab pos="360363" algn="l"/>
+              </a:tabLst>
+            </a:pPr>
+            <a:r>
+              <a:rPr lang="nl-BE" dirty="0">
+                <a:solidFill>
+                  <a:schemeClr val="accent4">
+                    <a:lumMod val="40000"/>
+                    <a:lumOff val="60000"/>
+                  </a:schemeClr>
+                </a:solidFill>
+                <a:latin typeface="Consolas" panose="020B0609020204030204" pitchFamily="49" charset="0"/>
+              </a:rPr>
+              <a:t>&gt; choco </a:t>
+            </a:r>
+            <a:r>
+              <a:rPr lang="nl-BE" dirty="0" err="1">
+                <a:solidFill>
+                  <a:schemeClr val="accent4">
+                    <a:lumMod val="40000"/>
+                    <a:lumOff val="60000"/>
+                  </a:schemeClr>
+                </a:solidFill>
+                <a:latin typeface="Consolas" panose="020B0609020204030204" pitchFamily="49" charset="0"/>
+              </a:rPr>
+              <a:t>install</a:t>
+            </a:r>
+            <a:r>
+              <a:rPr lang="nl-BE" dirty="0">
+                <a:solidFill>
+                  <a:schemeClr val="accent4">
+                    <a:lumMod val="40000"/>
+                    <a:lumOff val="60000"/>
+                  </a:schemeClr>
+                </a:solidFill>
+                <a:latin typeface="Consolas" panose="020B0609020204030204" pitchFamily="49" charset="0"/>
+              </a:rPr>
+              <a:t> </a:t>
+            </a:r>
+            <a:r>
+              <a:rPr lang="nl-BE" dirty="0" err="1">
+                <a:solidFill>
+                  <a:schemeClr val="accent4">
+                    <a:lumMod val="40000"/>
+                    <a:lumOff val="60000"/>
+                  </a:schemeClr>
+                </a:solidFill>
+                <a:latin typeface="Consolas" panose="020B0609020204030204" pitchFamily="49" charset="0"/>
+              </a:rPr>
+              <a:t>terraform</a:t>
+            </a:r>
+            <a:r>
+              <a:rPr lang="nl-BE" dirty="0">
+                <a:solidFill>
+                  <a:schemeClr val="accent4">
+                    <a:lumMod val="40000"/>
+                    <a:lumOff val="60000"/>
+                  </a:schemeClr>
+                </a:solidFill>
+                <a:latin typeface="Consolas" panose="020B0609020204030204" pitchFamily="49" charset="0"/>
+              </a:rPr>
+              <a:t> --</a:t>
+            </a:r>
+            <a:r>
+              <a:rPr lang="nl-BE" dirty="0" err="1">
+                <a:solidFill>
+                  <a:schemeClr val="accent4">
+                    <a:lumMod val="40000"/>
+                    <a:lumOff val="60000"/>
+                  </a:schemeClr>
+                </a:solidFill>
+                <a:latin typeface="Consolas" panose="020B0609020204030204" pitchFamily="49" charset="0"/>
+              </a:rPr>
+              <a:t>version</a:t>
+            </a:r>
+            <a:r>
+              <a:rPr lang="nl-BE" dirty="0">
+                <a:solidFill>
+                  <a:schemeClr val="accent4">
+                    <a:lumMod val="40000"/>
+                    <a:lumOff val="60000"/>
+                  </a:schemeClr>
+                </a:solidFill>
+                <a:latin typeface="Consolas" panose="020B0609020204030204" pitchFamily="49" charset="0"/>
+              </a:rPr>
+              <a:t>=0.15.1</a:t>
+            </a:r>
+            <a:br>
+              <a:rPr lang="nl-BE" dirty="0">
+                <a:solidFill>
+                  <a:schemeClr val="accent4">
+                    <a:lumMod val="40000"/>
+                    <a:lumOff val="60000"/>
+                  </a:schemeClr>
+                </a:solidFill>
+                <a:latin typeface="Consolas" panose="020B0609020204030204" pitchFamily="49" charset="0"/>
+              </a:rPr>
+            </a:br>
+            <a:br>
+              <a:rPr lang="nl-BE" dirty="0">
+                <a:solidFill>
+                  <a:schemeClr val="accent4">
+                    <a:lumMod val="40000"/>
+                    <a:lumOff val="60000"/>
+                  </a:schemeClr>
+                </a:solidFill>
+                <a:latin typeface="Consolas" panose="020B0609020204030204" pitchFamily="49" charset="0"/>
+              </a:rPr>
+            </a:br>
+            <a:r>
+              <a:rPr lang="nl-BE" dirty="0">
+                <a:solidFill>
+                  <a:schemeClr val="accent4">
+                    <a:lumMod val="40000"/>
+                    <a:lumOff val="60000"/>
+                  </a:schemeClr>
+                </a:solidFill>
+                <a:latin typeface="Consolas" panose="020B0609020204030204" pitchFamily="49" charset="0"/>
+              </a:rPr>
+              <a:t>&gt; </a:t>
+            </a:r>
+            <a:r>
+              <a:rPr lang="nl-BE" dirty="0" err="1">
+                <a:solidFill>
+                  <a:schemeClr val="accent4">
+                    <a:lumMod val="40000"/>
+                    <a:lumOff val="60000"/>
+                  </a:schemeClr>
+                </a:solidFill>
+                <a:latin typeface="Consolas" panose="020B0609020204030204" pitchFamily="49" charset="0"/>
+              </a:rPr>
+              <a:t>Invoke-WebRequest</a:t>
+            </a:r>
+            <a:r>
+              <a:rPr lang="nl-BE" dirty="0">
+                <a:solidFill>
+                  <a:schemeClr val="accent4">
+                    <a:lumMod val="40000"/>
+                    <a:lumOff val="60000"/>
+                  </a:schemeClr>
+                </a:solidFill>
+                <a:latin typeface="Consolas" panose="020B0609020204030204" pitchFamily="49" charset="0"/>
+              </a:rPr>
+              <a:t> -Uri https://aka.ms/installazurecliwindows -</a:t>
+            </a:r>
+            <a:r>
+              <a:rPr lang="nl-BE" dirty="0" err="1">
+                <a:solidFill>
+                  <a:schemeClr val="accent4">
+                    <a:lumMod val="40000"/>
+                    <a:lumOff val="60000"/>
+                  </a:schemeClr>
+                </a:solidFill>
+                <a:latin typeface="Consolas" panose="020B0609020204030204" pitchFamily="49" charset="0"/>
+              </a:rPr>
+              <a:t>OutFile</a:t>
+            </a:r>
+            <a:r>
+              <a:rPr lang="nl-BE" dirty="0">
+                <a:solidFill>
+                  <a:schemeClr val="accent4">
+                    <a:lumMod val="40000"/>
+                    <a:lumOff val="60000"/>
+                  </a:schemeClr>
+                </a:solidFill>
+                <a:latin typeface="Consolas" panose="020B0609020204030204" pitchFamily="49" charset="0"/>
+              </a:rPr>
+              <a:t> .\AzureCLI.msi; Start-</a:t>
+            </a:r>
+            <a:r>
+              <a:rPr lang="nl-BE" dirty="0" err="1">
+                <a:solidFill>
+                  <a:schemeClr val="accent4">
+                    <a:lumMod val="40000"/>
+                    <a:lumOff val="60000"/>
+                  </a:schemeClr>
+                </a:solidFill>
+                <a:latin typeface="Consolas" panose="020B0609020204030204" pitchFamily="49" charset="0"/>
+              </a:rPr>
+              <a:t>Process</a:t>
+            </a:r>
+            <a:r>
+              <a:rPr lang="nl-BE" dirty="0">
+                <a:solidFill>
+                  <a:schemeClr val="accent4">
+                    <a:lumMod val="40000"/>
+                    <a:lumOff val="60000"/>
+                  </a:schemeClr>
+                </a:solidFill>
+                <a:latin typeface="Consolas" panose="020B0609020204030204" pitchFamily="49" charset="0"/>
+              </a:rPr>
+              <a:t> msiexec.exe -</a:t>
+            </a:r>
+            <a:r>
+              <a:rPr lang="nl-BE" dirty="0" err="1">
+                <a:solidFill>
+                  <a:schemeClr val="accent4">
+                    <a:lumMod val="40000"/>
+                    <a:lumOff val="60000"/>
+                  </a:schemeClr>
+                </a:solidFill>
+                <a:latin typeface="Consolas" panose="020B0609020204030204" pitchFamily="49" charset="0"/>
+              </a:rPr>
+              <a:t>Wait</a:t>
+            </a:r>
+            <a:r>
+              <a:rPr lang="nl-BE" dirty="0">
+                <a:solidFill>
+                  <a:schemeClr val="accent4">
+                    <a:lumMod val="40000"/>
+                    <a:lumOff val="60000"/>
+                  </a:schemeClr>
+                </a:solidFill>
+                <a:latin typeface="Consolas" panose="020B0609020204030204" pitchFamily="49" charset="0"/>
+              </a:rPr>
+              <a:t> -</a:t>
+            </a:r>
+            <a:r>
+              <a:rPr lang="nl-BE" dirty="0" err="1">
+                <a:solidFill>
+                  <a:schemeClr val="accent4">
+                    <a:lumMod val="40000"/>
+                    <a:lumOff val="60000"/>
+                  </a:schemeClr>
+                </a:solidFill>
+                <a:latin typeface="Consolas" panose="020B0609020204030204" pitchFamily="49" charset="0"/>
+              </a:rPr>
+              <a:t>ArgumentList</a:t>
+            </a:r>
+            <a:r>
+              <a:rPr lang="nl-BE" dirty="0">
+                <a:solidFill>
+                  <a:schemeClr val="accent4">
+                    <a:lumMod val="40000"/>
+                    <a:lumOff val="60000"/>
+                  </a:schemeClr>
+                </a:solidFill>
+                <a:latin typeface="Consolas" panose="020B0609020204030204" pitchFamily="49" charset="0"/>
+              </a:rPr>
+              <a:t> '/I AzureCLI.msi /</a:t>
+            </a:r>
+            <a:r>
+              <a:rPr lang="nl-BE" dirty="0" err="1">
+                <a:solidFill>
+                  <a:schemeClr val="accent4">
+                    <a:lumMod val="40000"/>
+                    <a:lumOff val="60000"/>
+                  </a:schemeClr>
+                </a:solidFill>
+                <a:latin typeface="Consolas" panose="020B0609020204030204" pitchFamily="49" charset="0"/>
+              </a:rPr>
+              <a:t>quiet</a:t>
+            </a:r>
+            <a:r>
+              <a:rPr lang="nl-BE" dirty="0">
+                <a:solidFill>
+                  <a:schemeClr val="accent4">
+                    <a:lumMod val="40000"/>
+                    <a:lumOff val="60000"/>
+                  </a:schemeClr>
+                </a:solidFill>
+                <a:latin typeface="Consolas" panose="020B0609020204030204" pitchFamily="49" charset="0"/>
+              </a:rPr>
+              <a:t>'; </a:t>
+            </a:r>
+            <a:r>
+              <a:rPr lang="nl-BE" dirty="0" err="1">
+                <a:solidFill>
+                  <a:schemeClr val="accent4">
+                    <a:lumMod val="40000"/>
+                    <a:lumOff val="60000"/>
+                  </a:schemeClr>
+                </a:solidFill>
+                <a:latin typeface="Consolas" panose="020B0609020204030204" pitchFamily="49" charset="0"/>
+              </a:rPr>
+              <a:t>rm</a:t>
+            </a:r>
+            <a:r>
+              <a:rPr lang="nl-BE" dirty="0">
+                <a:solidFill>
+                  <a:schemeClr val="accent4">
+                    <a:lumMod val="40000"/>
+                    <a:lumOff val="60000"/>
+                  </a:schemeClr>
+                </a:solidFill>
+                <a:latin typeface="Consolas" panose="020B0609020204030204" pitchFamily="49" charset="0"/>
+              </a:rPr>
+              <a:t> .\AzureCLI.msi</a:t>
+            </a:r>
+          </a:p>
+        </p:txBody>
+      </p:sp>
+    </p:spTree>
+    <p:extLst>
+      <p:ext uri="{BB962C8B-B14F-4D97-AF65-F5344CB8AC3E}">
+        <p14:creationId xmlns:p14="http://schemas.microsoft.com/office/powerpoint/2010/main" val="3971473877"/>
       </p:ext>
     </p:extLst>
   </p:cSld>
@@ -10140,16 +14237,16 @@
 <file path=customXml/itemProps1.xml><?xml version="1.0" encoding="utf-8"?>
 <ds:datastoreItem xmlns:ds="http://schemas.openxmlformats.org/officeDocument/2006/customXml" ds:itemID="{1DA15C6C-6BB6-4DB6-B7D6-7F14EAB2CC5C}">
   <ds:schemaRefs>
+    <ds:schemaRef ds:uri="a4f35948-e619-41b3-aa29-22878b09cfd2"/>
+    <ds:schemaRef ds:uri="http://schemas.microsoft.com/office/infopath/2007/PartnerControls"/>
+    <ds:schemaRef ds:uri="http://purl.org/dc/terms/"/>
+    <ds:schemaRef ds:uri="http://schemas.microsoft.com/office/2006/metadata/properties"/>
     <ds:schemaRef ds:uri="http://schemas.microsoft.com/office/2006/documentManagement/types"/>
-    <ds:schemaRef ds:uri="http://purl.org/dc/dcmitype/"/>
-    <ds:schemaRef ds:uri="http://schemas.microsoft.com/office/infopath/2007/PartnerControls"/>
     <ds:schemaRef ds:uri="http://purl.org/dc/elements/1.1/"/>
-    <ds:schemaRef ds:uri="http://schemas.microsoft.com/office/2006/metadata/properties"/>
-    <ds:schemaRef ds:uri="http://purl.org/dc/terms/"/>
     <ds:schemaRef ds:uri="http://schemas.openxmlformats.org/package/2006/metadata/core-properties"/>
     <ds:schemaRef ds:uri="40262f94-9f35-4ac3-9a90-690165a166b7"/>
-    <ds:schemaRef ds:uri="a4f35948-e619-41b3-aa29-22878b09cfd2"/>
     <ds:schemaRef ds:uri="http://www.w3.org/XML/1998/namespace"/>
+    <ds:schemaRef ds:uri="http://purl.org/dc/dcmitype/"/>
   </ds:schemaRefs>
 </ds:datastoreItem>
 </file>

</xml_diff>

<commit_message>
Changed resource group name
</commit_message>
<xml_diff>
--- a/Terraform 101.pptx
+++ b/Terraform 101.pptx
@@ -11294,47 +11294,12 @@
           <a:chExt cx="0" cy="0"/>
         </a:xfrm>
       </p:grpSpPr>
-      <p:sp>
-        <p:nvSpPr>
-          <p:cNvPr id="2" name="Titel 1">
+      <p:pic>
+        <p:nvPicPr>
+          <p:cNvPr id="5" name="Afbeelding 4">
             <a:extLst>
               <a:ext uri="{FF2B5EF4-FFF2-40B4-BE49-F238E27FC236}">
-                <a16:creationId xmlns:a16="http://schemas.microsoft.com/office/drawing/2014/main" id="{4E95B0FF-7F44-4643-8E75-FE04F50ECE92}"/>
-              </a:ext>
-            </a:extLst>
-          </p:cNvPr>
-          <p:cNvSpPr>
-            <a:spLocks noGrp="1"/>
-          </p:cNvSpPr>
-          <p:nvPr>
-            <p:ph type="title"/>
-          </p:nvPr>
-        </p:nvSpPr>
-        <p:spPr>
-          <a:xfrm>
-            <a:off x="838200" y="365126"/>
-            <a:ext cx="9829800" cy="1082674"/>
-          </a:xfrm>
-        </p:spPr>
-        <p:txBody>
-          <a:bodyPr anchor="b">
-            <a:normAutofit/>
-          </a:bodyPr>
-          <a:lstStyle/>
-          <a:p>
-            <a:r>
-              <a:rPr lang="nl-BE" dirty="0"/>
-              <a:t>6. The Resource Group</a:t>
-            </a:r>
-          </a:p>
-        </p:txBody>
-      </p:sp>
-      <p:pic>
-        <p:nvPicPr>
-          <p:cNvPr id="6" name="Afbeelding 5">
-            <a:extLst>
-              <a:ext uri="{FF2B5EF4-FFF2-40B4-BE49-F238E27FC236}">
-                <a16:creationId xmlns:a16="http://schemas.microsoft.com/office/drawing/2014/main" id="{98148F28-274F-4B1A-B4E8-7475B544B104}"/>
+                <a16:creationId xmlns:a16="http://schemas.microsoft.com/office/drawing/2014/main" id="{A7B1C631-A29D-4AC0-815E-AB57C27D0023}"/>
               </a:ext>
             </a:extLst>
           </p:cNvPr>
@@ -11351,15 +11316,49 @@
         </p:blipFill>
         <p:spPr>
           <a:xfrm>
-            <a:off x="983433" y="1529696"/>
-            <a:ext cx="4824536" cy="4694951"/>
+            <a:off x="911424" y="1556792"/>
+            <a:ext cx="4791744" cy="4744112"/>
           </a:xfrm>
           <a:prstGeom prst="rect">
             <a:avLst/>
           </a:prstGeom>
-          <a:noFill/>
         </p:spPr>
       </p:pic>
+      <p:sp>
+        <p:nvSpPr>
+          <p:cNvPr id="2" name="Titel 1">
+            <a:extLst>
+              <a:ext uri="{FF2B5EF4-FFF2-40B4-BE49-F238E27FC236}">
+                <a16:creationId xmlns:a16="http://schemas.microsoft.com/office/drawing/2014/main" id="{4E95B0FF-7F44-4643-8E75-FE04F50ECE92}"/>
+              </a:ext>
+            </a:extLst>
+          </p:cNvPr>
+          <p:cNvSpPr>
+            <a:spLocks noGrp="1"/>
+          </p:cNvSpPr>
+          <p:nvPr>
+            <p:ph type="title"/>
+          </p:nvPr>
+        </p:nvSpPr>
+        <p:spPr>
+          <a:xfrm>
+            <a:off x="838200" y="365126"/>
+            <a:ext cx="9829800" cy="1082674"/>
+          </a:xfrm>
+        </p:spPr>
+        <p:txBody>
+          <a:bodyPr anchor="b">
+            <a:normAutofit/>
+          </a:bodyPr>
+          <a:lstStyle/>
+          <a:p>
+            <a:r>
+              <a:rPr lang="nl-BE" dirty="0"/>
+              <a:t>6. The Resource Group</a:t>
+            </a:r>
+          </a:p>
+        </p:txBody>
+      </p:sp>
       <p:sp>
         <p:nvSpPr>
           <p:cNvPr id="4" name="Tijdelijke aanduiding voor tekst 3">

</xml_diff>

<commit_message>
Updated ppt for the new resource group name
</commit_message>
<xml_diff>
--- a/Terraform 101.pptx
+++ b/Terraform 101.pptx
@@ -882,6 +882,91 @@
     <p:extLst>
       <p:ext uri="{BB962C8B-B14F-4D97-AF65-F5344CB8AC3E}">
         <p14:creationId xmlns:p14="http://schemas.microsoft.com/office/powerpoint/2010/main" val="2354034956"/>
+      </p:ext>
+    </p:extLst>
+  </p:cSld>
+  <p:clrMapOvr>
+    <a:masterClrMapping/>
+  </p:clrMapOvr>
+</p:notes>
+</file>
+
+<file path=ppt/notesSlides/notesSlide3.xml><?xml version="1.0" encoding="utf-8"?>
+<p:notes xmlns:a="http://schemas.openxmlformats.org/drawingml/2006/main" xmlns:r="http://schemas.openxmlformats.org/officeDocument/2006/relationships" xmlns:p="http://schemas.openxmlformats.org/presentationml/2006/main">
+  <p:cSld>
+    <p:spTree>
+      <p:nvGrpSpPr>
+        <p:cNvPr id="1" name=""/>
+        <p:cNvGrpSpPr/>
+        <p:nvPr/>
+      </p:nvGrpSpPr>
+      <p:grpSpPr>
+        <a:xfrm>
+          <a:off x="0" y="0"/>
+          <a:ext cx="0" cy="0"/>
+          <a:chOff x="0" y="0"/>
+          <a:chExt cx="0" cy="0"/>
+        </a:xfrm>
+      </p:grpSpPr>
+      <p:sp>
+        <p:nvSpPr>
+          <p:cNvPr id="2" name="Tijdelijke aanduiding voor dia-afbeelding 1"/>
+          <p:cNvSpPr>
+            <a:spLocks noGrp="1" noRot="1" noChangeAspect="1"/>
+          </p:cNvSpPr>
+          <p:nvPr>
+            <p:ph type="sldImg"/>
+          </p:nvPr>
+        </p:nvSpPr>
+        <p:spPr/>
+      </p:sp>
+      <p:sp>
+        <p:nvSpPr>
+          <p:cNvPr id="3" name="Tijdelijke aanduiding voor notities 2"/>
+          <p:cNvSpPr>
+            <a:spLocks noGrp="1"/>
+          </p:cNvSpPr>
+          <p:nvPr>
+            <p:ph type="body" idx="1"/>
+          </p:nvPr>
+        </p:nvSpPr>
+        <p:spPr/>
+        <p:txBody>
+          <a:bodyPr/>
+          <a:lstStyle/>
+          <a:p>
+            <a:endParaRPr lang="nl-BE" dirty="0"/>
+          </a:p>
+        </p:txBody>
+      </p:sp>
+      <p:sp>
+        <p:nvSpPr>
+          <p:cNvPr id="4" name="Tijdelijke aanduiding voor dianummer 3"/>
+          <p:cNvSpPr>
+            <a:spLocks noGrp="1"/>
+          </p:cNvSpPr>
+          <p:nvPr>
+            <p:ph type="sldNum" sz="quarter" idx="5"/>
+          </p:nvPr>
+        </p:nvSpPr>
+        <p:spPr/>
+        <p:txBody>
+          <a:bodyPr/>
+          <a:lstStyle/>
+          <a:p>
+            <a:pPr rtl="0"/>
+            <a:fld id="{5534C2EF-8A97-4DAF-B099-E567883644D6}" type="slidenum">
+              <a:rPr lang="nl-NL" noProof="0" smtClean="0"/>
+              <a:t>19</a:t>
+            </a:fld>
+            <a:endParaRPr lang="nl-NL" noProof="0" dirty="0"/>
+          </a:p>
+        </p:txBody>
+      </p:sp>
+    </p:spTree>
+    <p:extLst>
+      <p:ext uri="{BB962C8B-B14F-4D97-AF65-F5344CB8AC3E}">
+        <p14:creationId xmlns:p14="http://schemas.microsoft.com/office/powerpoint/2010/main" val="300509819"/>
       </p:ext>
     </p:extLst>
   </p:cSld>
@@ -12060,10 +12145,10 @@
       </p:sp>
       <p:pic>
         <p:nvPicPr>
-          <p:cNvPr id="5" name="Afbeelding 4">
+          <p:cNvPr id="10" name="Afbeelding 9">
             <a:extLst>
               <a:ext uri="{FF2B5EF4-FFF2-40B4-BE49-F238E27FC236}">
-                <a16:creationId xmlns:a16="http://schemas.microsoft.com/office/drawing/2014/main" id="{D4F6EB6A-976B-4D74-9F20-DDD25B3ED25F}"/>
+                <a16:creationId xmlns:a16="http://schemas.microsoft.com/office/drawing/2014/main" id="{AE817AE2-161E-4549-A4CB-D751F217D5F1}"/>
               </a:ext>
             </a:extLst>
           </p:cNvPr>
@@ -12080,8 +12165,8 @@
         </p:blipFill>
         <p:spPr>
           <a:xfrm>
-            <a:off x="1487488" y="2924944"/>
-            <a:ext cx="9058875" cy="3808333"/>
+            <a:off x="1487488" y="2967781"/>
+            <a:ext cx="8898903" cy="3525093"/>
           </a:xfrm>
           <a:prstGeom prst="rect">
             <a:avLst/>
@@ -12102,7 +12187,7 @@
         </p:nvSpPr>
         <p:spPr>
           <a:xfrm>
-            <a:off x="1487488" y="3933056"/>
+            <a:off x="1541579" y="4221088"/>
             <a:ext cx="3744416" cy="1944216"/>
           </a:xfrm>
           <a:prstGeom prst="rect">
@@ -12184,6 +12269,36 @@
           <a:chExt cx="0" cy="0"/>
         </a:xfrm>
       </p:grpSpPr>
+      <p:pic>
+        <p:nvPicPr>
+          <p:cNvPr id="7" name="Afbeelding 6">
+            <a:extLst>
+              <a:ext uri="{FF2B5EF4-FFF2-40B4-BE49-F238E27FC236}">
+                <a16:creationId xmlns:a16="http://schemas.microsoft.com/office/drawing/2014/main" id="{A80CD2A0-4C59-42DC-85BA-CD35F10D8523}"/>
+              </a:ext>
+            </a:extLst>
+          </p:cNvPr>
+          <p:cNvPicPr>
+            <a:picLocks noChangeAspect="1"/>
+          </p:cNvPicPr>
+          <p:nvPr/>
+        </p:nvPicPr>
+        <p:blipFill>
+          <a:blip r:embed="rId3"/>
+          <a:stretch>
+            <a:fillRect/>
+          </a:stretch>
+        </p:blipFill>
+        <p:spPr>
+          <a:xfrm>
+            <a:off x="1819514" y="2471398"/>
+            <a:ext cx="8462618" cy="4063547"/>
+          </a:xfrm>
+          <a:prstGeom prst="rect">
+            <a:avLst/>
+          </a:prstGeom>
+        </p:spPr>
+      </p:pic>
       <p:sp>
         <p:nvSpPr>
           <p:cNvPr id="2" name="Titel 1">
@@ -12313,36 +12428,6 @@
           </a:p>
         </p:txBody>
       </p:sp>
-      <p:pic>
-        <p:nvPicPr>
-          <p:cNvPr id="3" name="Afbeelding 2">
-            <a:extLst>
-              <a:ext uri="{FF2B5EF4-FFF2-40B4-BE49-F238E27FC236}">
-                <a16:creationId xmlns:a16="http://schemas.microsoft.com/office/drawing/2014/main" id="{50BC0C89-A36D-4246-97C4-7EECD2B922AF}"/>
-              </a:ext>
-            </a:extLst>
-          </p:cNvPr>
-          <p:cNvPicPr>
-            <a:picLocks noChangeAspect="1"/>
-          </p:cNvPicPr>
-          <p:nvPr/>
-        </p:nvPicPr>
-        <p:blipFill>
-          <a:blip r:embed="rId2"/>
-          <a:stretch>
-            <a:fillRect/>
-          </a:stretch>
-        </p:blipFill>
-        <p:spPr>
-          <a:xfrm>
-            <a:off x="2189222" y="2261073"/>
-            <a:ext cx="7813556" cy="4231801"/>
-          </a:xfrm>
-          <a:prstGeom prst="rect">
-            <a:avLst/>
-          </a:prstGeom>
-        </p:spPr>
-      </p:pic>
       <p:sp>
         <p:nvSpPr>
           <p:cNvPr id="9" name="Rechthoek 8">
@@ -12357,7 +12442,7 @@
         </p:nvSpPr>
         <p:spPr>
           <a:xfrm>
-            <a:off x="2189222" y="5085184"/>
+            <a:off x="1819514" y="5090782"/>
             <a:ext cx="7723202" cy="1440160"/>
           </a:xfrm>
           <a:prstGeom prst="rect">

</xml_diff>

<commit_message>
Created app service and app service plan
</commit_message>
<xml_diff>
--- a/Terraform 101.pptx
+++ b/Terraform 101.pptx
@@ -5,10 +5,10 @@
     <p:sldMasterId id="2147483648" r:id="rId4"/>
   </p:sldMasterIdLst>
   <p:notesMasterIdLst>
-    <p:notesMasterId r:id="rId25"/>
+    <p:notesMasterId r:id="rId32"/>
   </p:notesMasterIdLst>
   <p:handoutMasterIdLst>
-    <p:handoutMasterId r:id="rId26"/>
+    <p:handoutMasterId r:id="rId33"/>
   </p:handoutMasterIdLst>
   <p:sldIdLst>
     <p:sldId id="257" r:id="rId5"/>
@@ -31,6 +31,13 @@
     <p:sldId id="274" r:id="rId22"/>
     <p:sldId id="275" r:id="rId23"/>
     <p:sldId id="276" r:id="rId24"/>
+    <p:sldId id="277" r:id="rId25"/>
+    <p:sldId id="278" r:id="rId26"/>
+    <p:sldId id="279" r:id="rId27"/>
+    <p:sldId id="280" r:id="rId28"/>
+    <p:sldId id="281" r:id="rId29"/>
+    <p:sldId id="282" r:id="rId30"/>
+    <p:sldId id="283" r:id="rId31"/>
   </p:sldIdLst>
   <p:sldSz cx="12192000" cy="6858000"/>
   <p:notesSz cx="6858000" cy="9144000"/>
@@ -13494,6 +13501,1812 @@
     <p:extLst>
       <p:ext uri="{BB962C8B-B14F-4D97-AF65-F5344CB8AC3E}">
         <p14:creationId xmlns:p14="http://schemas.microsoft.com/office/powerpoint/2010/main" val="1135525956"/>
+      </p:ext>
+    </p:extLst>
+  </p:cSld>
+  <p:clrMapOvr>
+    <a:masterClrMapping/>
+  </p:clrMapOvr>
+  <mc:AlternateContent xmlns:mc="http://schemas.openxmlformats.org/markup-compatibility/2006" xmlns:p14="http://schemas.microsoft.com/office/powerpoint/2010/main">
+    <mc:Choice Requires="p14">
+      <p:transition spd="med" p14:dur="700">
+        <p:fade/>
+      </p:transition>
+    </mc:Choice>
+    <mc:Fallback xmlns="">
+      <p:transition spd="med">
+        <p:fade/>
+      </p:transition>
+    </mc:Fallback>
+  </mc:AlternateContent>
+</p:sld>
+</file>
+
+<file path=ppt/slides/slide21.xml><?xml version="1.0" encoding="utf-8"?>
+<p:sld xmlns:a="http://schemas.openxmlformats.org/drawingml/2006/main" xmlns:r="http://schemas.openxmlformats.org/officeDocument/2006/relationships" xmlns:p="http://schemas.openxmlformats.org/presentationml/2006/main">
+  <p:cSld>
+    <p:spTree>
+      <p:nvGrpSpPr>
+        <p:cNvPr id="1" name=""/>
+        <p:cNvGrpSpPr/>
+        <p:nvPr/>
+      </p:nvGrpSpPr>
+      <p:grpSpPr>
+        <a:xfrm>
+          <a:off x="0" y="0"/>
+          <a:ext cx="0" cy="0"/>
+          <a:chOff x="0" y="0"/>
+          <a:chExt cx="0" cy="0"/>
+        </a:xfrm>
+      </p:grpSpPr>
+      <p:sp>
+        <p:nvSpPr>
+          <p:cNvPr id="2" name="Titel 1">
+            <a:extLst>
+              <a:ext uri="{FF2B5EF4-FFF2-40B4-BE49-F238E27FC236}">
+                <a16:creationId xmlns:a16="http://schemas.microsoft.com/office/drawing/2014/main" id="{4E95B0FF-7F44-4643-8E75-FE04F50ECE92}"/>
+              </a:ext>
+            </a:extLst>
+          </p:cNvPr>
+          <p:cNvSpPr>
+            <a:spLocks noGrp="1"/>
+          </p:cNvSpPr>
+          <p:nvPr>
+            <p:ph type="title"/>
+          </p:nvPr>
+        </p:nvSpPr>
+        <p:spPr>
+          <a:xfrm>
+            <a:off x="838200" y="365126"/>
+            <a:ext cx="9829800" cy="1082674"/>
+          </a:xfrm>
+        </p:spPr>
+        <p:txBody>
+          <a:bodyPr anchor="b">
+            <a:normAutofit/>
+          </a:bodyPr>
+          <a:lstStyle/>
+          <a:p>
+            <a:r>
+              <a:rPr lang="nl-BE" dirty="0"/>
+              <a:t>7. The Web App – App Service Plan</a:t>
+            </a:r>
+          </a:p>
+        </p:txBody>
+      </p:sp>
+      <p:sp>
+        <p:nvSpPr>
+          <p:cNvPr id="6" name="Tijdelijke aanduiding voor inhoud 5">
+            <a:extLst>
+              <a:ext uri="{FF2B5EF4-FFF2-40B4-BE49-F238E27FC236}">
+                <a16:creationId xmlns:a16="http://schemas.microsoft.com/office/drawing/2014/main" id="{8FC2D2CC-FC88-4DF2-B188-8618CAC2669F}"/>
+              </a:ext>
+            </a:extLst>
+          </p:cNvPr>
+          <p:cNvSpPr>
+            <a:spLocks noGrp="1"/>
+          </p:cNvSpPr>
+          <p:nvPr>
+            <p:ph sz="half" idx="2"/>
+          </p:nvPr>
+        </p:nvSpPr>
+        <p:spPr/>
+        <p:txBody>
+          <a:bodyPr>
+            <a:normAutofit fontScale="92500" lnSpcReduction="10000"/>
+          </a:bodyPr>
+          <a:lstStyle/>
+          <a:p>
+            <a:r>
+              <a:rPr lang="nl-BE" dirty="0" err="1"/>
+              <a:t>Again</a:t>
+            </a:r>
+            <a:r>
+              <a:rPr lang="nl-BE" dirty="0"/>
+              <a:t> we </a:t>
+            </a:r>
+            <a:r>
+              <a:rPr lang="nl-BE" dirty="0" err="1"/>
+              <a:t>see</a:t>
+            </a:r>
+            <a:r>
+              <a:rPr lang="nl-BE" dirty="0"/>
+              <a:t> 3 variables, </a:t>
+            </a:r>
+            <a:r>
+              <a:rPr lang="nl-BE" dirty="0" err="1"/>
+              <a:t>to</a:t>
+            </a:r>
+            <a:r>
+              <a:rPr lang="nl-BE" dirty="0"/>
+              <a:t> </a:t>
+            </a:r>
+            <a:r>
+              <a:rPr lang="nl-BE" dirty="0" err="1"/>
+              <a:t>dymanically</a:t>
+            </a:r>
+            <a:r>
+              <a:rPr lang="nl-BE" dirty="0"/>
+              <a:t> change </a:t>
+            </a:r>
+            <a:r>
+              <a:rPr lang="nl-BE" dirty="0" err="1"/>
+              <a:t>during</a:t>
+            </a:r>
+            <a:r>
+              <a:rPr lang="nl-BE" dirty="0"/>
+              <a:t> </a:t>
+            </a:r>
+            <a:r>
+              <a:rPr lang="nl-BE" dirty="0" err="1"/>
+              <a:t>deployment</a:t>
+            </a:r>
+            <a:r>
+              <a:rPr lang="nl-BE" dirty="0"/>
+              <a:t> time</a:t>
+            </a:r>
+          </a:p>
+          <a:p>
+            <a:r>
+              <a:rPr lang="nl-BE" dirty="0"/>
+              <a:t>The “</a:t>
+            </a:r>
+            <a:r>
+              <a:rPr lang="nl-BE" dirty="0" err="1"/>
+              <a:t>location</a:t>
+            </a:r>
+            <a:r>
+              <a:rPr lang="nl-BE" dirty="0"/>
+              <a:t>” </a:t>
+            </a:r>
+            <a:r>
+              <a:rPr lang="nl-BE" dirty="0" err="1"/>
+              <a:t>and</a:t>
+            </a:r>
+            <a:r>
+              <a:rPr lang="nl-BE" dirty="0"/>
+              <a:t> “</a:t>
+            </a:r>
+            <a:r>
+              <a:rPr lang="nl-BE" dirty="0" err="1"/>
+              <a:t>resource_group_name</a:t>
+            </a:r>
+            <a:r>
+              <a:rPr lang="nl-BE" dirty="0"/>
+              <a:t>” </a:t>
+            </a:r>
+            <a:r>
+              <a:rPr lang="nl-BE" dirty="0" err="1"/>
+              <a:t>values</a:t>
+            </a:r>
+            <a:r>
+              <a:rPr lang="nl-BE" dirty="0"/>
+              <a:t> of </a:t>
+            </a:r>
+            <a:r>
+              <a:rPr lang="nl-BE" dirty="0" err="1"/>
+              <a:t>the</a:t>
+            </a:r>
+            <a:r>
+              <a:rPr lang="nl-BE" dirty="0"/>
+              <a:t> appservice plan is </a:t>
+            </a:r>
+            <a:r>
+              <a:rPr lang="nl-BE" dirty="0" err="1"/>
+              <a:t>however</a:t>
+            </a:r>
+            <a:r>
+              <a:rPr lang="nl-BE" dirty="0"/>
+              <a:t> </a:t>
+            </a:r>
+            <a:r>
+              <a:rPr lang="nl-BE" dirty="0" err="1"/>
+              <a:t>not</a:t>
+            </a:r>
+            <a:r>
+              <a:rPr lang="nl-BE" dirty="0"/>
+              <a:t> </a:t>
+            </a:r>
+            <a:r>
+              <a:rPr lang="nl-BE" dirty="0" err="1"/>
+              <a:t>coming</a:t>
+            </a:r>
+            <a:r>
+              <a:rPr lang="nl-BE" dirty="0"/>
+              <a:t> from a </a:t>
+            </a:r>
+            <a:r>
+              <a:rPr lang="nl-BE" dirty="0" err="1"/>
+              <a:t>variable</a:t>
+            </a:r>
+            <a:r>
+              <a:rPr lang="nl-BE" dirty="0"/>
+              <a:t>, but is </a:t>
+            </a:r>
+            <a:r>
+              <a:rPr lang="nl-BE" dirty="0" err="1"/>
+              <a:t>coming</a:t>
+            </a:r>
+            <a:r>
+              <a:rPr lang="nl-BE" dirty="0"/>
+              <a:t> from </a:t>
+            </a:r>
+            <a:r>
+              <a:rPr lang="nl-BE" dirty="0" err="1"/>
+              <a:t>the</a:t>
+            </a:r>
+            <a:r>
+              <a:rPr lang="nl-BE" dirty="0"/>
+              <a:t> resource </a:t>
+            </a:r>
+            <a:r>
+              <a:rPr lang="nl-BE" dirty="0" err="1"/>
+              <a:t>group</a:t>
+            </a:r>
+            <a:endParaRPr lang="nl-BE" dirty="0"/>
+          </a:p>
+          <a:p>
+            <a:r>
+              <a:rPr lang="nl-BE" dirty="0" err="1"/>
+              <a:t>This</a:t>
+            </a:r>
+            <a:r>
+              <a:rPr lang="nl-BE" dirty="0"/>
+              <a:t> </a:t>
+            </a:r>
+            <a:r>
+              <a:rPr lang="nl-BE" dirty="0" err="1"/>
+              <a:t>will</a:t>
+            </a:r>
+            <a:r>
+              <a:rPr lang="nl-BE" dirty="0"/>
+              <a:t> </a:t>
+            </a:r>
+            <a:r>
+              <a:rPr lang="nl-BE" dirty="0" err="1"/>
+              <a:t>reflect</a:t>
+            </a:r>
+            <a:r>
+              <a:rPr lang="nl-BE" dirty="0"/>
+              <a:t> </a:t>
+            </a:r>
+            <a:r>
+              <a:rPr lang="nl-BE" dirty="0" err="1"/>
+              <a:t>itself</a:t>
+            </a:r>
+            <a:r>
+              <a:rPr lang="nl-BE" dirty="0"/>
+              <a:t> in </a:t>
+            </a:r>
+            <a:r>
+              <a:rPr lang="nl-BE" dirty="0" err="1"/>
+              <a:t>the</a:t>
+            </a:r>
+            <a:r>
+              <a:rPr lang="nl-BE" dirty="0"/>
+              <a:t> </a:t>
+            </a:r>
+            <a:r>
+              <a:rPr lang="nl-BE" dirty="0" err="1"/>
+              <a:t>dependency</a:t>
+            </a:r>
+            <a:r>
+              <a:rPr lang="nl-BE" dirty="0"/>
+              <a:t> tree, making </a:t>
+            </a:r>
+            <a:r>
+              <a:rPr lang="nl-BE" dirty="0" err="1"/>
+              <a:t>it</a:t>
+            </a:r>
+            <a:r>
+              <a:rPr lang="nl-BE" dirty="0"/>
+              <a:t> </a:t>
+            </a:r>
+            <a:r>
+              <a:rPr lang="nl-BE" dirty="0" err="1"/>
+              <a:t>so</a:t>
+            </a:r>
+            <a:r>
+              <a:rPr lang="nl-BE" dirty="0"/>
+              <a:t> </a:t>
+            </a:r>
+            <a:r>
+              <a:rPr lang="nl-BE" dirty="0" err="1"/>
+              <a:t>that</a:t>
+            </a:r>
+            <a:r>
+              <a:rPr lang="nl-BE" dirty="0"/>
+              <a:t> </a:t>
+            </a:r>
+            <a:r>
+              <a:rPr lang="nl-BE" dirty="0" err="1"/>
+              <a:t>terraform</a:t>
+            </a:r>
+            <a:r>
+              <a:rPr lang="nl-BE" dirty="0"/>
+              <a:t> </a:t>
+            </a:r>
+            <a:r>
+              <a:rPr lang="nl-BE" dirty="0" err="1"/>
+              <a:t>creates</a:t>
+            </a:r>
+            <a:r>
+              <a:rPr lang="nl-BE" dirty="0"/>
+              <a:t> </a:t>
+            </a:r>
+            <a:r>
+              <a:rPr lang="nl-BE" dirty="0" err="1"/>
+              <a:t>the</a:t>
+            </a:r>
+            <a:r>
+              <a:rPr lang="nl-BE" dirty="0"/>
+              <a:t> resource </a:t>
+            </a:r>
+            <a:r>
+              <a:rPr lang="nl-BE" dirty="0" err="1"/>
+              <a:t>group</a:t>
+            </a:r>
+            <a:r>
+              <a:rPr lang="nl-BE" dirty="0"/>
+              <a:t> </a:t>
+            </a:r>
+            <a:r>
+              <a:rPr lang="nl-BE" dirty="0" err="1"/>
+              <a:t>befor</a:t>
+            </a:r>
+            <a:r>
+              <a:rPr lang="nl-BE" dirty="0"/>
+              <a:t> </a:t>
+            </a:r>
+            <a:r>
+              <a:rPr lang="nl-BE" dirty="0" err="1"/>
+              <a:t>the</a:t>
+            </a:r>
+            <a:r>
+              <a:rPr lang="nl-BE" dirty="0"/>
+              <a:t> app service plan </a:t>
+            </a:r>
+          </a:p>
+        </p:txBody>
+      </p:sp>
+      <p:pic>
+        <p:nvPicPr>
+          <p:cNvPr id="3" name="Afbeelding 2">
+            <a:extLst>
+              <a:ext uri="{FF2B5EF4-FFF2-40B4-BE49-F238E27FC236}">
+                <a16:creationId xmlns:a16="http://schemas.microsoft.com/office/drawing/2014/main" id="{0D3C2F08-CF57-4E9E-85EC-E74E699C4630}"/>
+              </a:ext>
+            </a:extLst>
+          </p:cNvPr>
+          <p:cNvPicPr>
+            <a:picLocks noChangeAspect="1"/>
+          </p:cNvPicPr>
+          <p:nvPr/>
+        </p:nvPicPr>
+        <p:blipFill>
+          <a:blip r:embed="rId2"/>
+          <a:stretch>
+            <a:fillRect/>
+          </a:stretch>
+        </p:blipFill>
+        <p:spPr>
+          <a:xfrm>
+            <a:off x="1919536" y="1628800"/>
+            <a:ext cx="3633310" cy="4149080"/>
+          </a:xfrm>
+          <a:prstGeom prst="rect">
+            <a:avLst/>
+          </a:prstGeom>
+        </p:spPr>
+      </p:pic>
+    </p:spTree>
+    <p:extLst>
+      <p:ext uri="{BB962C8B-B14F-4D97-AF65-F5344CB8AC3E}">
+        <p14:creationId xmlns:p14="http://schemas.microsoft.com/office/powerpoint/2010/main" val="2305614914"/>
+      </p:ext>
+    </p:extLst>
+  </p:cSld>
+  <p:clrMapOvr>
+    <a:masterClrMapping/>
+  </p:clrMapOvr>
+  <mc:AlternateContent xmlns:mc="http://schemas.openxmlformats.org/markup-compatibility/2006" xmlns:p14="http://schemas.microsoft.com/office/powerpoint/2010/main">
+    <mc:Choice Requires="p14">
+      <p:transition spd="med" p14:dur="700">
+        <p:fade/>
+      </p:transition>
+    </mc:Choice>
+    <mc:Fallback xmlns="">
+      <p:transition spd="med">
+        <p:fade/>
+      </p:transition>
+    </mc:Fallback>
+  </mc:AlternateContent>
+</p:sld>
+</file>
+
+<file path=ppt/slides/slide22.xml><?xml version="1.0" encoding="utf-8"?>
+<p:sld xmlns:a="http://schemas.openxmlformats.org/drawingml/2006/main" xmlns:r="http://schemas.openxmlformats.org/officeDocument/2006/relationships" xmlns:p="http://schemas.openxmlformats.org/presentationml/2006/main">
+  <p:cSld>
+    <p:spTree>
+      <p:nvGrpSpPr>
+        <p:cNvPr id="1" name=""/>
+        <p:cNvGrpSpPr/>
+        <p:nvPr/>
+      </p:nvGrpSpPr>
+      <p:grpSpPr>
+        <a:xfrm>
+          <a:off x="0" y="0"/>
+          <a:ext cx="0" cy="0"/>
+          <a:chOff x="0" y="0"/>
+          <a:chExt cx="0" cy="0"/>
+        </a:xfrm>
+      </p:grpSpPr>
+      <p:sp>
+        <p:nvSpPr>
+          <p:cNvPr id="2" name="Titel 1">
+            <a:extLst>
+              <a:ext uri="{FF2B5EF4-FFF2-40B4-BE49-F238E27FC236}">
+                <a16:creationId xmlns:a16="http://schemas.microsoft.com/office/drawing/2014/main" id="{4E95B0FF-7F44-4643-8E75-FE04F50ECE92}"/>
+              </a:ext>
+            </a:extLst>
+          </p:cNvPr>
+          <p:cNvSpPr>
+            <a:spLocks noGrp="1"/>
+          </p:cNvSpPr>
+          <p:nvPr>
+            <p:ph type="title"/>
+          </p:nvPr>
+        </p:nvSpPr>
+        <p:spPr>
+          <a:xfrm>
+            <a:off x="838200" y="365126"/>
+            <a:ext cx="9829800" cy="1082674"/>
+          </a:xfrm>
+        </p:spPr>
+        <p:txBody>
+          <a:bodyPr anchor="b">
+            <a:normAutofit/>
+          </a:bodyPr>
+          <a:lstStyle/>
+          <a:p>
+            <a:r>
+              <a:rPr lang="nl-BE" dirty="0"/>
+              <a:t>7. The Web App – App Plan</a:t>
+            </a:r>
+          </a:p>
+        </p:txBody>
+      </p:sp>
+      <p:sp>
+        <p:nvSpPr>
+          <p:cNvPr id="6" name="Tijdelijke aanduiding voor inhoud 5">
+            <a:extLst>
+              <a:ext uri="{FF2B5EF4-FFF2-40B4-BE49-F238E27FC236}">
+                <a16:creationId xmlns:a16="http://schemas.microsoft.com/office/drawing/2014/main" id="{8FC2D2CC-FC88-4DF2-B188-8618CAC2669F}"/>
+              </a:ext>
+            </a:extLst>
+          </p:cNvPr>
+          <p:cNvSpPr>
+            <a:spLocks noGrp="1"/>
+          </p:cNvSpPr>
+          <p:nvPr>
+            <p:ph sz="half" idx="2"/>
+          </p:nvPr>
+        </p:nvSpPr>
+        <p:spPr/>
+        <p:txBody>
+          <a:bodyPr>
+            <a:normAutofit/>
+          </a:bodyPr>
+          <a:lstStyle/>
+          <a:p>
+            <a:r>
+              <a:rPr lang="nl-BE" dirty="0" err="1"/>
+              <a:t>Continuing</a:t>
+            </a:r>
+            <a:r>
+              <a:rPr lang="nl-BE" dirty="0"/>
+              <a:t> </a:t>
+            </a:r>
+            <a:r>
+              <a:rPr lang="nl-BE" dirty="0" err="1"/>
+              <a:t>the</a:t>
+            </a:r>
+            <a:r>
+              <a:rPr lang="nl-BE" dirty="0"/>
+              <a:t> web.tf file, we </a:t>
+            </a:r>
+            <a:r>
+              <a:rPr lang="nl-BE" dirty="0" err="1"/>
+              <a:t>find</a:t>
+            </a:r>
+            <a:r>
+              <a:rPr lang="nl-BE" dirty="0"/>
+              <a:t> </a:t>
+            </a:r>
+            <a:r>
+              <a:rPr lang="nl-BE" dirty="0" err="1"/>
+              <a:t>ourselves</a:t>
+            </a:r>
+            <a:r>
+              <a:rPr lang="nl-BE" dirty="0"/>
+              <a:t> in </a:t>
+            </a:r>
+            <a:r>
+              <a:rPr lang="nl-BE" dirty="0" err="1"/>
+              <a:t>the</a:t>
+            </a:r>
+            <a:r>
+              <a:rPr lang="nl-BE" dirty="0"/>
+              <a:t> </a:t>
+            </a:r>
+            <a:r>
+              <a:rPr lang="nl-BE" dirty="0" err="1"/>
+              <a:t>secion</a:t>
+            </a:r>
+            <a:r>
+              <a:rPr lang="nl-BE" dirty="0"/>
+              <a:t> of </a:t>
+            </a:r>
+            <a:r>
+              <a:rPr lang="nl-BE" dirty="0" err="1"/>
+              <a:t>the</a:t>
+            </a:r>
+            <a:r>
+              <a:rPr lang="nl-BE" dirty="0"/>
+              <a:t> app service.</a:t>
+            </a:r>
+          </a:p>
+          <a:p>
+            <a:r>
+              <a:rPr lang="nl-BE" dirty="0"/>
+              <a:t>App service </a:t>
+            </a:r>
+            <a:r>
+              <a:rPr lang="nl-BE" dirty="0" err="1"/>
+              <a:t>references</a:t>
+            </a:r>
+            <a:r>
+              <a:rPr lang="nl-BE" dirty="0"/>
+              <a:t> </a:t>
+            </a:r>
+            <a:r>
+              <a:rPr lang="nl-BE" dirty="0" err="1"/>
+              <a:t>the</a:t>
+            </a:r>
+            <a:r>
+              <a:rPr lang="nl-BE" dirty="0"/>
+              <a:t> </a:t>
+            </a:r>
+            <a:r>
+              <a:rPr lang="nl-BE" dirty="0" err="1"/>
+              <a:t>app_service_plan</a:t>
+            </a:r>
+            <a:r>
+              <a:rPr lang="nl-BE" dirty="0"/>
+              <a:t> </a:t>
+            </a:r>
+            <a:r>
+              <a:rPr lang="nl-BE" dirty="0" err="1"/>
+              <a:t>so</a:t>
+            </a:r>
+            <a:r>
+              <a:rPr lang="nl-BE" dirty="0"/>
+              <a:t> </a:t>
+            </a:r>
+            <a:r>
+              <a:rPr lang="nl-BE" dirty="0" err="1"/>
+              <a:t>this</a:t>
+            </a:r>
+            <a:r>
+              <a:rPr lang="nl-BE" dirty="0"/>
+              <a:t> </a:t>
+            </a:r>
+            <a:r>
+              <a:rPr lang="nl-BE" dirty="0" err="1"/>
+              <a:t>will</a:t>
+            </a:r>
+            <a:r>
+              <a:rPr lang="nl-BE" dirty="0"/>
+              <a:t> </a:t>
+            </a:r>
+            <a:r>
+              <a:rPr lang="nl-BE" dirty="0" err="1"/>
+              <a:t>be</a:t>
+            </a:r>
+            <a:r>
+              <a:rPr lang="nl-BE" dirty="0"/>
+              <a:t> </a:t>
+            </a:r>
+            <a:r>
+              <a:rPr lang="nl-BE" dirty="0" err="1"/>
+              <a:t>created</a:t>
+            </a:r>
+            <a:r>
+              <a:rPr lang="nl-BE" dirty="0"/>
+              <a:t> </a:t>
+            </a:r>
+            <a:r>
+              <a:rPr lang="nl-BE" dirty="0" err="1"/>
+              <a:t>after</a:t>
+            </a:r>
+            <a:r>
+              <a:rPr lang="nl-BE" dirty="0"/>
+              <a:t> </a:t>
+            </a:r>
+            <a:r>
+              <a:rPr lang="nl-BE" dirty="0" err="1"/>
+              <a:t>the</a:t>
+            </a:r>
+            <a:r>
+              <a:rPr lang="nl-BE" dirty="0"/>
+              <a:t> app service plan.</a:t>
+            </a:r>
+          </a:p>
+          <a:p>
+            <a:r>
+              <a:rPr lang="nl-BE" dirty="0"/>
+              <a:t>The order of </a:t>
+            </a:r>
+            <a:r>
+              <a:rPr lang="nl-BE" dirty="0" err="1"/>
+              <a:t>the</a:t>
+            </a:r>
+            <a:r>
+              <a:rPr lang="nl-BE" dirty="0"/>
+              <a:t> files </a:t>
+            </a:r>
+            <a:r>
+              <a:rPr lang="nl-BE" dirty="0" err="1"/>
+              <a:t>and</a:t>
+            </a:r>
+            <a:r>
+              <a:rPr lang="nl-BE" dirty="0"/>
+              <a:t> </a:t>
+            </a:r>
+            <a:r>
+              <a:rPr lang="nl-BE" dirty="0" err="1"/>
+              <a:t>the</a:t>
+            </a:r>
+            <a:r>
+              <a:rPr lang="nl-BE" dirty="0"/>
+              <a:t> order in </a:t>
+            </a:r>
+            <a:r>
+              <a:rPr lang="nl-BE" dirty="0" err="1"/>
+              <a:t>the</a:t>
+            </a:r>
+            <a:r>
+              <a:rPr lang="nl-BE" dirty="0"/>
+              <a:t> files do </a:t>
+            </a:r>
+            <a:r>
+              <a:rPr lang="nl-BE" dirty="0" err="1"/>
+              <a:t>not</a:t>
+            </a:r>
+            <a:r>
+              <a:rPr lang="nl-BE" dirty="0"/>
+              <a:t> matter, </a:t>
+            </a:r>
+            <a:r>
+              <a:rPr lang="nl-BE" dirty="0" err="1"/>
+              <a:t>dependencies</a:t>
+            </a:r>
+            <a:r>
+              <a:rPr lang="nl-BE" dirty="0"/>
+              <a:t> are </a:t>
+            </a:r>
+            <a:r>
+              <a:rPr lang="nl-BE" dirty="0" err="1"/>
+              <a:t>build</a:t>
+            </a:r>
+            <a:r>
+              <a:rPr lang="nl-BE" dirty="0"/>
+              <a:t> from these </a:t>
+            </a:r>
+            <a:r>
+              <a:rPr lang="nl-BE" dirty="0" err="1"/>
+              <a:t>references</a:t>
+            </a:r>
+            <a:endParaRPr lang="nl-BE" dirty="0"/>
+          </a:p>
+        </p:txBody>
+      </p:sp>
+      <p:pic>
+        <p:nvPicPr>
+          <p:cNvPr id="4" name="Afbeelding 3">
+            <a:extLst>
+              <a:ext uri="{FF2B5EF4-FFF2-40B4-BE49-F238E27FC236}">
+                <a16:creationId xmlns:a16="http://schemas.microsoft.com/office/drawing/2014/main" id="{F24E581F-1A7E-4CAC-A6F0-95D47F1B7D02}"/>
+              </a:ext>
+            </a:extLst>
+          </p:cNvPr>
+          <p:cNvPicPr>
+            <a:picLocks noChangeAspect="1"/>
+          </p:cNvPicPr>
+          <p:nvPr/>
+        </p:nvPicPr>
+        <p:blipFill>
+          <a:blip r:embed="rId2"/>
+          <a:stretch>
+            <a:fillRect/>
+          </a:stretch>
+        </p:blipFill>
+        <p:spPr>
+          <a:xfrm>
+            <a:off x="1415480" y="1825625"/>
+            <a:ext cx="4032308" cy="3474721"/>
+          </a:xfrm>
+          <a:prstGeom prst="rect">
+            <a:avLst/>
+          </a:prstGeom>
+        </p:spPr>
+      </p:pic>
+    </p:spTree>
+    <p:extLst>
+      <p:ext uri="{BB962C8B-B14F-4D97-AF65-F5344CB8AC3E}">
+        <p14:creationId xmlns:p14="http://schemas.microsoft.com/office/powerpoint/2010/main" val="2443087068"/>
+      </p:ext>
+    </p:extLst>
+  </p:cSld>
+  <p:clrMapOvr>
+    <a:masterClrMapping/>
+  </p:clrMapOvr>
+  <mc:AlternateContent xmlns:mc="http://schemas.openxmlformats.org/markup-compatibility/2006" xmlns:p14="http://schemas.microsoft.com/office/powerpoint/2010/main">
+    <mc:Choice Requires="p14">
+      <p:transition spd="med" p14:dur="700">
+        <p:fade/>
+      </p:transition>
+    </mc:Choice>
+    <mc:Fallback xmlns="">
+      <p:transition spd="med">
+        <p:fade/>
+      </p:transition>
+    </mc:Fallback>
+  </mc:AlternateContent>
+</p:sld>
+</file>
+
+<file path=ppt/slides/slide23.xml><?xml version="1.0" encoding="utf-8"?>
+<p:sld xmlns:a="http://schemas.openxmlformats.org/drawingml/2006/main" xmlns:r="http://schemas.openxmlformats.org/officeDocument/2006/relationships" xmlns:p="http://schemas.openxmlformats.org/presentationml/2006/main">
+  <p:cSld>
+    <p:spTree>
+      <p:nvGrpSpPr>
+        <p:cNvPr id="1" name=""/>
+        <p:cNvGrpSpPr/>
+        <p:nvPr/>
+      </p:nvGrpSpPr>
+      <p:grpSpPr>
+        <a:xfrm>
+          <a:off x="0" y="0"/>
+          <a:ext cx="0" cy="0"/>
+          <a:chOff x="0" y="0"/>
+          <a:chExt cx="0" cy="0"/>
+        </a:xfrm>
+      </p:grpSpPr>
+      <p:sp>
+        <p:nvSpPr>
+          <p:cNvPr id="2" name="Titel 1">
+            <a:extLst>
+              <a:ext uri="{FF2B5EF4-FFF2-40B4-BE49-F238E27FC236}">
+                <a16:creationId xmlns:a16="http://schemas.microsoft.com/office/drawing/2014/main" id="{4E95B0FF-7F44-4643-8E75-FE04F50ECE92}"/>
+              </a:ext>
+            </a:extLst>
+          </p:cNvPr>
+          <p:cNvSpPr>
+            <a:spLocks noGrp="1"/>
+          </p:cNvSpPr>
+          <p:nvPr>
+            <p:ph type="title"/>
+          </p:nvPr>
+        </p:nvSpPr>
+        <p:spPr>
+          <a:xfrm>
+            <a:off x="838200" y="365126"/>
+            <a:ext cx="9829800" cy="1082674"/>
+          </a:xfrm>
+        </p:spPr>
+        <p:txBody>
+          <a:bodyPr anchor="b">
+            <a:normAutofit/>
+          </a:bodyPr>
+          <a:lstStyle/>
+          <a:p>
+            <a:r>
+              <a:rPr lang="nl-BE" dirty="0"/>
+              <a:t>7. The Web App – </a:t>
+            </a:r>
+            <a:r>
+              <a:rPr lang="nl-BE" dirty="0" err="1"/>
+              <a:t>Deploy</a:t>
+            </a:r>
+            <a:endParaRPr lang="nl-BE" dirty="0"/>
+          </a:p>
+        </p:txBody>
+      </p:sp>
+      <p:sp>
+        <p:nvSpPr>
+          <p:cNvPr id="5" name="Tijdelijke aanduiding voor inhoud 4">
+            <a:extLst>
+              <a:ext uri="{FF2B5EF4-FFF2-40B4-BE49-F238E27FC236}">
+                <a16:creationId xmlns:a16="http://schemas.microsoft.com/office/drawing/2014/main" id="{7B4E28B1-C9A4-4FCF-8F4B-CC22D27B18A5}"/>
+              </a:ext>
+            </a:extLst>
+          </p:cNvPr>
+          <p:cNvSpPr>
+            <a:spLocks noGrp="1"/>
+          </p:cNvSpPr>
+          <p:nvPr>
+            <p:ph sz="half" idx="2"/>
+          </p:nvPr>
+        </p:nvSpPr>
+        <p:spPr/>
+        <p:txBody>
+          <a:bodyPr/>
+          <a:lstStyle/>
+          <a:p>
+            <a:endParaRPr lang="nl-BE"/>
+          </a:p>
+        </p:txBody>
+      </p:sp>
+      <p:pic>
+        <p:nvPicPr>
+          <p:cNvPr id="7" name="Afbeelding 6">
+            <a:extLst>
+              <a:ext uri="{FF2B5EF4-FFF2-40B4-BE49-F238E27FC236}">
+                <a16:creationId xmlns:a16="http://schemas.microsoft.com/office/drawing/2014/main" id="{FDAC66F2-F25C-44F2-86F5-AB92056FC133}"/>
+              </a:ext>
+            </a:extLst>
+          </p:cNvPr>
+          <p:cNvPicPr>
+            <a:picLocks noChangeAspect="1"/>
+          </p:cNvPicPr>
+          <p:nvPr/>
+        </p:nvPicPr>
+        <p:blipFill>
+          <a:blip r:embed="rId2"/>
+          <a:stretch>
+            <a:fillRect/>
+          </a:stretch>
+        </p:blipFill>
+        <p:spPr>
+          <a:xfrm>
+            <a:off x="1497901" y="1560968"/>
+            <a:ext cx="9271929" cy="4231371"/>
+          </a:xfrm>
+          <a:prstGeom prst="rect">
+            <a:avLst/>
+          </a:prstGeom>
+        </p:spPr>
+      </p:pic>
+    </p:spTree>
+    <p:extLst>
+      <p:ext uri="{BB962C8B-B14F-4D97-AF65-F5344CB8AC3E}">
+        <p14:creationId xmlns:p14="http://schemas.microsoft.com/office/powerpoint/2010/main" val="3466948316"/>
+      </p:ext>
+    </p:extLst>
+  </p:cSld>
+  <p:clrMapOvr>
+    <a:masterClrMapping/>
+  </p:clrMapOvr>
+  <mc:AlternateContent xmlns:mc="http://schemas.openxmlformats.org/markup-compatibility/2006" xmlns:p14="http://schemas.microsoft.com/office/powerpoint/2010/main">
+    <mc:Choice Requires="p14">
+      <p:transition spd="med" p14:dur="700">
+        <p:fade/>
+      </p:transition>
+    </mc:Choice>
+    <mc:Fallback xmlns="">
+      <p:transition spd="med">
+        <p:fade/>
+      </p:transition>
+    </mc:Fallback>
+  </mc:AlternateContent>
+</p:sld>
+</file>
+
+<file path=ppt/slides/slide24.xml><?xml version="1.0" encoding="utf-8"?>
+<p:sld xmlns:a="http://schemas.openxmlformats.org/drawingml/2006/main" xmlns:r="http://schemas.openxmlformats.org/officeDocument/2006/relationships" xmlns:p="http://schemas.openxmlformats.org/presentationml/2006/main">
+  <p:cSld>
+    <p:spTree>
+      <p:nvGrpSpPr>
+        <p:cNvPr id="1" name=""/>
+        <p:cNvGrpSpPr/>
+        <p:nvPr/>
+      </p:nvGrpSpPr>
+      <p:grpSpPr>
+        <a:xfrm>
+          <a:off x="0" y="0"/>
+          <a:ext cx="0" cy="0"/>
+          <a:chOff x="0" y="0"/>
+          <a:chExt cx="0" cy="0"/>
+        </a:xfrm>
+      </p:grpSpPr>
+      <p:sp>
+        <p:nvSpPr>
+          <p:cNvPr id="2" name="Titel 1">
+            <a:extLst>
+              <a:ext uri="{FF2B5EF4-FFF2-40B4-BE49-F238E27FC236}">
+                <a16:creationId xmlns:a16="http://schemas.microsoft.com/office/drawing/2014/main" id="{D43AC81F-F302-410C-AC32-0A39DF06F712}"/>
+              </a:ext>
+            </a:extLst>
+          </p:cNvPr>
+          <p:cNvSpPr>
+            <a:spLocks noGrp="1"/>
+          </p:cNvSpPr>
+          <p:nvPr>
+            <p:ph type="title"/>
+          </p:nvPr>
+        </p:nvSpPr>
+        <p:spPr/>
+        <p:txBody>
+          <a:bodyPr/>
+          <a:lstStyle/>
+          <a:p>
+            <a:r>
+              <a:rPr lang="nl-BE" dirty="0" err="1"/>
+              <a:t>Weren’t</a:t>
+            </a:r>
+            <a:r>
+              <a:rPr lang="nl-BE" dirty="0"/>
+              <a:t> we building </a:t>
+            </a:r>
+            <a:r>
+              <a:rPr lang="nl-BE" dirty="0" err="1"/>
+              <a:t>dev</a:t>
+            </a:r>
+            <a:r>
+              <a:rPr lang="nl-BE" dirty="0"/>
+              <a:t>? – Making a </a:t>
+            </a:r>
+            <a:r>
+              <a:rPr lang="nl-BE" dirty="0" err="1"/>
+              <a:t>postfix</a:t>
+            </a:r>
+            <a:endParaRPr lang="nl-BE" dirty="0"/>
+          </a:p>
+        </p:txBody>
+      </p:sp>
+      <p:sp>
+        <p:nvSpPr>
+          <p:cNvPr id="5" name="Tijdelijke aanduiding voor inhoud 4">
+            <a:extLst>
+              <a:ext uri="{FF2B5EF4-FFF2-40B4-BE49-F238E27FC236}">
+                <a16:creationId xmlns:a16="http://schemas.microsoft.com/office/drawing/2014/main" id="{3AC4BD26-C7CD-4DBE-A976-1ACC20818242}"/>
+              </a:ext>
+            </a:extLst>
+          </p:cNvPr>
+          <p:cNvSpPr>
+            <a:spLocks noGrp="1"/>
+          </p:cNvSpPr>
+          <p:nvPr>
+            <p:ph sz="half" idx="2"/>
+          </p:nvPr>
+        </p:nvSpPr>
+        <p:spPr/>
+        <p:txBody>
+          <a:bodyPr>
+            <a:normAutofit/>
+          </a:bodyPr>
+          <a:lstStyle/>
+          <a:p>
+            <a:r>
+              <a:rPr lang="en-US" dirty="0"/>
+              <a:t>Creating local variables depending on the workspace</a:t>
+            </a:r>
+          </a:p>
+          <a:p>
+            <a:pPr lvl="1"/>
+            <a:r>
+              <a:rPr lang="en-US" dirty="0"/>
+              <a:t>if workspace = unknown =&gt; dev</a:t>
+            </a:r>
+          </a:p>
+          <a:p>
+            <a:pPr lvl="1"/>
+            <a:r>
+              <a:rPr lang="en-US" dirty="0"/>
+              <a:t>else =&gt; production</a:t>
+            </a:r>
+          </a:p>
+          <a:p>
+            <a:r>
+              <a:rPr lang="en-US" dirty="0"/>
+              <a:t>Using this in the naming will create a dev environment for us</a:t>
+            </a:r>
+          </a:p>
+          <a:p>
+            <a:r>
+              <a:rPr lang="en-US" dirty="0"/>
+              <a:t>As you can’t change the name of a resource, 3 new ones will be created.</a:t>
+            </a:r>
+          </a:p>
+          <a:p>
+            <a:endParaRPr lang="en-US" dirty="0"/>
+          </a:p>
+          <a:p>
+            <a:endParaRPr lang="en-US" dirty="0"/>
+          </a:p>
+          <a:p>
+            <a:endParaRPr lang="nl-BE" dirty="0"/>
+          </a:p>
+        </p:txBody>
+      </p:sp>
+      <p:pic>
+        <p:nvPicPr>
+          <p:cNvPr id="6" name="Tijdelijke aanduiding voor inhoud 5">
+            <a:extLst>
+              <a:ext uri="{FF2B5EF4-FFF2-40B4-BE49-F238E27FC236}">
+                <a16:creationId xmlns:a16="http://schemas.microsoft.com/office/drawing/2014/main" id="{2C3944A6-ED0A-400F-94AD-E3C5B6D635BA}"/>
+              </a:ext>
+            </a:extLst>
+          </p:cNvPr>
+          <p:cNvPicPr>
+            <a:picLocks noGrp="1" noChangeAspect="1"/>
+          </p:cNvPicPr>
+          <p:nvPr>
+            <p:ph sz="half" idx="1"/>
+          </p:nvPr>
+        </p:nvPicPr>
+        <p:blipFill>
+          <a:blip r:embed="rId2"/>
+          <a:stretch>
+            <a:fillRect/>
+          </a:stretch>
+        </p:blipFill>
+        <p:spPr>
+          <a:xfrm>
+            <a:off x="1055440" y="2924944"/>
+            <a:ext cx="4389438" cy="730278"/>
+          </a:xfrm>
+          <a:prstGeom prst="rect">
+            <a:avLst/>
+          </a:prstGeom>
+        </p:spPr>
+      </p:pic>
+      <p:pic>
+        <p:nvPicPr>
+          <p:cNvPr id="4" name="Afbeelding 3">
+            <a:extLst>
+              <a:ext uri="{FF2B5EF4-FFF2-40B4-BE49-F238E27FC236}">
+                <a16:creationId xmlns:a16="http://schemas.microsoft.com/office/drawing/2014/main" id="{B89397C6-FC3B-4B87-945A-A218583C4E03}"/>
+              </a:ext>
+            </a:extLst>
+          </p:cNvPr>
+          <p:cNvPicPr>
+            <a:picLocks noChangeAspect="1"/>
+          </p:cNvPicPr>
+          <p:nvPr/>
+        </p:nvPicPr>
+        <p:blipFill>
+          <a:blip r:embed="rId3"/>
+          <a:stretch>
+            <a:fillRect/>
+          </a:stretch>
+        </p:blipFill>
+        <p:spPr>
+          <a:xfrm>
+            <a:off x="838200" y="1457722"/>
+            <a:ext cx="4896544" cy="976394"/>
+          </a:xfrm>
+          <a:prstGeom prst="rect">
+            <a:avLst/>
+          </a:prstGeom>
+        </p:spPr>
+      </p:pic>
+      <p:pic>
+        <p:nvPicPr>
+          <p:cNvPr id="8" name="Afbeelding 7">
+            <a:extLst>
+              <a:ext uri="{FF2B5EF4-FFF2-40B4-BE49-F238E27FC236}">
+                <a16:creationId xmlns:a16="http://schemas.microsoft.com/office/drawing/2014/main" id="{BDB99A09-4E05-4F64-BAF2-9C01930AB200}"/>
+              </a:ext>
+            </a:extLst>
+          </p:cNvPr>
+          <p:cNvPicPr>
+            <a:picLocks noChangeAspect="1"/>
+          </p:cNvPicPr>
+          <p:nvPr/>
+        </p:nvPicPr>
+        <p:blipFill>
+          <a:blip r:embed="rId4"/>
+          <a:stretch>
+            <a:fillRect/>
+          </a:stretch>
+        </p:blipFill>
+        <p:spPr>
+          <a:xfrm>
+            <a:off x="1035150" y="3692822"/>
+            <a:ext cx="4421316" cy="636785"/>
+          </a:xfrm>
+          <a:prstGeom prst="rect">
+            <a:avLst/>
+          </a:prstGeom>
+        </p:spPr>
+      </p:pic>
+      <p:pic>
+        <p:nvPicPr>
+          <p:cNvPr id="9" name="Afbeelding 8">
+            <a:extLst>
+              <a:ext uri="{FF2B5EF4-FFF2-40B4-BE49-F238E27FC236}">
+                <a16:creationId xmlns:a16="http://schemas.microsoft.com/office/drawing/2014/main" id="{25A496F7-E5F8-4364-AB41-C816D062B1C7}"/>
+              </a:ext>
+            </a:extLst>
+          </p:cNvPr>
+          <p:cNvPicPr>
+            <a:picLocks noChangeAspect="1"/>
+          </p:cNvPicPr>
+          <p:nvPr/>
+        </p:nvPicPr>
+        <p:blipFill>
+          <a:blip r:embed="rId5"/>
+          <a:stretch>
+            <a:fillRect/>
+          </a:stretch>
+        </p:blipFill>
+        <p:spPr>
+          <a:xfrm>
+            <a:off x="1023562" y="4373425"/>
+            <a:ext cx="4421316" cy="728217"/>
+          </a:xfrm>
+          <a:prstGeom prst="rect">
+            <a:avLst/>
+          </a:prstGeom>
+        </p:spPr>
+      </p:pic>
+      <p:pic>
+        <p:nvPicPr>
+          <p:cNvPr id="10" name="Afbeelding 9">
+            <a:extLst>
+              <a:ext uri="{FF2B5EF4-FFF2-40B4-BE49-F238E27FC236}">
+                <a16:creationId xmlns:a16="http://schemas.microsoft.com/office/drawing/2014/main" id="{F35D31B8-3370-44FF-80F5-DA592F74A0A5}"/>
+              </a:ext>
+            </a:extLst>
+          </p:cNvPr>
+          <p:cNvPicPr>
+            <a:picLocks noChangeAspect="1"/>
+          </p:cNvPicPr>
+          <p:nvPr/>
+        </p:nvPicPr>
+        <p:blipFill>
+          <a:blip r:embed="rId6"/>
+          <a:stretch>
+            <a:fillRect/>
+          </a:stretch>
+        </p:blipFill>
+        <p:spPr>
+          <a:xfrm>
+            <a:off x="6543099" y="5173275"/>
+            <a:ext cx="4124901" cy="504895"/>
+          </a:xfrm>
+          <a:prstGeom prst="rect">
+            <a:avLst/>
+          </a:prstGeom>
+        </p:spPr>
+      </p:pic>
+    </p:spTree>
+    <p:extLst>
+      <p:ext uri="{BB962C8B-B14F-4D97-AF65-F5344CB8AC3E}">
+        <p14:creationId xmlns:p14="http://schemas.microsoft.com/office/powerpoint/2010/main" val="2427241067"/>
+      </p:ext>
+    </p:extLst>
+  </p:cSld>
+  <p:clrMapOvr>
+    <a:masterClrMapping/>
+  </p:clrMapOvr>
+  <mc:AlternateContent xmlns:mc="http://schemas.openxmlformats.org/markup-compatibility/2006" xmlns:p14="http://schemas.microsoft.com/office/powerpoint/2010/main">
+    <mc:Choice Requires="p14">
+      <p:transition spd="med" p14:dur="700">
+        <p:fade/>
+      </p:transition>
+    </mc:Choice>
+    <mc:Fallback xmlns="">
+      <p:transition spd="med">
+        <p:fade/>
+      </p:transition>
+    </mc:Fallback>
+  </mc:AlternateContent>
+</p:sld>
+</file>
+
+<file path=ppt/slides/slide25.xml><?xml version="1.0" encoding="utf-8"?>
+<p:sld xmlns:a="http://schemas.openxmlformats.org/drawingml/2006/main" xmlns:r="http://schemas.openxmlformats.org/officeDocument/2006/relationships" xmlns:p="http://schemas.openxmlformats.org/presentationml/2006/main">
+  <p:cSld>
+    <p:spTree>
+      <p:nvGrpSpPr>
+        <p:cNvPr id="1" name=""/>
+        <p:cNvGrpSpPr/>
+        <p:nvPr/>
+      </p:nvGrpSpPr>
+      <p:grpSpPr>
+        <a:xfrm>
+          <a:off x="0" y="0"/>
+          <a:ext cx="0" cy="0"/>
+          <a:chOff x="0" y="0"/>
+          <a:chExt cx="0" cy="0"/>
+        </a:xfrm>
+      </p:grpSpPr>
+      <p:sp>
+        <p:nvSpPr>
+          <p:cNvPr id="2" name="Titel 1">
+            <a:extLst>
+              <a:ext uri="{FF2B5EF4-FFF2-40B4-BE49-F238E27FC236}">
+                <a16:creationId xmlns:a16="http://schemas.microsoft.com/office/drawing/2014/main" id="{D43AC81F-F302-410C-AC32-0A39DF06F712}"/>
+              </a:ext>
+            </a:extLst>
+          </p:cNvPr>
+          <p:cNvSpPr>
+            <a:spLocks noGrp="1"/>
+          </p:cNvSpPr>
+          <p:nvPr>
+            <p:ph type="title"/>
+          </p:nvPr>
+        </p:nvSpPr>
+        <p:spPr/>
+        <p:txBody>
+          <a:bodyPr/>
+          <a:lstStyle/>
+          <a:p>
+            <a:r>
+              <a:rPr lang="nl-BE" dirty="0" err="1"/>
+              <a:t>Weren’t</a:t>
+            </a:r>
+            <a:r>
+              <a:rPr lang="nl-BE" dirty="0"/>
+              <a:t> we building </a:t>
+            </a:r>
+            <a:r>
+              <a:rPr lang="nl-BE" dirty="0" err="1"/>
+              <a:t>dev</a:t>
+            </a:r>
+            <a:r>
+              <a:rPr lang="nl-BE" dirty="0"/>
+              <a:t>? – Making a </a:t>
+            </a:r>
+            <a:r>
+              <a:rPr lang="nl-BE" dirty="0" err="1"/>
+              <a:t>postfix</a:t>
+            </a:r>
+            <a:endParaRPr lang="nl-BE" dirty="0"/>
+          </a:p>
+        </p:txBody>
+      </p:sp>
+      <p:sp>
+        <p:nvSpPr>
+          <p:cNvPr id="7" name="Tijdelijke aanduiding voor inhoud 6">
+            <a:extLst>
+              <a:ext uri="{FF2B5EF4-FFF2-40B4-BE49-F238E27FC236}">
+                <a16:creationId xmlns:a16="http://schemas.microsoft.com/office/drawing/2014/main" id="{E9DFF607-E6D1-4497-9B4F-A972234FEDB2}"/>
+              </a:ext>
+            </a:extLst>
+          </p:cNvPr>
+          <p:cNvSpPr>
+            <a:spLocks noGrp="1"/>
+          </p:cNvSpPr>
+          <p:nvPr>
+            <p:ph sz="half" idx="1"/>
+          </p:nvPr>
+        </p:nvSpPr>
+        <p:spPr/>
+        <p:txBody>
+          <a:bodyPr/>
+          <a:lstStyle/>
+          <a:p>
+            <a:endParaRPr lang="nl-BE" dirty="0"/>
+          </a:p>
+        </p:txBody>
+      </p:sp>
+      <p:sp>
+        <p:nvSpPr>
+          <p:cNvPr id="12" name="Tijdelijke aanduiding voor inhoud 11">
+            <a:extLst>
+              <a:ext uri="{FF2B5EF4-FFF2-40B4-BE49-F238E27FC236}">
+                <a16:creationId xmlns:a16="http://schemas.microsoft.com/office/drawing/2014/main" id="{3AA7E2C9-6EFD-4CDC-9F18-D254967CB60C}"/>
+              </a:ext>
+            </a:extLst>
+          </p:cNvPr>
+          <p:cNvSpPr>
+            <a:spLocks noGrp="1"/>
+          </p:cNvSpPr>
+          <p:nvPr>
+            <p:ph sz="half" idx="2"/>
+          </p:nvPr>
+        </p:nvSpPr>
+        <p:spPr/>
+        <p:txBody>
+          <a:bodyPr/>
+          <a:lstStyle/>
+          <a:p>
+            <a:endParaRPr lang="nl-BE"/>
+          </a:p>
+        </p:txBody>
+      </p:sp>
+      <p:pic>
+        <p:nvPicPr>
+          <p:cNvPr id="13" name="Afbeelding 12">
+            <a:extLst>
+              <a:ext uri="{FF2B5EF4-FFF2-40B4-BE49-F238E27FC236}">
+                <a16:creationId xmlns:a16="http://schemas.microsoft.com/office/drawing/2014/main" id="{EFC71505-7793-4141-ADA0-726D423096E1}"/>
+              </a:ext>
+            </a:extLst>
+          </p:cNvPr>
+          <p:cNvPicPr>
+            <a:picLocks noChangeAspect="1"/>
+          </p:cNvPicPr>
+          <p:nvPr/>
+        </p:nvPicPr>
+        <p:blipFill>
+          <a:blip r:embed="rId2"/>
+          <a:stretch>
+            <a:fillRect/>
+          </a:stretch>
+        </p:blipFill>
+        <p:spPr>
+          <a:xfrm>
+            <a:off x="1607219" y="1464196"/>
+            <a:ext cx="8611802" cy="5001323"/>
+          </a:xfrm>
+          <a:prstGeom prst="rect">
+            <a:avLst/>
+          </a:prstGeom>
+        </p:spPr>
+      </p:pic>
+    </p:spTree>
+    <p:extLst>
+      <p:ext uri="{BB962C8B-B14F-4D97-AF65-F5344CB8AC3E}">
+        <p14:creationId xmlns:p14="http://schemas.microsoft.com/office/powerpoint/2010/main" val="3038224711"/>
+      </p:ext>
+    </p:extLst>
+  </p:cSld>
+  <p:clrMapOvr>
+    <a:masterClrMapping/>
+  </p:clrMapOvr>
+  <mc:AlternateContent xmlns:mc="http://schemas.openxmlformats.org/markup-compatibility/2006" xmlns:p14="http://schemas.microsoft.com/office/powerpoint/2010/main">
+    <mc:Choice Requires="p14">
+      <p:transition spd="med" p14:dur="700">
+        <p:fade/>
+      </p:transition>
+    </mc:Choice>
+    <mc:Fallback xmlns="">
+      <p:transition spd="med">
+        <p:fade/>
+      </p:transition>
+    </mc:Fallback>
+  </mc:AlternateContent>
+</p:sld>
+</file>
+
+<file path=ppt/slides/slide26.xml><?xml version="1.0" encoding="utf-8"?>
+<p:sld xmlns:a="http://schemas.openxmlformats.org/drawingml/2006/main" xmlns:r="http://schemas.openxmlformats.org/officeDocument/2006/relationships" xmlns:p="http://schemas.openxmlformats.org/presentationml/2006/main">
+  <p:cSld>
+    <p:spTree>
+      <p:nvGrpSpPr>
+        <p:cNvPr id="1" name=""/>
+        <p:cNvGrpSpPr/>
+        <p:nvPr/>
+      </p:nvGrpSpPr>
+      <p:grpSpPr>
+        <a:xfrm>
+          <a:off x="0" y="0"/>
+          <a:ext cx="0" cy="0"/>
+          <a:chOff x="0" y="0"/>
+          <a:chExt cx="0" cy="0"/>
+        </a:xfrm>
+      </p:grpSpPr>
+      <p:sp>
+        <p:nvSpPr>
+          <p:cNvPr id="2" name="Titel 1">
+            <a:extLst>
+              <a:ext uri="{FF2B5EF4-FFF2-40B4-BE49-F238E27FC236}">
+                <a16:creationId xmlns:a16="http://schemas.microsoft.com/office/drawing/2014/main" id="{D43AC81F-F302-410C-AC32-0A39DF06F712}"/>
+              </a:ext>
+            </a:extLst>
+          </p:cNvPr>
+          <p:cNvSpPr>
+            <a:spLocks noGrp="1"/>
+          </p:cNvSpPr>
+          <p:nvPr>
+            <p:ph type="title"/>
+          </p:nvPr>
+        </p:nvSpPr>
+        <p:spPr/>
+        <p:txBody>
+          <a:bodyPr/>
+          <a:lstStyle/>
+          <a:p>
+            <a:r>
+              <a:rPr lang="nl-BE" dirty="0"/>
+              <a:t>Lets make </a:t>
+            </a:r>
+            <a:r>
+              <a:rPr lang="nl-BE" dirty="0" err="1"/>
+              <a:t>the</a:t>
+            </a:r>
+            <a:r>
+              <a:rPr lang="nl-BE" dirty="0"/>
+              <a:t> </a:t>
+            </a:r>
+            <a:r>
+              <a:rPr lang="nl-BE" dirty="0" err="1"/>
+              <a:t>naming</a:t>
+            </a:r>
+            <a:r>
+              <a:rPr lang="nl-BE" dirty="0"/>
+              <a:t> DRY</a:t>
+            </a:r>
+          </a:p>
+        </p:txBody>
+      </p:sp>
+      <p:sp>
+        <p:nvSpPr>
+          <p:cNvPr id="5" name="Tijdelijke aanduiding voor inhoud 4">
+            <a:extLst>
+              <a:ext uri="{FF2B5EF4-FFF2-40B4-BE49-F238E27FC236}">
+                <a16:creationId xmlns:a16="http://schemas.microsoft.com/office/drawing/2014/main" id="{3AC4BD26-C7CD-4DBE-A976-1ACC20818242}"/>
+              </a:ext>
+            </a:extLst>
+          </p:cNvPr>
+          <p:cNvSpPr>
+            <a:spLocks noGrp="1"/>
+          </p:cNvSpPr>
+          <p:nvPr>
+            <p:ph sz="half" idx="2"/>
+          </p:nvPr>
+        </p:nvSpPr>
+        <p:spPr/>
+        <p:txBody>
+          <a:bodyPr>
+            <a:normAutofit lnSpcReduction="10000"/>
+          </a:bodyPr>
+          <a:lstStyle/>
+          <a:p>
+            <a:r>
+              <a:rPr lang="en-US" dirty="0"/>
+              <a:t>We want a controlled naming convention</a:t>
+            </a:r>
+          </a:p>
+          <a:p>
+            <a:pPr lvl="1"/>
+            <a:r>
+              <a:rPr lang="en-US" dirty="0"/>
+              <a:t>&lt;</a:t>
+            </a:r>
+            <a:r>
+              <a:rPr lang="en-US" dirty="0" err="1"/>
+              <a:t>productname</a:t>
+            </a:r>
+            <a:r>
+              <a:rPr lang="en-US" dirty="0"/>
+              <a:t>&gt;(-&lt;environment&gt;)-&lt;service&gt;</a:t>
+            </a:r>
+          </a:p>
+          <a:p>
+            <a:r>
+              <a:rPr lang="en-US" dirty="0"/>
+              <a:t>At the moment we keep repeating ourselves, this will we fix with a variable, containing the </a:t>
+            </a:r>
+            <a:r>
+              <a:rPr lang="en-US" dirty="0" err="1"/>
+              <a:t>productname</a:t>
+            </a:r>
+            <a:endParaRPr lang="en-US" dirty="0"/>
+          </a:p>
+          <a:p>
+            <a:r>
+              <a:rPr lang="en-US" dirty="0"/>
+              <a:t>We remove all specific naming variables and replace it with our convention</a:t>
+            </a:r>
+          </a:p>
+          <a:p>
+            <a:endParaRPr lang="en-US" dirty="0"/>
+          </a:p>
+          <a:p>
+            <a:endParaRPr lang="en-US" dirty="0"/>
+          </a:p>
+          <a:p>
+            <a:endParaRPr lang="nl-BE" dirty="0"/>
+          </a:p>
+        </p:txBody>
+      </p:sp>
+      <p:sp>
+        <p:nvSpPr>
+          <p:cNvPr id="7" name="Tijdelijke aanduiding voor inhoud 6">
+            <a:extLst>
+              <a:ext uri="{FF2B5EF4-FFF2-40B4-BE49-F238E27FC236}">
+                <a16:creationId xmlns:a16="http://schemas.microsoft.com/office/drawing/2014/main" id="{036DDE58-FCF5-440E-8064-5792C08333F4}"/>
+              </a:ext>
+            </a:extLst>
+          </p:cNvPr>
+          <p:cNvSpPr>
+            <a:spLocks noGrp="1"/>
+          </p:cNvSpPr>
+          <p:nvPr>
+            <p:ph sz="half" idx="1"/>
+          </p:nvPr>
+        </p:nvSpPr>
+        <p:spPr/>
+        <p:txBody>
+          <a:bodyPr>
+            <a:normAutofit lnSpcReduction="10000"/>
+          </a:bodyPr>
+          <a:lstStyle/>
+          <a:p>
+            <a:endParaRPr lang="nl-BE" dirty="0"/>
+          </a:p>
+        </p:txBody>
+      </p:sp>
+      <p:pic>
+        <p:nvPicPr>
+          <p:cNvPr id="12" name="Afbeelding 11">
+            <a:extLst>
+              <a:ext uri="{FF2B5EF4-FFF2-40B4-BE49-F238E27FC236}">
+                <a16:creationId xmlns:a16="http://schemas.microsoft.com/office/drawing/2014/main" id="{C0E3ABFD-DAD8-4454-968F-254DCE249A3E}"/>
+              </a:ext>
+            </a:extLst>
+          </p:cNvPr>
+          <p:cNvPicPr>
+            <a:picLocks noChangeAspect="1"/>
+          </p:cNvPicPr>
+          <p:nvPr/>
+        </p:nvPicPr>
+        <p:blipFill>
+          <a:blip r:embed="rId2"/>
+          <a:stretch>
+            <a:fillRect/>
+          </a:stretch>
+        </p:blipFill>
+        <p:spPr>
+          <a:xfrm>
+            <a:off x="871221" y="1447800"/>
+            <a:ext cx="3856628" cy="1407711"/>
+          </a:xfrm>
+          <a:prstGeom prst="rect">
+            <a:avLst/>
+          </a:prstGeom>
+        </p:spPr>
+      </p:pic>
+      <p:pic>
+        <p:nvPicPr>
+          <p:cNvPr id="13" name="Afbeelding 12">
+            <a:extLst>
+              <a:ext uri="{FF2B5EF4-FFF2-40B4-BE49-F238E27FC236}">
+                <a16:creationId xmlns:a16="http://schemas.microsoft.com/office/drawing/2014/main" id="{0D03D825-2077-4560-A9BF-E837DA761D24}"/>
+              </a:ext>
+            </a:extLst>
+          </p:cNvPr>
+          <p:cNvPicPr>
+            <a:picLocks noChangeAspect="1"/>
+          </p:cNvPicPr>
+          <p:nvPr/>
+        </p:nvPicPr>
+        <p:blipFill>
+          <a:blip r:embed="rId3"/>
+          <a:stretch>
+            <a:fillRect/>
+          </a:stretch>
+        </p:blipFill>
+        <p:spPr>
+          <a:xfrm>
+            <a:off x="838200" y="2988167"/>
+            <a:ext cx="2936912" cy="1900035"/>
+          </a:xfrm>
+          <a:prstGeom prst="rect">
+            <a:avLst/>
+          </a:prstGeom>
+        </p:spPr>
+      </p:pic>
+      <p:pic>
+        <p:nvPicPr>
+          <p:cNvPr id="14" name="Afbeelding 13">
+            <a:extLst>
+              <a:ext uri="{FF2B5EF4-FFF2-40B4-BE49-F238E27FC236}">
+                <a16:creationId xmlns:a16="http://schemas.microsoft.com/office/drawing/2014/main" id="{7D8C66C8-43CF-4AA1-A1E7-50185F1953A1}"/>
+              </a:ext>
+            </a:extLst>
+          </p:cNvPr>
+          <p:cNvPicPr>
+            <a:picLocks noChangeAspect="1"/>
+          </p:cNvPicPr>
+          <p:nvPr/>
+        </p:nvPicPr>
+        <p:blipFill>
+          <a:blip r:embed="rId4"/>
+          <a:stretch>
+            <a:fillRect/>
+          </a:stretch>
+        </p:blipFill>
+        <p:spPr>
+          <a:xfrm>
+            <a:off x="798740" y="5020312"/>
+            <a:ext cx="3713084" cy="769269"/>
+          </a:xfrm>
+          <a:prstGeom prst="rect">
+            <a:avLst/>
+          </a:prstGeom>
+        </p:spPr>
+      </p:pic>
+      <p:cxnSp>
+        <p:nvCxnSpPr>
+          <p:cNvPr id="16" name="Rechte verbindingslijn met pijl 15">
+            <a:extLst>
+              <a:ext uri="{FF2B5EF4-FFF2-40B4-BE49-F238E27FC236}">
+                <a16:creationId xmlns:a16="http://schemas.microsoft.com/office/drawing/2014/main" id="{46A1BB09-1304-4615-AB15-2227D59C6E2B}"/>
+              </a:ext>
+            </a:extLst>
+          </p:cNvPr>
+          <p:cNvCxnSpPr/>
+          <p:nvPr/>
+        </p:nvCxnSpPr>
+        <p:spPr>
+          <a:xfrm flipH="1">
+            <a:off x="3775112" y="2908299"/>
+            <a:ext cx="2790787" cy="2320901"/>
+          </a:xfrm>
+          <a:prstGeom prst="straightConnector1">
+            <a:avLst/>
+          </a:prstGeom>
+          <a:ln>
+            <a:tailEnd type="triangle"/>
+          </a:ln>
+        </p:spPr>
+        <p:style>
+          <a:lnRef idx="1">
+            <a:schemeClr val="accent1"/>
+          </a:lnRef>
+          <a:fillRef idx="0">
+            <a:schemeClr val="accent1"/>
+          </a:fillRef>
+          <a:effectRef idx="0">
+            <a:schemeClr val="accent1"/>
+          </a:effectRef>
+          <a:fontRef idx="minor">
+            <a:schemeClr val="tx1"/>
+          </a:fontRef>
+        </p:style>
+      </p:cxnSp>
+    </p:spTree>
+    <p:extLst>
+      <p:ext uri="{BB962C8B-B14F-4D97-AF65-F5344CB8AC3E}">
+        <p14:creationId xmlns:p14="http://schemas.microsoft.com/office/powerpoint/2010/main" val="2128139713"/>
+      </p:ext>
+    </p:extLst>
+  </p:cSld>
+  <p:clrMapOvr>
+    <a:masterClrMapping/>
+  </p:clrMapOvr>
+  <mc:AlternateContent xmlns:mc="http://schemas.openxmlformats.org/markup-compatibility/2006" xmlns:p14="http://schemas.microsoft.com/office/powerpoint/2010/main">
+    <mc:Choice Requires="p14">
+      <p:transition spd="med" p14:dur="700">
+        <p:fade/>
+      </p:transition>
+    </mc:Choice>
+    <mc:Fallback xmlns="">
+      <p:transition spd="med">
+        <p:fade/>
+      </p:transition>
+    </mc:Fallback>
+  </mc:AlternateContent>
+</p:sld>
+</file>
+
+<file path=ppt/slides/slide27.xml><?xml version="1.0" encoding="utf-8"?>
+<p:sld xmlns:a="http://schemas.openxmlformats.org/drawingml/2006/main" xmlns:r="http://schemas.openxmlformats.org/officeDocument/2006/relationships" xmlns:p="http://schemas.openxmlformats.org/presentationml/2006/main">
+  <p:cSld>
+    <p:spTree>
+      <p:nvGrpSpPr>
+        <p:cNvPr id="1" name=""/>
+        <p:cNvGrpSpPr/>
+        <p:nvPr/>
+      </p:nvGrpSpPr>
+      <p:grpSpPr>
+        <a:xfrm>
+          <a:off x="0" y="0"/>
+          <a:ext cx="0" cy="0"/>
+          <a:chOff x="0" y="0"/>
+          <a:chExt cx="0" cy="0"/>
+        </a:xfrm>
+      </p:grpSpPr>
+      <p:sp>
+        <p:nvSpPr>
+          <p:cNvPr id="2" name="Titel 1">
+            <a:extLst>
+              <a:ext uri="{FF2B5EF4-FFF2-40B4-BE49-F238E27FC236}">
+                <a16:creationId xmlns:a16="http://schemas.microsoft.com/office/drawing/2014/main" id="{D43AC81F-F302-410C-AC32-0A39DF06F712}"/>
+              </a:ext>
+            </a:extLst>
+          </p:cNvPr>
+          <p:cNvSpPr>
+            <a:spLocks noGrp="1"/>
+          </p:cNvSpPr>
+          <p:nvPr>
+            <p:ph type="title"/>
+          </p:nvPr>
+        </p:nvSpPr>
+        <p:spPr/>
+        <p:txBody>
+          <a:bodyPr/>
+          <a:lstStyle/>
+          <a:p>
+            <a:r>
+              <a:rPr lang="nl-BE" dirty="0"/>
+              <a:t>Lets make </a:t>
+            </a:r>
+            <a:r>
+              <a:rPr lang="nl-BE" dirty="0" err="1"/>
+              <a:t>the</a:t>
+            </a:r>
+            <a:r>
+              <a:rPr lang="nl-BE" dirty="0"/>
+              <a:t> </a:t>
+            </a:r>
+            <a:r>
+              <a:rPr lang="nl-BE" dirty="0" err="1"/>
+              <a:t>naming</a:t>
+            </a:r>
+            <a:r>
+              <a:rPr lang="nl-BE" dirty="0"/>
+              <a:t> DRY</a:t>
+            </a:r>
+          </a:p>
+        </p:txBody>
+      </p:sp>
+      <p:sp>
+        <p:nvSpPr>
+          <p:cNvPr id="4" name="Tijdelijke aanduiding voor inhoud 3">
+            <a:extLst>
+              <a:ext uri="{FF2B5EF4-FFF2-40B4-BE49-F238E27FC236}">
+                <a16:creationId xmlns:a16="http://schemas.microsoft.com/office/drawing/2014/main" id="{F266961F-8E35-45C8-9D68-0A91D1915968}"/>
+              </a:ext>
+            </a:extLst>
+          </p:cNvPr>
+          <p:cNvSpPr>
+            <a:spLocks noGrp="1"/>
+          </p:cNvSpPr>
+          <p:nvPr>
+            <p:ph sz="half" idx="2"/>
+          </p:nvPr>
+        </p:nvSpPr>
+        <p:spPr/>
+        <p:txBody>
+          <a:bodyPr/>
+          <a:lstStyle/>
+          <a:p>
+            <a:endParaRPr lang="nl-BE"/>
+          </a:p>
+        </p:txBody>
+      </p:sp>
+      <p:pic>
+        <p:nvPicPr>
+          <p:cNvPr id="6" name="Afbeelding 5">
+            <a:extLst>
+              <a:ext uri="{FF2B5EF4-FFF2-40B4-BE49-F238E27FC236}">
+                <a16:creationId xmlns:a16="http://schemas.microsoft.com/office/drawing/2014/main" id="{EE756BB9-18F3-4150-8E0D-E96E43778F79}"/>
+              </a:ext>
+            </a:extLst>
+          </p:cNvPr>
+          <p:cNvPicPr>
+            <a:picLocks noChangeAspect="1"/>
+          </p:cNvPicPr>
+          <p:nvPr/>
+        </p:nvPicPr>
+        <p:blipFill>
+          <a:blip r:embed="rId2"/>
+          <a:stretch>
+            <a:fillRect/>
+          </a:stretch>
+        </p:blipFill>
+        <p:spPr>
+          <a:xfrm>
+            <a:off x="717831" y="1557655"/>
+            <a:ext cx="10602805" cy="4725059"/>
+          </a:xfrm>
+          <a:prstGeom prst="rect">
+            <a:avLst/>
+          </a:prstGeom>
+        </p:spPr>
+      </p:pic>
+    </p:spTree>
+    <p:extLst>
+      <p:ext uri="{BB962C8B-B14F-4D97-AF65-F5344CB8AC3E}">
+        <p14:creationId xmlns:p14="http://schemas.microsoft.com/office/powerpoint/2010/main" val="793682684"/>
       </p:ext>
     </p:extLst>
   </p:cSld>

</xml_diff>

<commit_message>
Added Sql Server & Database
</commit_message>
<xml_diff>
--- a/Terraform 101.pptx
+++ b/Terraform 101.pptx
@@ -5,10 +5,10 @@
     <p:sldMasterId id="2147483648" r:id="rId4"/>
   </p:sldMasterIdLst>
   <p:notesMasterIdLst>
-    <p:notesMasterId r:id="rId35"/>
+    <p:notesMasterId r:id="rId38"/>
   </p:notesMasterIdLst>
   <p:handoutMasterIdLst>
-    <p:handoutMasterId r:id="rId36"/>
+    <p:handoutMasterId r:id="rId39"/>
   </p:handoutMasterIdLst>
   <p:sldIdLst>
     <p:sldId id="257" r:id="rId5"/>
@@ -41,6 +41,9 @@
     <p:sldId id="284" r:id="rId32"/>
     <p:sldId id="285" r:id="rId33"/>
     <p:sldId id="286" r:id="rId34"/>
+    <p:sldId id="287" r:id="rId35"/>
+    <p:sldId id="289" r:id="rId36"/>
+    <p:sldId id="288" r:id="rId37"/>
   </p:sldIdLst>
   <p:sldSz cx="12192000" cy="6858000"/>
   <p:notesSz cx="6858000" cy="9144000"/>
@@ -16139,33 +16142,38 @@
           </a:p>
         </p:txBody>
       </p:sp>
-      <p:sp>
-        <p:nvSpPr>
-          <p:cNvPr id="3" name="Tijdelijke aanduiding voor inhoud 2">
+      <p:pic>
+        <p:nvPicPr>
+          <p:cNvPr id="4" name="Tijdelijke aanduiding voor inhoud 3">
             <a:extLst>
               <a:ext uri="{FF2B5EF4-FFF2-40B4-BE49-F238E27FC236}">
-                <a16:creationId xmlns:a16="http://schemas.microsoft.com/office/drawing/2014/main" id="{2EAC5B52-C4AA-4FAC-9E7E-FFE8F87C335A}"/>
+                <a16:creationId xmlns:a16="http://schemas.microsoft.com/office/drawing/2014/main" id="{AA4D5D98-F388-444C-8BB9-5450A6498F5C}"/>
               </a:ext>
             </a:extLst>
           </p:cNvPr>
-          <p:cNvSpPr>
-            <a:spLocks noGrp="1"/>
-          </p:cNvSpPr>
+          <p:cNvPicPr>
+            <a:picLocks noGrp="1" noChangeAspect="1"/>
+          </p:cNvPicPr>
           <p:nvPr>
             <p:ph sz="half" idx="1"/>
           </p:nvPr>
-        </p:nvSpPr>
-        <p:spPr/>
-        <p:txBody>
-          <a:bodyPr>
-            <a:normAutofit/>
-          </a:bodyPr>
-          <a:lstStyle/>
-          <a:p>
-            <a:endParaRPr lang="nl-BE"/>
-          </a:p>
-        </p:txBody>
-      </p:sp>
+        </p:nvPicPr>
+        <p:blipFill>
+          <a:blip r:embed="rId2"/>
+          <a:stretch>
+            <a:fillRect/>
+          </a:stretch>
+        </p:blipFill>
+        <p:spPr>
+          <a:xfrm>
+            <a:off x="838200" y="1458690"/>
+            <a:ext cx="4967193" cy="4357464"/>
+          </a:xfrm>
+          <a:prstGeom prst="rect">
+            <a:avLst/>
+          </a:prstGeom>
+        </p:spPr>
+      </p:pic>
       <p:sp>
         <p:nvSpPr>
           <p:cNvPr id="7" name="Tijdelijke aanduiding voor inhoud 6">
@@ -16184,10 +16192,211 @@
         </p:nvSpPr>
         <p:spPr/>
         <p:txBody>
-          <a:bodyPr/>
+          <a:bodyPr>
+            <a:normAutofit lnSpcReduction="10000"/>
+          </a:bodyPr>
           <a:lstStyle/>
           <a:p>
-            <a:endParaRPr lang="nl-BE" dirty="0"/>
+            <a:r>
+              <a:rPr lang="nl-BE" dirty="0" err="1"/>
+              <a:t>Added</a:t>
+            </a:r>
+            <a:r>
+              <a:rPr lang="nl-BE" dirty="0"/>
+              <a:t> a strong random password </a:t>
+            </a:r>
+            <a:r>
+              <a:rPr lang="nl-BE" dirty="0" err="1"/>
+              <a:t>and</a:t>
+            </a:r>
+            <a:r>
+              <a:rPr lang="nl-BE" dirty="0"/>
+              <a:t> a random </a:t>
+            </a:r>
+            <a:r>
+              <a:rPr lang="nl-BE" dirty="0" err="1"/>
+              <a:t>sql</a:t>
+            </a:r>
+            <a:r>
+              <a:rPr lang="nl-BE" dirty="0"/>
+              <a:t> user </a:t>
+            </a:r>
+            <a:r>
+              <a:rPr lang="nl-BE" dirty="0" err="1"/>
+              <a:t>for</a:t>
+            </a:r>
+            <a:r>
+              <a:rPr lang="nl-BE" dirty="0"/>
+              <a:t> </a:t>
+            </a:r>
+            <a:r>
+              <a:rPr lang="nl-BE" dirty="0" err="1"/>
+              <a:t>the</a:t>
+            </a:r>
+            <a:r>
+              <a:rPr lang="nl-BE" dirty="0"/>
+              <a:t> </a:t>
+            </a:r>
+            <a:r>
+              <a:rPr lang="nl-BE" dirty="0" err="1"/>
+              <a:t>sql</a:t>
+            </a:r>
+            <a:r>
+              <a:rPr lang="nl-BE" dirty="0"/>
+              <a:t> server</a:t>
+            </a:r>
+          </a:p>
+          <a:p>
+            <a:r>
+              <a:rPr lang="nl-BE" dirty="0"/>
+              <a:t>Keepers = timestamp </a:t>
+            </a:r>
+            <a:r>
+              <a:rPr lang="nl-BE" dirty="0" err="1"/>
+              <a:t>makes</a:t>
+            </a:r>
+            <a:r>
+              <a:rPr lang="nl-BE" dirty="0"/>
+              <a:t> </a:t>
+            </a:r>
+            <a:r>
+              <a:rPr lang="nl-BE" dirty="0" err="1"/>
+              <a:t>sure</a:t>
+            </a:r>
+            <a:r>
+              <a:rPr lang="nl-BE" dirty="0"/>
+              <a:t> </a:t>
+            </a:r>
+            <a:r>
+              <a:rPr lang="nl-BE" dirty="0" err="1"/>
+              <a:t>the</a:t>
+            </a:r>
+            <a:r>
+              <a:rPr lang="nl-BE" dirty="0"/>
+              <a:t> password is </a:t>
+            </a:r>
+            <a:r>
+              <a:rPr lang="nl-BE" dirty="0" err="1"/>
+              <a:t>changed</a:t>
+            </a:r>
+            <a:r>
+              <a:rPr lang="nl-BE" dirty="0"/>
+              <a:t> on </a:t>
+            </a:r>
+            <a:r>
+              <a:rPr lang="nl-BE" dirty="0" err="1"/>
+              <a:t>every</a:t>
+            </a:r>
+            <a:r>
+              <a:rPr lang="nl-BE" dirty="0"/>
+              <a:t> </a:t>
+            </a:r>
+            <a:r>
+              <a:rPr lang="nl-BE" dirty="0" err="1"/>
+              <a:t>deploy</a:t>
+            </a:r>
+            <a:r>
+              <a:rPr lang="nl-BE" dirty="0"/>
+              <a:t>, </a:t>
+            </a:r>
+            <a:r>
+              <a:rPr lang="nl-BE" dirty="0" err="1"/>
+              <a:t>thus</a:t>
+            </a:r>
+            <a:r>
+              <a:rPr lang="nl-BE" dirty="0"/>
+              <a:t> </a:t>
+            </a:r>
+            <a:r>
+              <a:rPr lang="nl-BE" dirty="0" err="1"/>
+              <a:t>increasing</a:t>
+            </a:r>
+            <a:r>
+              <a:rPr lang="nl-BE" dirty="0"/>
+              <a:t> security</a:t>
+            </a:r>
+          </a:p>
+          <a:p>
+            <a:r>
+              <a:rPr lang="nl-BE" dirty="0" err="1"/>
+              <a:t>If</a:t>
+            </a:r>
+            <a:r>
+              <a:rPr lang="nl-BE" dirty="0"/>
+              <a:t> </a:t>
+            </a:r>
+            <a:r>
+              <a:rPr lang="nl-BE" dirty="0" err="1"/>
+              <a:t>you</a:t>
+            </a:r>
+            <a:r>
+              <a:rPr lang="nl-BE" dirty="0"/>
+              <a:t> </a:t>
+            </a:r>
+            <a:r>
+              <a:rPr lang="nl-BE" dirty="0" err="1"/>
+              <a:t>don’t</a:t>
+            </a:r>
+            <a:r>
+              <a:rPr lang="nl-BE" dirty="0"/>
+              <a:t> </a:t>
+            </a:r>
+            <a:r>
+              <a:rPr lang="nl-BE" dirty="0" err="1"/>
+              <a:t>specify</a:t>
+            </a:r>
+            <a:r>
+              <a:rPr lang="nl-BE" dirty="0"/>
+              <a:t> a keeper, </a:t>
+            </a:r>
+            <a:r>
+              <a:rPr lang="nl-BE" dirty="0" err="1"/>
+              <a:t>the</a:t>
+            </a:r>
+            <a:r>
+              <a:rPr lang="nl-BE" dirty="0"/>
+              <a:t> random string, </a:t>
+            </a:r>
+            <a:r>
+              <a:rPr lang="nl-BE" dirty="0" err="1"/>
+              <a:t>number</a:t>
+            </a:r>
+            <a:r>
+              <a:rPr lang="nl-BE" dirty="0"/>
+              <a:t> or password is </a:t>
+            </a:r>
+            <a:r>
+              <a:rPr lang="nl-BE" dirty="0" err="1"/>
+              <a:t>kept</a:t>
+            </a:r>
+            <a:r>
+              <a:rPr lang="nl-BE" dirty="0"/>
+              <a:t> as long as </a:t>
+            </a:r>
+            <a:r>
+              <a:rPr lang="nl-BE" dirty="0" err="1"/>
+              <a:t>you</a:t>
+            </a:r>
+            <a:r>
+              <a:rPr lang="nl-BE" dirty="0"/>
+              <a:t> </a:t>
+            </a:r>
+            <a:r>
+              <a:rPr lang="nl-BE" dirty="0" err="1"/>
+              <a:t>don’t</a:t>
+            </a:r>
+            <a:r>
+              <a:rPr lang="nl-BE" dirty="0"/>
+              <a:t> change a property of </a:t>
+            </a:r>
+            <a:r>
+              <a:rPr lang="nl-BE" dirty="0" err="1"/>
+              <a:t>the</a:t>
+            </a:r>
+            <a:r>
+              <a:rPr lang="nl-BE" dirty="0"/>
+              <a:t> random object.</a:t>
+            </a:r>
           </a:p>
         </p:txBody>
       </p:sp>
@@ -16195,6 +16404,433 @@
     <p:extLst>
       <p:ext uri="{BB962C8B-B14F-4D97-AF65-F5344CB8AC3E}">
         <p14:creationId xmlns:p14="http://schemas.microsoft.com/office/powerpoint/2010/main" val="4236130222"/>
+      </p:ext>
+    </p:extLst>
+  </p:cSld>
+  <p:clrMapOvr>
+    <a:masterClrMapping/>
+  </p:clrMapOvr>
+  <mc:AlternateContent xmlns:mc="http://schemas.openxmlformats.org/markup-compatibility/2006" xmlns:p14="http://schemas.microsoft.com/office/powerpoint/2010/main">
+    <mc:Choice Requires="p14">
+      <p:transition spd="med" p14:dur="700">
+        <p:fade/>
+      </p:transition>
+    </mc:Choice>
+    <mc:Fallback xmlns="">
+      <p:transition spd="med">
+        <p:fade/>
+      </p:transition>
+    </mc:Fallback>
+  </mc:AlternateContent>
+</p:sld>
+</file>
+
+<file path=ppt/slides/slide31.xml><?xml version="1.0" encoding="utf-8"?>
+<p:sld xmlns:a="http://schemas.openxmlformats.org/drawingml/2006/main" xmlns:r="http://schemas.openxmlformats.org/officeDocument/2006/relationships" xmlns:p="http://schemas.openxmlformats.org/presentationml/2006/main">
+  <p:cSld>
+    <p:spTree>
+      <p:nvGrpSpPr>
+        <p:cNvPr id="1" name=""/>
+        <p:cNvGrpSpPr/>
+        <p:nvPr/>
+      </p:nvGrpSpPr>
+      <p:grpSpPr>
+        <a:xfrm>
+          <a:off x="0" y="0"/>
+          <a:ext cx="0" cy="0"/>
+          <a:chOff x="0" y="0"/>
+          <a:chExt cx="0" cy="0"/>
+        </a:xfrm>
+      </p:grpSpPr>
+      <p:sp>
+        <p:nvSpPr>
+          <p:cNvPr id="2" name="Titel 1">
+            <a:extLst>
+              <a:ext uri="{FF2B5EF4-FFF2-40B4-BE49-F238E27FC236}">
+                <a16:creationId xmlns:a16="http://schemas.microsoft.com/office/drawing/2014/main" id="{2EF7258D-C27A-41CF-8A49-60C9A43BB1EE}"/>
+              </a:ext>
+            </a:extLst>
+          </p:cNvPr>
+          <p:cNvSpPr>
+            <a:spLocks noGrp="1"/>
+          </p:cNvSpPr>
+          <p:nvPr>
+            <p:ph type="title"/>
+          </p:nvPr>
+        </p:nvSpPr>
+        <p:spPr/>
+        <p:txBody>
+          <a:bodyPr/>
+          <a:lstStyle/>
+          <a:p>
+            <a:r>
+              <a:rPr lang="nl-BE" dirty="0"/>
+              <a:t>9. SQL Database</a:t>
+            </a:r>
+          </a:p>
+        </p:txBody>
+      </p:sp>
+      <p:sp>
+        <p:nvSpPr>
+          <p:cNvPr id="7" name="Tijdelijke aanduiding voor inhoud 6">
+            <a:extLst>
+              <a:ext uri="{FF2B5EF4-FFF2-40B4-BE49-F238E27FC236}">
+                <a16:creationId xmlns:a16="http://schemas.microsoft.com/office/drawing/2014/main" id="{E362EA5A-EE83-433A-9688-B2B8D1DF296B}"/>
+              </a:ext>
+            </a:extLst>
+          </p:cNvPr>
+          <p:cNvSpPr>
+            <a:spLocks noGrp="1"/>
+          </p:cNvSpPr>
+          <p:nvPr>
+            <p:ph sz="half" idx="2"/>
+          </p:nvPr>
+        </p:nvSpPr>
+        <p:spPr/>
+        <p:txBody>
+          <a:bodyPr>
+            <a:normAutofit/>
+          </a:bodyPr>
+          <a:lstStyle/>
+          <a:p>
+            <a:r>
+              <a:rPr lang="nl-BE" dirty="0" err="1"/>
+              <a:t>Nothing</a:t>
+            </a:r>
+            <a:r>
+              <a:rPr lang="nl-BE" dirty="0"/>
+              <a:t> special </a:t>
+            </a:r>
+            <a:r>
+              <a:rPr lang="nl-BE" dirty="0" err="1"/>
+              <a:t>to</a:t>
+            </a:r>
+            <a:r>
+              <a:rPr lang="nl-BE" dirty="0"/>
+              <a:t> </a:t>
+            </a:r>
+            <a:r>
+              <a:rPr lang="nl-BE" dirty="0" err="1"/>
+              <a:t>see</a:t>
+            </a:r>
+            <a:r>
+              <a:rPr lang="nl-BE" dirty="0"/>
+              <a:t> here</a:t>
+            </a:r>
+          </a:p>
+        </p:txBody>
+      </p:sp>
+      <p:pic>
+        <p:nvPicPr>
+          <p:cNvPr id="8" name="Tijdelijke aanduiding voor inhoud 7">
+            <a:extLst>
+              <a:ext uri="{FF2B5EF4-FFF2-40B4-BE49-F238E27FC236}">
+                <a16:creationId xmlns:a16="http://schemas.microsoft.com/office/drawing/2014/main" id="{9A537F88-6FB1-4C16-9A6F-6D3DF605D438}"/>
+              </a:ext>
+            </a:extLst>
+          </p:cNvPr>
+          <p:cNvPicPr>
+            <a:picLocks noGrp="1" noChangeAspect="1"/>
+          </p:cNvPicPr>
+          <p:nvPr>
+            <p:ph sz="half" idx="1"/>
+          </p:nvPr>
+        </p:nvPicPr>
+        <p:blipFill>
+          <a:blip r:embed="rId2"/>
+          <a:stretch>
+            <a:fillRect/>
+          </a:stretch>
+        </p:blipFill>
+        <p:spPr>
+          <a:xfrm>
+            <a:off x="1531608" y="1825625"/>
+            <a:ext cx="4374221" cy="3475038"/>
+          </a:xfrm>
+          <a:prstGeom prst="rect">
+            <a:avLst/>
+          </a:prstGeom>
+        </p:spPr>
+      </p:pic>
+    </p:spTree>
+    <p:extLst>
+      <p:ext uri="{BB962C8B-B14F-4D97-AF65-F5344CB8AC3E}">
+        <p14:creationId xmlns:p14="http://schemas.microsoft.com/office/powerpoint/2010/main" val="4274517932"/>
+      </p:ext>
+    </p:extLst>
+  </p:cSld>
+  <p:clrMapOvr>
+    <a:masterClrMapping/>
+  </p:clrMapOvr>
+  <mc:AlternateContent xmlns:mc="http://schemas.openxmlformats.org/markup-compatibility/2006" xmlns:p14="http://schemas.microsoft.com/office/powerpoint/2010/main">
+    <mc:Choice Requires="p14">
+      <p:transition spd="med" p14:dur="700">
+        <p:fade/>
+      </p:transition>
+    </mc:Choice>
+    <mc:Fallback xmlns="">
+      <p:transition spd="med">
+        <p:fade/>
+      </p:transition>
+    </mc:Fallback>
+  </mc:AlternateContent>
+</p:sld>
+</file>
+
+<file path=ppt/slides/slide32.xml><?xml version="1.0" encoding="utf-8"?>
+<p:sld xmlns:a="http://schemas.openxmlformats.org/drawingml/2006/main" xmlns:r="http://schemas.openxmlformats.org/officeDocument/2006/relationships" xmlns:p="http://schemas.openxmlformats.org/presentationml/2006/main">
+  <p:cSld>
+    <p:spTree>
+      <p:nvGrpSpPr>
+        <p:cNvPr id="1" name=""/>
+        <p:cNvGrpSpPr/>
+        <p:nvPr/>
+      </p:nvGrpSpPr>
+      <p:grpSpPr>
+        <a:xfrm>
+          <a:off x="0" y="0"/>
+          <a:ext cx="0" cy="0"/>
+          <a:chOff x="0" y="0"/>
+          <a:chExt cx="0" cy="0"/>
+        </a:xfrm>
+      </p:grpSpPr>
+      <p:sp>
+        <p:nvSpPr>
+          <p:cNvPr id="2" name="Titel 1">
+            <a:extLst>
+              <a:ext uri="{FF2B5EF4-FFF2-40B4-BE49-F238E27FC236}">
+                <a16:creationId xmlns:a16="http://schemas.microsoft.com/office/drawing/2014/main" id="{2EF7258D-C27A-41CF-8A49-60C9A43BB1EE}"/>
+              </a:ext>
+            </a:extLst>
+          </p:cNvPr>
+          <p:cNvSpPr>
+            <a:spLocks noGrp="1"/>
+          </p:cNvSpPr>
+          <p:nvPr>
+            <p:ph type="title"/>
+          </p:nvPr>
+        </p:nvSpPr>
+        <p:spPr/>
+        <p:txBody>
+          <a:bodyPr/>
+          <a:lstStyle/>
+          <a:p>
+            <a:r>
+              <a:rPr lang="nl-BE" dirty="0"/>
+              <a:t>9. SQL Database</a:t>
+            </a:r>
+          </a:p>
+        </p:txBody>
+      </p:sp>
+      <p:sp>
+        <p:nvSpPr>
+          <p:cNvPr id="4" name="Tijdelijke aanduiding voor inhoud 3">
+            <a:extLst>
+              <a:ext uri="{FF2B5EF4-FFF2-40B4-BE49-F238E27FC236}">
+                <a16:creationId xmlns:a16="http://schemas.microsoft.com/office/drawing/2014/main" id="{986F51D6-4A77-4009-831B-F93A27811920}"/>
+              </a:ext>
+            </a:extLst>
+          </p:cNvPr>
+          <p:cNvSpPr>
+            <a:spLocks noGrp="1"/>
+          </p:cNvSpPr>
+          <p:nvPr>
+            <p:ph sz="half" idx="1"/>
+          </p:nvPr>
+        </p:nvSpPr>
+        <p:spPr/>
+        <p:txBody>
+          <a:bodyPr/>
+          <a:lstStyle/>
+          <a:p>
+            <a:endParaRPr lang="nl-BE"/>
+          </a:p>
+        </p:txBody>
+      </p:sp>
+      <p:sp>
+        <p:nvSpPr>
+          <p:cNvPr id="6" name="Tijdelijke aanduiding voor inhoud 5">
+            <a:extLst>
+              <a:ext uri="{FF2B5EF4-FFF2-40B4-BE49-F238E27FC236}">
+                <a16:creationId xmlns:a16="http://schemas.microsoft.com/office/drawing/2014/main" id="{E096DE8C-9DE3-4CAC-9A79-F43DD7EEC275}"/>
+              </a:ext>
+            </a:extLst>
+          </p:cNvPr>
+          <p:cNvSpPr>
+            <a:spLocks noGrp="1"/>
+          </p:cNvSpPr>
+          <p:nvPr>
+            <p:ph sz="half" idx="2"/>
+          </p:nvPr>
+        </p:nvSpPr>
+        <p:spPr/>
+        <p:txBody>
+          <a:bodyPr/>
+          <a:lstStyle/>
+          <a:p>
+            <a:endParaRPr lang="nl-BE"/>
+          </a:p>
+        </p:txBody>
+      </p:sp>
+      <p:pic>
+        <p:nvPicPr>
+          <p:cNvPr id="9" name="Afbeelding 8">
+            <a:extLst>
+              <a:ext uri="{FF2B5EF4-FFF2-40B4-BE49-F238E27FC236}">
+                <a16:creationId xmlns:a16="http://schemas.microsoft.com/office/drawing/2014/main" id="{08874129-B7FE-4220-A048-829CC13DFDDF}"/>
+              </a:ext>
+            </a:extLst>
+          </p:cNvPr>
+          <p:cNvPicPr>
+            <a:picLocks noChangeAspect="1"/>
+          </p:cNvPicPr>
+          <p:nvPr/>
+        </p:nvPicPr>
+        <p:blipFill>
+          <a:blip r:embed="rId2"/>
+          <a:stretch>
+            <a:fillRect/>
+          </a:stretch>
+        </p:blipFill>
+        <p:spPr>
+          <a:xfrm>
+            <a:off x="1534986" y="1579111"/>
+            <a:ext cx="9122029" cy="4451938"/>
+          </a:xfrm>
+          <a:prstGeom prst="rect">
+            <a:avLst/>
+          </a:prstGeom>
+        </p:spPr>
+      </p:pic>
+    </p:spTree>
+    <p:extLst>
+      <p:ext uri="{BB962C8B-B14F-4D97-AF65-F5344CB8AC3E}">
+        <p14:creationId xmlns:p14="http://schemas.microsoft.com/office/powerpoint/2010/main" val="794114645"/>
+      </p:ext>
+    </p:extLst>
+  </p:cSld>
+  <p:clrMapOvr>
+    <a:masterClrMapping/>
+  </p:clrMapOvr>
+  <mc:AlternateContent xmlns:mc="http://schemas.openxmlformats.org/markup-compatibility/2006" xmlns:p14="http://schemas.microsoft.com/office/powerpoint/2010/main">
+    <mc:Choice Requires="p14">
+      <p:transition spd="med" p14:dur="700">
+        <p:fade/>
+      </p:transition>
+    </mc:Choice>
+    <mc:Fallback xmlns="">
+      <p:transition spd="med">
+        <p:fade/>
+      </p:transition>
+    </mc:Fallback>
+  </mc:AlternateContent>
+</p:sld>
+</file>
+
+<file path=ppt/slides/slide33.xml><?xml version="1.0" encoding="utf-8"?>
+<p:sld xmlns:a="http://schemas.openxmlformats.org/drawingml/2006/main" xmlns:r="http://schemas.openxmlformats.org/officeDocument/2006/relationships" xmlns:p="http://schemas.openxmlformats.org/presentationml/2006/main">
+  <p:cSld>
+    <p:spTree>
+      <p:nvGrpSpPr>
+        <p:cNvPr id="1" name=""/>
+        <p:cNvGrpSpPr/>
+        <p:nvPr/>
+      </p:nvGrpSpPr>
+      <p:grpSpPr>
+        <a:xfrm>
+          <a:off x="0" y="0"/>
+          <a:ext cx="0" cy="0"/>
+          <a:chOff x="0" y="0"/>
+          <a:chExt cx="0" cy="0"/>
+        </a:xfrm>
+      </p:grpSpPr>
+      <p:sp>
+        <p:nvSpPr>
+          <p:cNvPr id="2" name="Titel 1">
+            <a:extLst>
+              <a:ext uri="{FF2B5EF4-FFF2-40B4-BE49-F238E27FC236}">
+                <a16:creationId xmlns:a16="http://schemas.microsoft.com/office/drawing/2014/main" id="{AC8100C7-B942-4020-A506-75A995E0B234}"/>
+              </a:ext>
+            </a:extLst>
+          </p:cNvPr>
+          <p:cNvSpPr>
+            <a:spLocks noGrp="1"/>
+          </p:cNvSpPr>
+          <p:nvPr>
+            <p:ph type="title"/>
+          </p:nvPr>
+        </p:nvSpPr>
+        <p:spPr/>
+        <p:txBody>
+          <a:bodyPr/>
+          <a:lstStyle/>
+          <a:p>
+            <a:r>
+              <a:rPr lang="nl-BE" dirty="0"/>
+              <a:t>10. Application </a:t>
+            </a:r>
+            <a:r>
+              <a:rPr lang="nl-BE" dirty="0" err="1"/>
+              <a:t>Insights</a:t>
+            </a:r>
+            <a:endParaRPr lang="nl-BE" dirty="0"/>
+          </a:p>
+        </p:txBody>
+      </p:sp>
+      <p:sp>
+        <p:nvSpPr>
+          <p:cNvPr id="3" name="Tijdelijke aanduiding voor inhoud 2">
+            <a:extLst>
+              <a:ext uri="{FF2B5EF4-FFF2-40B4-BE49-F238E27FC236}">
+                <a16:creationId xmlns:a16="http://schemas.microsoft.com/office/drawing/2014/main" id="{C93FC6A3-6365-459A-918E-AA30BC5AD1D3}"/>
+              </a:ext>
+            </a:extLst>
+          </p:cNvPr>
+          <p:cNvSpPr>
+            <a:spLocks noGrp="1"/>
+          </p:cNvSpPr>
+          <p:nvPr>
+            <p:ph sz="half" idx="1"/>
+          </p:nvPr>
+        </p:nvSpPr>
+        <p:spPr/>
+        <p:txBody>
+          <a:bodyPr/>
+          <a:lstStyle/>
+          <a:p>
+            <a:endParaRPr lang="nl-BE"/>
+          </a:p>
+        </p:txBody>
+      </p:sp>
+      <p:sp>
+        <p:nvSpPr>
+          <p:cNvPr id="4" name="Tijdelijke aanduiding voor inhoud 3">
+            <a:extLst>
+              <a:ext uri="{FF2B5EF4-FFF2-40B4-BE49-F238E27FC236}">
+                <a16:creationId xmlns:a16="http://schemas.microsoft.com/office/drawing/2014/main" id="{0A7EBC04-01DF-4A36-979A-697E4312778C}"/>
+              </a:ext>
+            </a:extLst>
+          </p:cNvPr>
+          <p:cNvSpPr>
+            <a:spLocks noGrp="1"/>
+          </p:cNvSpPr>
+          <p:nvPr>
+            <p:ph sz="half" idx="2"/>
+          </p:nvPr>
+        </p:nvSpPr>
+        <p:spPr/>
+        <p:txBody>
+          <a:bodyPr/>
+          <a:lstStyle/>
+          <a:p>
+            <a:endParaRPr lang="nl-BE"/>
+          </a:p>
+        </p:txBody>
+      </p:sp>
+    </p:spTree>
+    <p:extLst>
+      <p:ext uri="{BB962C8B-B14F-4D97-AF65-F5344CB8AC3E}">
+        <p14:creationId xmlns:p14="http://schemas.microsoft.com/office/powerpoint/2010/main" val="19108204"/>
       </p:ext>
     </p:extLst>
   </p:cSld>

</xml_diff>